<commit_message>
More slides on Week 2, adding a practice notebook 8.
</commit_message>
<xml_diff>
--- a/W1/2. W1S2 final/W1S2.pptx
+++ b/W1/2. W1S2 final/W1S2.pptx
@@ -235,7 +235,6 @@
 <file path=ppt/revisionInfo.xml><?xml version="1.0" encoding="utf-8"?>
 <p1510:revInfo xmlns:a="http://schemas.openxmlformats.org/drawingml/2006/main" xmlns:r="http://schemas.openxmlformats.org/officeDocument/2006/relationships" xmlns:p1510="http://schemas.microsoft.com/office/powerpoint/2015/10/main">
   <p1510:revLst>
-    <p1510:client id="{0C574F24-0842-4510-AB61-4E12E986D5CF}" v="4770" dt="2023-01-25T07:50:41.066"/>
     <p1510:client id="{343EC945-A966-4A33-8BD1-1157BF0C0D71}" v="8" dt="2023-01-26T02:38:15.493"/>
   </p1510:revLst>
 </p1510:revInfo>
@@ -2361,7 +2360,7 @@
   <pc:docChgLst>
     <pc:chgData name="Matthieu De Mari" userId="dfb708c9-d8dc-439f-9a3b-c772bf4a311c" providerId="ADAL" clId="{343EC945-A966-4A33-8BD1-1157BF0C0D71}"/>
     <pc:docChg chg="undo custSel addSld delSld modSld addSection delSection modSection">
-      <pc:chgData name="Matthieu De Mari" userId="dfb708c9-d8dc-439f-9a3b-c772bf4a311c" providerId="ADAL" clId="{343EC945-A966-4A33-8BD1-1157BF0C0D71}" dt="2023-01-26T03:09:04.105" v="32" actId="47"/>
+      <pc:chgData name="Matthieu De Mari" userId="dfb708c9-d8dc-439f-9a3b-c772bf4a311c" providerId="ADAL" clId="{343EC945-A966-4A33-8BD1-1157BF0C0D71}" dt="2023-01-27T09:03:43.772" v="55" actId="20577"/>
       <pc:docMkLst>
         <pc:docMk/>
       </pc:docMkLst>
@@ -3064,6 +3063,21 @@
             <pc:docMk/>
             <pc:sldMk cId="1739226965" sldId="476"/>
             <ac:spMk id="3" creationId="{09ACEEFD-8460-F540-F80C-BEACC2297773}"/>
+          </ac:spMkLst>
+        </pc:spChg>
+      </pc:sldChg>
+      <pc:sldChg chg="modSp mod">
+        <pc:chgData name="Matthieu De Mari" userId="dfb708c9-d8dc-439f-9a3b-c772bf4a311c" providerId="ADAL" clId="{343EC945-A966-4A33-8BD1-1157BF0C0D71}" dt="2023-01-27T09:03:43.772" v="55" actId="20577"/>
+        <pc:sldMkLst>
+          <pc:docMk/>
+          <pc:sldMk cId="1974002731" sldId="490"/>
+        </pc:sldMkLst>
+        <pc:spChg chg="mod">
+          <ac:chgData name="Matthieu De Mari" userId="dfb708c9-d8dc-439f-9a3b-c772bf4a311c" providerId="ADAL" clId="{343EC945-A966-4A33-8BD1-1157BF0C0D71}" dt="2023-01-27T09:03:43.772" v="55" actId="20577"/>
+          <ac:spMkLst>
+            <pc:docMk/>
+            <pc:sldMk cId="1974002731" sldId="490"/>
+            <ac:spMk id="2" creationId="{37C84060-31A2-3AFB-B38D-81D7652356D5}"/>
           </ac:spMkLst>
         </pc:spChg>
       </pc:sldChg>
@@ -10520,7 +10534,7 @@
           <a:p>
             <a:fld id="{61478373-EB31-4867-8CF0-FA31364748A5}" type="datetimeFigureOut">
               <a:rPr lang="en-GB" smtClean="0"/>
-              <a:t>26/01/2023</a:t>
+              <a:t>27/01/2023</a:t>
             </a:fld>
             <a:endParaRPr lang="en-GB"/>
           </a:p>
@@ -10937,7 +10951,7 @@
           <a:p>
             <a:fld id="{E85DF616-B21E-4EF6-A6A5-95E2FB3EB1A1}" type="datetimeFigureOut">
               <a:rPr lang="en-GB" smtClean="0"/>
-              <a:t>26/01/2023</a:t>
+              <a:t>27/01/2023</a:t>
             </a:fld>
             <a:endParaRPr lang="en-GB"/>
           </a:p>
@@ -11137,7 +11151,7 @@
           <a:p>
             <a:fld id="{E85DF616-B21E-4EF6-A6A5-95E2FB3EB1A1}" type="datetimeFigureOut">
               <a:rPr lang="en-GB" smtClean="0"/>
-              <a:t>26/01/2023</a:t>
+              <a:t>27/01/2023</a:t>
             </a:fld>
             <a:endParaRPr lang="en-GB"/>
           </a:p>
@@ -11347,7 +11361,7 @@
           <a:p>
             <a:fld id="{E85DF616-B21E-4EF6-A6A5-95E2FB3EB1A1}" type="datetimeFigureOut">
               <a:rPr lang="en-GB" smtClean="0"/>
-              <a:t>26/01/2023</a:t>
+              <a:t>27/01/2023</a:t>
             </a:fld>
             <a:endParaRPr lang="en-GB"/>
           </a:p>
@@ -11547,7 +11561,7 @@
           <a:p>
             <a:fld id="{E85DF616-B21E-4EF6-A6A5-95E2FB3EB1A1}" type="datetimeFigureOut">
               <a:rPr lang="en-GB" smtClean="0"/>
-              <a:t>26/01/2023</a:t>
+              <a:t>27/01/2023</a:t>
             </a:fld>
             <a:endParaRPr lang="en-GB"/>
           </a:p>
@@ -11823,7 +11837,7 @@
           <a:p>
             <a:fld id="{E85DF616-B21E-4EF6-A6A5-95E2FB3EB1A1}" type="datetimeFigureOut">
               <a:rPr lang="en-GB" smtClean="0"/>
-              <a:t>26/01/2023</a:t>
+              <a:t>27/01/2023</a:t>
             </a:fld>
             <a:endParaRPr lang="en-GB"/>
           </a:p>
@@ -12091,7 +12105,7 @@
           <a:p>
             <a:fld id="{E85DF616-B21E-4EF6-A6A5-95E2FB3EB1A1}" type="datetimeFigureOut">
               <a:rPr lang="en-GB" smtClean="0"/>
-              <a:t>26/01/2023</a:t>
+              <a:t>27/01/2023</a:t>
             </a:fld>
             <a:endParaRPr lang="en-GB"/>
           </a:p>
@@ -12506,7 +12520,7 @@
           <a:p>
             <a:fld id="{E85DF616-B21E-4EF6-A6A5-95E2FB3EB1A1}" type="datetimeFigureOut">
               <a:rPr lang="en-GB" smtClean="0"/>
-              <a:t>26/01/2023</a:t>
+              <a:t>27/01/2023</a:t>
             </a:fld>
             <a:endParaRPr lang="en-GB"/>
           </a:p>
@@ -12648,7 +12662,7 @@
           <a:p>
             <a:fld id="{E85DF616-B21E-4EF6-A6A5-95E2FB3EB1A1}" type="datetimeFigureOut">
               <a:rPr lang="en-GB" smtClean="0"/>
-              <a:t>26/01/2023</a:t>
+              <a:t>27/01/2023</a:t>
             </a:fld>
             <a:endParaRPr lang="en-GB"/>
           </a:p>
@@ -12761,7 +12775,7 @@
           <a:p>
             <a:fld id="{E85DF616-B21E-4EF6-A6A5-95E2FB3EB1A1}" type="datetimeFigureOut">
               <a:rPr lang="en-GB" smtClean="0"/>
-              <a:t>26/01/2023</a:t>
+              <a:t>27/01/2023</a:t>
             </a:fld>
             <a:endParaRPr lang="en-GB"/>
           </a:p>
@@ -13074,7 +13088,7 @@
           <a:p>
             <a:fld id="{E85DF616-B21E-4EF6-A6A5-95E2FB3EB1A1}" type="datetimeFigureOut">
               <a:rPr lang="en-GB" smtClean="0"/>
-              <a:t>26/01/2023</a:t>
+              <a:t>27/01/2023</a:t>
             </a:fld>
             <a:endParaRPr lang="en-GB"/>
           </a:p>
@@ -13363,7 +13377,7 @@
           <a:p>
             <a:fld id="{E85DF616-B21E-4EF6-A6A5-95E2FB3EB1A1}" type="datetimeFigureOut">
               <a:rPr lang="en-GB" smtClean="0"/>
-              <a:t>26/01/2023</a:t>
+              <a:t>27/01/2023</a:t>
             </a:fld>
             <a:endParaRPr lang="en-GB"/>
           </a:p>
@@ -13606,7 +13620,7 @@
           <a:p>
             <a:fld id="{E85DF616-B21E-4EF6-A6A5-95E2FB3EB1A1}" type="datetimeFigureOut">
               <a:rPr lang="en-GB" smtClean="0"/>
-              <a:t>26/01/2023</a:t>
+              <a:t>27/01/2023</a:t>
             </a:fld>
             <a:endParaRPr lang="en-GB"/>
           </a:p>
@@ -17678,7 +17692,7 @@
           <a:p>
             <a:r>
               <a:rPr lang="en-GB" dirty="0"/>
-              <a:t>or too much data,</a:t>
+              <a:t>or has imbalance in the data,</a:t>
             </a:r>
           </a:p>
           <a:p>

</xml_diff>

<commit_message>
Added video recordings of W1S2 and W1S3, minor corrections on slides.
</commit_message>
<xml_diff>
--- a/W1/2. W1S2 final/W1S2.pptx
+++ b/W1/2. W1S2 final/W1S2.pptx
@@ -235,7 +235,7 @@
 <file path=ppt/revisionInfo.xml><?xml version="1.0" encoding="utf-8"?>
 <p1510:revInfo xmlns:a="http://schemas.openxmlformats.org/drawingml/2006/main" xmlns:r="http://schemas.openxmlformats.org/officeDocument/2006/relationships" xmlns:p1510="http://schemas.microsoft.com/office/powerpoint/2015/10/main">
   <p1510:revLst>
-    <p1510:client id="{343EC945-A966-4A33-8BD1-1157BF0C0D71}" v="8" dt="2023-01-26T02:38:15.493"/>
+    <p1510:client id="{343EC945-A966-4A33-8BD1-1157BF0C0D71}" v="80" dt="2023-02-01T06:20:03.335"/>
   </p1510:revLst>
 </p1510:revInfo>
 </file>
@@ -2360,7 +2360,7 @@
   <pc:docChgLst>
     <pc:chgData name="Matthieu De Mari" userId="dfb708c9-d8dc-439f-9a3b-c772bf4a311c" providerId="ADAL" clId="{343EC945-A966-4A33-8BD1-1157BF0C0D71}"/>
     <pc:docChg chg="undo custSel addSld delSld modSld addSection delSection modSection">
-      <pc:chgData name="Matthieu De Mari" userId="dfb708c9-d8dc-439f-9a3b-c772bf4a311c" providerId="ADAL" clId="{343EC945-A966-4A33-8BD1-1157BF0C0D71}" dt="2023-01-27T09:03:43.772" v="55" actId="20577"/>
+      <pc:chgData name="Matthieu De Mari" userId="dfb708c9-d8dc-439f-9a3b-c772bf4a311c" providerId="ADAL" clId="{343EC945-A966-4A33-8BD1-1157BF0C0D71}" dt="2023-02-01T07:06:46.024" v="128" actId="20577"/>
       <pc:docMkLst>
         <pc:docMk/>
       </pc:docMkLst>
@@ -3052,16 +3052,31 @@
         </pc:sldMkLst>
       </pc:sldChg>
       <pc:sldChg chg="modSp">
-        <pc:chgData name="Matthieu De Mari" userId="dfb708c9-d8dc-439f-9a3b-c772bf4a311c" providerId="ADAL" clId="{343EC945-A966-4A33-8BD1-1157BF0C0D71}" dt="2023-01-26T02:38:15.493" v="28" actId="20577"/>
+        <pc:chgData name="Matthieu De Mari" userId="dfb708c9-d8dc-439f-9a3b-c772bf4a311c" providerId="ADAL" clId="{343EC945-A966-4A33-8BD1-1157BF0C0D71}" dt="2023-02-01T06:20:03.335" v="127" actId="114"/>
         <pc:sldMkLst>
           <pc:docMk/>
           <pc:sldMk cId="1739226965" sldId="476"/>
         </pc:sldMkLst>
         <pc:spChg chg="mod">
-          <ac:chgData name="Matthieu De Mari" userId="dfb708c9-d8dc-439f-9a3b-c772bf4a311c" providerId="ADAL" clId="{343EC945-A966-4A33-8BD1-1157BF0C0D71}" dt="2023-01-26T02:38:15.493" v="28" actId="20577"/>
+          <ac:chgData name="Matthieu De Mari" userId="dfb708c9-d8dc-439f-9a3b-c772bf4a311c" providerId="ADAL" clId="{343EC945-A966-4A33-8BD1-1157BF0C0D71}" dt="2023-02-01T06:20:03.335" v="127" actId="114"/>
           <ac:spMkLst>
             <pc:docMk/>
             <pc:sldMk cId="1739226965" sldId="476"/>
+            <ac:spMk id="3" creationId="{09ACEEFD-8460-F540-F80C-BEACC2297773}"/>
+          </ac:spMkLst>
+        </pc:spChg>
+      </pc:sldChg>
+      <pc:sldChg chg="modSp">
+        <pc:chgData name="Matthieu De Mari" userId="dfb708c9-d8dc-439f-9a3b-c772bf4a311c" providerId="ADAL" clId="{343EC945-A966-4A33-8BD1-1157BF0C0D71}" dt="2023-02-01T06:15:20.300" v="126"/>
+        <pc:sldMkLst>
+          <pc:docMk/>
+          <pc:sldMk cId="4248348938" sldId="478"/>
+        </pc:sldMkLst>
+        <pc:spChg chg="mod">
+          <ac:chgData name="Matthieu De Mari" userId="dfb708c9-d8dc-439f-9a3b-c772bf4a311c" providerId="ADAL" clId="{343EC945-A966-4A33-8BD1-1157BF0C0D71}" dt="2023-02-01T06:15:20.300" v="126"/>
+          <ac:spMkLst>
+            <pc:docMk/>
+            <pc:sldMk cId="4248348938" sldId="478"/>
             <ac:spMk id="3" creationId="{09ACEEFD-8460-F540-F80C-BEACC2297773}"/>
           </ac:spMkLst>
         </pc:spChg>
@@ -3362,6 +3377,21 @@
           <pc:docMk/>
           <pc:sldMk cId="1753014364" sldId="548"/>
         </pc:sldMkLst>
+      </pc:sldChg>
+      <pc:sldChg chg="modSp mod">
+        <pc:chgData name="Matthieu De Mari" userId="dfb708c9-d8dc-439f-9a3b-c772bf4a311c" providerId="ADAL" clId="{343EC945-A966-4A33-8BD1-1157BF0C0D71}" dt="2023-02-01T07:06:46.024" v="128" actId="20577"/>
+        <pc:sldMkLst>
+          <pc:docMk/>
+          <pc:sldMk cId="3852147676" sldId="549"/>
+        </pc:sldMkLst>
+        <pc:spChg chg="mod">
+          <ac:chgData name="Matthieu De Mari" userId="dfb708c9-d8dc-439f-9a3b-c772bf4a311c" providerId="ADAL" clId="{343EC945-A966-4A33-8BD1-1157BF0C0D71}" dt="2023-02-01T07:06:46.024" v="128" actId="20577"/>
+          <ac:spMkLst>
+            <pc:docMk/>
+            <pc:sldMk cId="3852147676" sldId="549"/>
+            <ac:spMk id="4" creationId="{5E76589E-870E-419D-CF95-4309EACDB190}"/>
+          </ac:spMkLst>
+        </pc:spChg>
       </pc:sldChg>
       <pc:sldChg chg="del">
         <pc:chgData name="Matthieu De Mari" userId="dfb708c9-d8dc-439f-9a3b-c772bf4a311c" providerId="ADAL" clId="{343EC945-A966-4A33-8BD1-1157BF0C0D71}" dt="2023-01-25T08:03:16.788" v="13" actId="47"/>
@@ -10534,7 +10564,7 @@
           <a:p>
             <a:fld id="{61478373-EB31-4867-8CF0-FA31364748A5}" type="datetimeFigureOut">
               <a:rPr lang="en-GB" smtClean="0"/>
-              <a:t>27/01/2023</a:t>
+              <a:t>01/02/2023</a:t>
             </a:fld>
             <a:endParaRPr lang="en-GB"/>
           </a:p>
@@ -10951,7 +10981,7 @@
           <a:p>
             <a:fld id="{E85DF616-B21E-4EF6-A6A5-95E2FB3EB1A1}" type="datetimeFigureOut">
               <a:rPr lang="en-GB" smtClean="0"/>
-              <a:t>27/01/2023</a:t>
+              <a:t>01/02/2023</a:t>
             </a:fld>
             <a:endParaRPr lang="en-GB"/>
           </a:p>
@@ -11151,7 +11181,7 @@
           <a:p>
             <a:fld id="{E85DF616-B21E-4EF6-A6A5-95E2FB3EB1A1}" type="datetimeFigureOut">
               <a:rPr lang="en-GB" smtClean="0"/>
-              <a:t>27/01/2023</a:t>
+              <a:t>01/02/2023</a:t>
             </a:fld>
             <a:endParaRPr lang="en-GB"/>
           </a:p>
@@ -11361,7 +11391,7 @@
           <a:p>
             <a:fld id="{E85DF616-B21E-4EF6-A6A5-95E2FB3EB1A1}" type="datetimeFigureOut">
               <a:rPr lang="en-GB" smtClean="0"/>
-              <a:t>27/01/2023</a:t>
+              <a:t>01/02/2023</a:t>
             </a:fld>
             <a:endParaRPr lang="en-GB"/>
           </a:p>
@@ -11561,7 +11591,7 @@
           <a:p>
             <a:fld id="{E85DF616-B21E-4EF6-A6A5-95E2FB3EB1A1}" type="datetimeFigureOut">
               <a:rPr lang="en-GB" smtClean="0"/>
-              <a:t>27/01/2023</a:t>
+              <a:t>01/02/2023</a:t>
             </a:fld>
             <a:endParaRPr lang="en-GB"/>
           </a:p>
@@ -11837,7 +11867,7 @@
           <a:p>
             <a:fld id="{E85DF616-B21E-4EF6-A6A5-95E2FB3EB1A1}" type="datetimeFigureOut">
               <a:rPr lang="en-GB" smtClean="0"/>
-              <a:t>27/01/2023</a:t>
+              <a:t>01/02/2023</a:t>
             </a:fld>
             <a:endParaRPr lang="en-GB"/>
           </a:p>
@@ -12105,7 +12135,7 @@
           <a:p>
             <a:fld id="{E85DF616-B21E-4EF6-A6A5-95E2FB3EB1A1}" type="datetimeFigureOut">
               <a:rPr lang="en-GB" smtClean="0"/>
-              <a:t>27/01/2023</a:t>
+              <a:t>01/02/2023</a:t>
             </a:fld>
             <a:endParaRPr lang="en-GB"/>
           </a:p>
@@ -12520,7 +12550,7 @@
           <a:p>
             <a:fld id="{E85DF616-B21E-4EF6-A6A5-95E2FB3EB1A1}" type="datetimeFigureOut">
               <a:rPr lang="en-GB" smtClean="0"/>
-              <a:t>27/01/2023</a:t>
+              <a:t>01/02/2023</a:t>
             </a:fld>
             <a:endParaRPr lang="en-GB"/>
           </a:p>
@@ -12662,7 +12692,7 @@
           <a:p>
             <a:fld id="{E85DF616-B21E-4EF6-A6A5-95E2FB3EB1A1}" type="datetimeFigureOut">
               <a:rPr lang="en-GB" smtClean="0"/>
-              <a:t>27/01/2023</a:t>
+              <a:t>01/02/2023</a:t>
             </a:fld>
             <a:endParaRPr lang="en-GB"/>
           </a:p>
@@ -12775,7 +12805,7 @@
           <a:p>
             <a:fld id="{E85DF616-B21E-4EF6-A6A5-95E2FB3EB1A1}" type="datetimeFigureOut">
               <a:rPr lang="en-GB" smtClean="0"/>
-              <a:t>27/01/2023</a:t>
+              <a:t>01/02/2023</a:t>
             </a:fld>
             <a:endParaRPr lang="en-GB"/>
           </a:p>
@@ -13088,7 +13118,7 @@
           <a:p>
             <a:fld id="{E85DF616-B21E-4EF6-A6A5-95E2FB3EB1A1}" type="datetimeFigureOut">
               <a:rPr lang="en-GB" smtClean="0"/>
-              <a:t>27/01/2023</a:t>
+              <a:t>01/02/2023</a:t>
             </a:fld>
             <a:endParaRPr lang="en-GB"/>
           </a:p>
@@ -13377,7 +13407,7 @@
           <a:p>
             <a:fld id="{E85DF616-B21E-4EF6-A6A5-95E2FB3EB1A1}" type="datetimeFigureOut">
               <a:rPr lang="en-GB" smtClean="0"/>
-              <a:t>27/01/2023</a:t>
+              <a:t>01/02/2023</a:t>
             </a:fld>
             <a:endParaRPr lang="en-GB"/>
           </a:p>
@@ -13620,7 +13650,7 @@
           <a:p>
             <a:fld id="{E85DF616-B21E-4EF6-A6A5-95E2FB3EB1A1}" type="datetimeFigureOut">
               <a:rPr lang="en-GB" smtClean="0"/>
-              <a:t>27/01/2023</a:t>
+              <a:t>01/02/2023</a:t>
             </a:fld>
             <a:endParaRPr lang="en-GB"/>
           </a:p>
@@ -23625,7 +23655,7 @@
             </a:r>
             <a:r>
               <a:rPr lang="en-GB" dirty="0"/>
-              <a:t> values as regularization</a:t>
+              <a:t> values as regularization.</a:t>
             </a:r>
           </a:p>
           <a:p>
@@ -24816,8 +24846,8 @@
           </a:p>
         </p:txBody>
       </p:sp>
-      <mc:AlternateContent xmlns:mc="http://schemas.openxmlformats.org/markup-compatibility/2006" xmlns:a14="http://schemas.microsoft.com/office/drawing/2010/main">
-        <mc:Choice Requires="a14">
+      <mc:AlternateContent xmlns:mc="http://schemas.openxmlformats.org/markup-compatibility/2006">
+        <mc:Choice xmlns:a14="http://schemas.microsoft.com/office/drawing/2010/main" Requires="a14">
           <p:sp>
             <p:nvSpPr>
               <p:cNvPr id="3" name="Content Placeholder 2">
@@ -25287,13 +25317,7 @@
                             <a:rPr lang="en-GB" b="0" i="0" smtClean="0">
                               <a:latin typeface="Cambria Math" panose="02040503050406030204" pitchFamily="18" charset="0"/>
                             </a:rPr>
-                            <m:t>m</m:t>
-                          </m:r>
-                          <m:r>
-                            <a:rPr lang="en-GB" b="0" i="1" smtClean="0">
-                              <a:latin typeface="Cambria Math" panose="02040503050406030204" pitchFamily="18" charset="0"/>
-                            </a:rPr>
-                            <m:t>𝑖𝑛</m:t>
+                            <m:t>min</m:t>
                           </m:r>
                         </m:e>
                         <m:lim>
@@ -25387,7 +25411,7 @@
             </p:txBody>
           </p:sp>
         </mc:Choice>
-        <mc:Fallback xmlns="">
+        <mc:Fallback>
           <p:sp>
             <p:nvSpPr>
               <p:cNvPr id="3" name="Content Placeholder 2">
@@ -25795,8 +25819,8 @@
           </a:p>
         </p:txBody>
       </p:sp>
-      <mc:AlternateContent xmlns:mc="http://schemas.openxmlformats.org/markup-compatibility/2006" xmlns:a14="http://schemas.microsoft.com/office/drawing/2010/main">
-        <mc:Choice Requires="a14">
+      <mc:AlternateContent xmlns:mc="http://schemas.openxmlformats.org/markup-compatibility/2006">
+        <mc:Choice xmlns:a14="http://schemas.microsoft.com/office/drawing/2010/main" Requires="a14">
           <p:sp>
             <p:nvSpPr>
               <p:cNvPr id="3" name="Content Placeholder 2">
@@ -26057,139 +26081,11 @@
                         </m:r>
                       </m:sub>
                     </m:sSub>
-                    <m:r>
-                      <a:rPr lang="en-GB" b="0" i="0" dirty="0" smtClean="0">
-                        <a:latin typeface="Cambria Math" panose="02040503050406030204" pitchFamily="18" charset="0"/>
-                      </a:rPr>
-                      <m:t>=</m:t>
-                    </m:r>
-                    <m:d>
-                      <m:dPr>
-                        <m:ctrlPr>
-                          <a:rPr lang="en-GB" b="0" i="1" dirty="0" smtClean="0">
-                            <a:latin typeface="Cambria Math" panose="02040503050406030204" pitchFamily="18" charset="0"/>
-                          </a:rPr>
-                        </m:ctrlPr>
-                      </m:dPr>
-                      <m:e>
-                        <m:sSubSup>
-                          <m:sSubSupPr>
-                            <m:ctrlPr>
-                              <a:rPr lang="en-GB" b="0" i="1" dirty="0" smtClean="0">
-                                <a:latin typeface="Cambria Math" panose="02040503050406030204" pitchFamily="18" charset="0"/>
-                              </a:rPr>
-                            </m:ctrlPr>
-                          </m:sSubSupPr>
-                          <m:e>
-                            <m:r>
-                              <a:rPr lang="en-GB" i="1" dirty="0">
-                                <a:latin typeface="Cambria Math" panose="02040503050406030204" pitchFamily="18" charset="0"/>
-                              </a:rPr>
-                              <m:t>𝑥</m:t>
-                            </m:r>
-                          </m:e>
-                          <m:sub>
-                            <m:r>
-                              <a:rPr lang="en-GB" i="1" dirty="0">
-                                <a:latin typeface="Cambria Math" panose="02040503050406030204" pitchFamily="18" charset="0"/>
-                              </a:rPr>
-                              <m:t>𝑖</m:t>
-                            </m:r>
-                          </m:sub>
-                          <m:sup>
-                            <m:r>
-                              <a:rPr lang="en-GB" b="0" i="1" dirty="0" smtClean="0">
-                                <a:latin typeface="Cambria Math" panose="02040503050406030204" pitchFamily="18" charset="0"/>
-                              </a:rPr>
-                              <m:t>1</m:t>
-                            </m:r>
-                          </m:sup>
-                        </m:sSubSup>
-                        <m:r>
-                          <a:rPr lang="en-GB" b="0" i="1" dirty="0" smtClean="0">
-                            <a:latin typeface="Cambria Math" panose="02040503050406030204" pitchFamily="18" charset="0"/>
-                          </a:rPr>
-                          <m:t>,</m:t>
-                        </m:r>
-                        <m:sSubSup>
-                          <m:sSubSupPr>
-                            <m:ctrlPr>
-                              <a:rPr lang="en-GB" b="0" i="1" dirty="0" smtClean="0">
-                                <a:latin typeface="Cambria Math" panose="02040503050406030204" pitchFamily="18" charset="0"/>
-                              </a:rPr>
-                            </m:ctrlPr>
-                          </m:sSubSupPr>
-                          <m:e>
-                            <m:r>
-                              <a:rPr lang="en-GB" i="1" dirty="0">
-                                <a:latin typeface="Cambria Math" panose="02040503050406030204" pitchFamily="18" charset="0"/>
-                              </a:rPr>
-                              <m:t>𝑥</m:t>
-                            </m:r>
-                          </m:e>
-                          <m:sub>
-                            <m:r>
-                              <a:rPr lang="en-GB" i="1" dirty="0">
-                                <a:latin typeface="Cambria Math" panose="02040503050406030204" pitchFamily="18" charset="0"/>
-                              </a:rPr>
-                              <m:t>𝑖</m:t>
-                            </m:r>
-                          </m:sub>
-                          <m:sup>
-                            <m:r>
-                              <a:rPr lang="en-GB" b="0" i="1" dirty="0" smtClean="0">
-                                <a:latin typeface="Cambria Math" panose="02040503050406030204" pitchFamily="18" charset="0"/>
-                              </a:rPr>
-                              <m:t>2</m:t>
-                            </m:r>
-                          </m:sup>
-                        </m:sSubSup>
-                        <m:r>
-                          <a:rPr lang="en-GB" b="0" i="1" dirty="0" smtClean="0">
-                            <a:latin typeface="Cambria Math" panose="02040503050406030204" pitchFamily="18" charset="0"/>
-                          </a:rPr>
-                          <m:t>,…,</m:t>
-                        </m:r>
-                        <m:sSubSup>
-                          <m:sSubSupPr>
-                            <m:ctrlPr>
-                              <a:rPr lang="en-GB" b="0" i="1" dirty="0" smtClean="0">
-                                <a:latin typeface="Cambria Math" panose="02040503050406030204" pitchFamily="18" charset="0"/>
-                              </a:rPr>
-                            </m:ctrlPr>
-                          </m:sSubSupPr>
-                          <m:e>
-                            <m:r>
-                              <a:rPr lang="en-GB" i="1" dirty="0">
-                                <a:latin typeface="Cambria Math" panose="02040503050406030204" pitchFamily="18" charset="0"/>
-                              </a:rPr>
-                              <m:t>𝑥</m:t>
-                            </m:r>
-                          </m:e>
-                          <m:sub>
-                            <m:r>
-                              <a:rPr lang="en-GB" i="1" dirty="0">
-                                <a:latin typeface="Cambria Math" panose="02040503050406030204" pitchFamily="18" charset="0"/>
-                              </a:rPr>
-                              <m:t>𝑖</m:t>
-                            </m:r>
-                          </m:sub>
-                          <m:sup>
-                            <m:r>
-                              <a:rPr lang="en-GB" b="0" i="1" dirty="0" smtClean="0">
-                                <a:latin typeface="Cambria Math" panose="02040503050406030204" pitchFamily="18" charset="0"/>
-                              </a:rPr>
-                              <m:t>𝐾</m:t>
-                            </m:r>
-                          </m:sup>
-                        </m:sSubSup>
-                      </m:e>
-                    </m:d>
                   </m:oMath>
                 </a14:m>
                 <a:r>
                   <a:rPr lang="en-GB" dirty="0"/>
-                  <a:t> to its respective output </a:t>
+                  <a:t> (e.g. the surface only) to its respective output </a:t>
                 </a:r>
                 <a14:m>
                   <m:oMath xmlns:m="http://schemas.openxmlformats.org/officeDocument/2006/math">
@@ -26222,7 +26118,21 @@
                 </a14:m>
                 <a:r>
                   <a:rPr lang="en-GB" dirty="0"/>
-                  <a:t>, with the following equation:</a:t>
+                  <a:t>, with the some sort of polynomial equation with degree </a:t>
+                </a:r>
+                <a14:m>
+                  <m:oMath xmlns:m="http://schemas.openxmlformats.org/officeDocument/2006/math">
+                    <m:r>
+                      <a:rPr lang="en-GB" i="1" dirty="0" smtClean="0">
+                        <a:latin typeface="Cambria Math" panose="02040503050406030204" pitchFamily="18" charset="0"/>
+                      </a:rPr>
+                      <m:t>𝐾</m:t>
+                    </m:r>
+                  </m:oMath>
+                </a14:m>
+                <a:r>
+                  <a:rPr lang="en-GB" dirty="0"/>
+                  <a:t>:</a:t>
                 </a:r>
               </a:p>
               <a:p>
@@ -26418,7 +26328,7 @@
             </p:txBody>
           </p:sp>
         </mc:Choice>
-        <mc:Fallback xmlns="">
+        <mc:Fallback>
           <p:sp>
             <p:nvSpPr>
               <p:cNvPr id="3" name="Content Placeholder 2">

</xml_diff>

<commit_message>
Minor changes to Week 1 and Syllabus.
</commit_message>
<xml_diff>
--- a/W1/2. W1S2 final/W1S2.pptx
+++ b/W1/2. W1S2 final/W1S2.pptx
@@ -19,37 +19,37 @@
     <p:sldId id="478" r:id="rId10"/>
     <p:sldId id="534" r:id="rId11"/>
     <p:sldId id="479" r:id="rId12"/>
-    <p:sldId id="481" r:id="rId13"/>
-    <p:sldId id="480" r:id="rId14"/>
-    <p:sldId id="482" r:id="rId15"/>
-    <p:sldId id="483" r:id="rId16"/>
-    <p:sldId id="484" r:id="rId17"/>
-    <p:sldId id="485" r:id="rId18"/>
-    <p:sldId id="486" r:id="rId19"/>
-    <p:sldId id="487" r:id="rId20"/>
-    <p:sldId id="488" r:id="rId21"/>
-    <p:sldId id="489" r:id="rId22"/>
-    <p:sldId id="490" r:id="rId23"/>
-    <p:sldId id="536" r:id="rId24"/>
-    <p:sldId id="491" r:id="rId25"/>
-    <p:sldId id="492" r:id="rId26"/>
-    <p:sldId id="493" r:id="rId27"/>
-    <p:sldId id="494" r:id="rId28"/>
-    <p:sldId id="411" r:id="rId29"/>
-    <p:sldId id="495" r:id="rId30"/>
-    <p:sldId id="496" r:id="rId31"/>
-    <p:sldId id="497" r:id="rId32"/>
-    <p:sldId id="498" r:id="rId33"/>
-    <p:sldId id="499" r:id="rId34"/>
-    <p:sldId id="500" r:id="rId35"/>
-    <p:sldId id="537" r:id="rId36"/>
-    <p:sldId id="501" r:id="rId37"/>
-    <p:sldId id="502" r:id="rId38"/>
-    <p:sldId id="412" r:id="rId39"/>
-    <p:sldId id="508" r:id="rId40"/>
-    <p:sldId id="503" r:id="rId41"/>
-    <p:sldId id="504" r:id="rId42"/>
-    <p:sldId id="506" r:id="rId43"/>
+    <p:sldId id="480" r:id="rId13"/>
+    <p:sldId id="482" r:id="rId14"/>
+    <p:sldId id="483" r:id="rId15"/>
+    <p:sldId id="484" r:id="rId16"/>
+    <p:sldId id="485" r:id="rId17"/>
+    <p:sldId id="486" r:id="rId18"/>
+    <p:sldId id="487" r:id="rId19"/>
+    <p:sldId id="488" r:id="rId20"/>
+    <p:sldId id="489" r:id="rId21"/>
+    <p:sldId id="490" r:id="rId22"/>
+    <p:sldId id="536" r:id="rId23"/>
+    <p:sldId id="491" r:id="rId24"/>
+    <p:sldId id="492" r:id="rId25"/>
+    <p:sldId id="493" r:id="rId26"/>
+    <p:sldId id="494" r:id="rId27"/>
+    <p:sldId id="411" r:id="rId28"/>
+    <p:sldId id="495" r:id="rId29"/>
+    <p:sldId id="496" r:id="rId30"/>
+    <p:sldId id="497" r:id="rId31"/>
+    <p:sldId id="498" r:id="rId32"/>
+    <p:sldId id="499" r:id="rId33"/>
+    <p:sldId id="500" r:id="rId34"/>
+    <p:sldId id="537" r:id="rId35"/>
+    <p:sldId id="501" r:id="rId36"/>
+    <p:sldId id="502" r:id="rId37"/>
+    <p:sldId id="412" r:id="rId38"/>
+    <p:sldId id="508" r:id="rId39"/>
+    <p:sldId id="503" r:id="rId40"/>
+    <p:sldId id="504" r:id="rId41"/>
+    <p:sldId id="506" r:id="rId42"/>
+    <p:sldId id="538" r:id="rId43"/>
     <p:sldId id="505" r:id="rId44"/>
     <p:sldId id="535" r:id="rId45"/>
   </p:sldIdLst>
@@ -174,7 +174,6 @@
             <p14:sldId id="478"/>
             <p14:sldId id="534"/>
             <p14:sldId id="479"/>
-            <p14:sldId id="481"/>
             <p14:sldId id="480"/>
             <p14:sldId id="482"/>
             <p14:sldId id="483"/>
@@ -217,6 +216,7 @@
             <p14:sldId id="503"/>
             <p14:sldId id="504"/>
             <p14:sldId id="506"/>
+            <p14:sldId id="538"/>
             <p14:sldId id="505"/>
             <p14:sldId id="535"/>
           </p14:sldIdLst>
@@ -239,13 +239,323 @@
 <file path=ppt/revisionInfo.xml><?xml version="1.0" encoding="utf-8"?>
 <p1510:revInfo xmlns:a="http://schemas.openxmlformats.org/drawingml/2006/main" xmlns:r="http://schemas.openxmlformats.org/officeDocument/2006/relationships" xmlns:p1510="http://schemas.microsoft.com/office/powerpoint/2015/10/main">
   <p1510:revLst>
-    <p1510:client id="{28E2199D-9457-4338-8406-CD2B7F42C7B6}" v="198" dt="2023-06-15T08:24:06.644"/>
+    <p1510:client id="{2AD250E2-609D-44C9-A6CB-54091931272C}" v="17" dt="2024-01-18T07:58:25.791"/>
   </p1510:revLst>
 </p1510:revInfo>
 </file>
 
 <file path=ppt/changesInfos/changesInfo1.xml><?xml version="1.0" encoding="utf-8"?>
 <pc:chgInfo xmlns:a="http://schemas.openxmlformats.org/drawingml/2006/main" xmlns:r="http://schemas.openxmlformats.org/officeDocument/2006/relationships" xmlns:ac="http://schemas.microsoft.com/office/drawing/2013/main/command" xmlns:pc="http://schemas.microsoft.com/office/powerpoint/2013/main/command">
+  <pc:docChgLst>
+    <pc:chgData name="Matthieu De Mari" userId="dfb708c9-d8dc-439f-9a3b-c772bf4a311c" providerId="ADAL" clId="{2AD250E2-609D-44C9-A6CB-54091931272C}"/>
+    <pc:docChg chg="custSel addSld delSld modSld modSection">
+      <pc:chgData name="Matthieu De Mari" userId="dfb708c9-d8dc-439f-9a3b-c772bf4a311c" providerId="ADAL" clId="{2AD250E2-609D-44C9-A6CB-54091931272C}" dt="2024-01-18T07:59:24.286" v="295" actId="20577"/>
+      <pc:docMkLst>
+        <pc:docMk/>
+      </pc:docMkLst>
+      <pc:sldChg chg="modSp mod">
+        <pc:chgData name="Matthieu De Mari" userId="dfb708c9-d8dc-439f-9a3b-c772bf4a311c" providerId="ADAL" clId="{2AD250E2-609D-44C9-A6CB-54091931272C}" dt="2024-01-18T07:47:22.029" v="9" actId="20577"/>
+        <pc:sldMkLst>
+          <pc:docMk/>
+          <pc:sldMk cId="1268927889" sldId="477"/>
+        </pc:sldMkLst>
+        <pc:spChg chg="mod">
+          <ac:chgData name="Matthieu De Mari" userId="dfb708c9-d8dc-439f-9a3b-c772bf4a311c" providerId="ADAL" clId="{2AD250E2-609D-44C9-A6CB-54091931272C}" dt="2024-01-18T07:47:22.029" v="9" actId="20577"/>
+          <ac:spMkLst>
+            <pc:docMk/>
+            <pc:sldMk cId="1268927889" sldId="477"/>
+            <ac:spMk id="3" creationId="{09ACEEFD-8460-F540-F80C-BEACC2297773}"/>
+          </ac:spMkLst>
+        </pc:spChg>
+      </pc:sldChg>
+      <pc:sldChg chg="modSp mod">
+        <pc:chgData name="Matthieu De Mari" userId="dfb708c9-d8dc-439f-9a3b-c772bf4a311c" providerId="ADAL" clId="{2AD250E2-609D-44C9-A6CB-54091931272C}" dt="2024-01-18T07:48:03.495" v="16" actId="20577"/>
+        <pc:sldMkLst>
+          <pc:docMk/>
+          <pc:sldMk cId="654638605" sldId="479"/>
+        </pc:sldMkLst>
+        <pc:spChg chg="mod">
+          <ac:chgData name="Matthieu De Mari" userId="dfb708c9-d8dc-439f-9a3b-c772bf4a311c" providerId="ADAL" clId="{2AD250E2-609D-44C9-A6CB-54091931272C}" dt="2024-01-18T07:48:03.495" v="16" actId="20577"/>
+          <ac:spMkLst>
+            <pc:docMk/>
+            <pc:sldMk cId="654638605" sldId="479"/>
+            <ac:spMk id="3" creationId="{09ACEEFD-8460-F540-F80C-BEACC2297773}"/>
+          </ac:spMkLst>
+        </pc:spChg>
+      </pc:sldChg>
+      <pc:sldChg chg="del">
+        <pc:chgData name="Matthieu De Mari" userId="dfb708c9-d8dc-439f-9a3b-c772bf4a311c" providerId="ADAL" clId="{2AD250E2-609D-44C9-A6CB-54091931272C}" dt="2024-01-18T07:48:11.097" v="17" actId="47"/>
+        <pc:sldMkLst>
+          <pc:docMk/>
+          <pc:sldMk cId="204189001" sldId="481"/>
+        </pc:sldMkLst>
+      </pc:sldChg>
+      <pc:sldChg chg="modSp mod">
+        <pc:chgData name="Matthieu De Mari" userId="dfb708c9-d8dc-439f-9a3b-c772bf4a311c" providerId="ADAL" clId="{2AD250E2-609D-44C9-A6CB-54091931272C}" dt="2024-01-18T07:48:41.103" v="25" actId="20577"/>
+        <pc:sldMkLst>
+          <pc:docMk/>
+          <pc:sldMk cId="3819655263" sldId="482"/>
+        </pc:sldMkLst>
+        <pc:spChg chg="mod">
+          <ac:chgData name="Matthieu De Mari" userId="dfb708c9-d8dc-439f-9a3b-c772bf4a311c" providerId="ADAL" clId="{2AD250E2-609D-44C9-A6CB-54091931272C}" dt="2024-01-18T07:48:41.103" v="25" actId="20577"/>
+          <ac:spMkLst>
+            <pc:docMk/>
+            <pc:sldMk cId="3819655263" sldId="482"/>
+            <ac:spMk id="8" creationId="{5BEF22B4-109D-679B-56C6-BF8C9EA81DAD}"/>
+          </ac:spMkLst>
+        </pc:spChg>
+      </pc:sldChg>
+      <pc:sldChg chg="modSp mod">
+        <pc:chgData name="Matthieu De Mari" userId="dfb708c9-d8dc-439f-9a3b-c772bf4a311c" providerId="ADAL" clId="{2AD250E2-609D-44C9-A6CB-54091931272C}" dt="2024-01-18T07:49:02.207" v="28" actId="403"/>
+        <pc:sldMkLst>
+          <pc:docMk/>
+          <pc:sldMk cId="2636494545" sldId="485"/>
+        </pc:sldMkLst>
+        <pc:spChg chg="mod">
+          <ac:chgData name="Matthieu De Mari" userId="dfb708c9-d8dc-439f-9a3b-c772bf4a311c" providerId="ADAL" clId="{2AD250E2-609D-44C9-A6CB-54091931272C}" dt="2024-01-18T07:49:02.207" v="28" actId="403"/>
+          <ac:spMkLst>
+            <pc:docMk/>
+            <pc:sldMk cId="2636494545" sldId="485"/>
+            <ac:spMk id="11" creationId="{CB693548-F6EE-8552-D1CD-B1EEB33BC591}"/>
+          </ac:spMkLst>
+        </pc:spChg>
+      </pc:sldChg>
+      <pc:sldChg chg="modSp mod">
+        <pc:chgData name="Matthieu De Mari" userId="dfb708c9-d8dc-439f-9a3b-c772bf4a311c" providerId="ADAL" clId="{2AD250E2-609D-44C9-A6CB-54091931272C}" dt="2024-01-18T07:49:11.535" v="33" actId="14100"/>
+        <pc:sldMkLst>
+          <pc:docMk/>
+          <pc:sldMk cId="4187092969" sldId="486"/>
+        </pc:sldMkLst>
+        <pc:spChg chg="mod">
+          <ac:chgData name="Matthieu De Mari" userId="dfb708c9-d8dc-439f-9a3b-c772bf4a311c" providerId="ADAL" clId="{2AD250E2-609D-44C9-A6CB-54091931272C}" dt="2024-01-18T07:49:11.535" v="33" actId="14100"/>
+          <ac:spMkLst>
+            <pc:docMk/>
+            <pc:sldMk cId="4187092969" sldId="486"/>
+            <ac:spMk id="11" creationId="{CB693548-F6EE-8552-D1CD-B1EEB33BC591}"/>
+          </ac:spMkLst>
+        </pc:spChg>
+      </pc:sldChg>
+      <pc:sldChg chg="addSp delSp modSp mod">
+        <pc:chgData name="Matthieu De Mari" userId="dfb708c9-d8dc-439f-9a3b-c772bf4a311c" providerId="ADAL" clId="{2AD250E2-609D-44C9-A6CB-54091931272C}" dt="2024-01-18T07:49:29.360" v="39" actId="1076"/>
+        <pc:sldMkLst>
+          <pc:docMk/>
+          <pc:sldMk cId="990517089" sldId="487"/>
+        </pc:sldMkLst>
+        <pc:spChg chg="mod">
+          <ac:chgData name="Matthieu De Mari" userId="dfb708c9-d8dc-439f-9a3b-c772bf4a311c" providerId="ADAL" clId="{2AD250E2-609D-44C9-A6CB-54091931272C}" dt="2024-01-18T07:49:29.360" v="39" actId="1076"/>
+          <ac:spMkLst>
+            <pc:docMk/>
+            <pc:sldMk cId="990517089" sldId="487"/>
+            <ac:spMk id="4" creationId="{4B4E71BC-3287-380C-4F01-48894A35A32B}"/>
+          </ac:spMkLst>
+        </pc:spChg>
+        <pc:spChg chg="add mod">
+          <ac:chgData name="Matthieu De Mari" userId="dfb708c9-d8dc-439f-9a3b-c772bf4a311c" providerId="ADAL" clId="{2AD250E2-609D-44C9-A6CB-54091931272C}" dt="2024-01-18T07:49:22.753" v="35"/>
+          <ac:spMkLst>
+            <pc:docMk/>
+            <pc:sldMk cId="990517089" sldId="487"/>
+            <ac:spMk id="5" creationId="{EE0568AC-DCA0-63B7-9EE3-65ABDDC04E97}"/>
+          </ac:spMkLst>
+        </pc:spChg>
+        <pc:spChg chg="del">
+          <ac:chgData name="Matthieu De Mari" userId="dfb708c9-d8dc-439f-9a3b-c772bf4a311c" providerId="ADAL" clId="{2AD250E2-609D-44C9-A6CB-54091931272C}" dt="2024-01-18T07:49:22.336" v="34" actId="478"/>
+          <ac:spMkLst>
+            <pc:docMk/>
+            <pc:sldMk cId="990517089" sldId="487"/>
+            <ac:spMk id="11" creationId="{CB693548-F6EE-8552-D1CD-B1EEB33BC591}"/>
+          </ac:spMkLst>
+        </pc:spChg>
+      </pc:sldChg>
+      <pc:sldChg chg="modSp mod">
+        <pc:chgData name="Matthieu De Mari" userId="dfb708c9-d8dc-439f-9a3b-c772bf4a311c" providerId="ADAL" clId="{2AD250E2-609D-44C9-A6CB-54091931272C}" dt="2024-01-18T07:49:56.252" v="57" actId="20577"/>
+        <pc:sldMkLst>
+          <pc:docMk/>
+          <pc:sldMk cId="658215501" sldId="489"/>
+        </pc:sldMkLst>
+        <pc:spChg chg="mod">
+          <ac:chgData name="Matthieu De Mari" userId="dfb708c9-d8dc-439f-9a3b-c772bf4a311c" providerId="ADAL" clId="{2AD250E2-609D-44C9-A6CB-54091931272C}" dt="2024-01-18T07:49:56.252" v="57" actId="20577"/>
+          <ac:spMkLst>
+            <pc:docMk/>
+            <pc:sldMk cId="658215501" sldId="489"/>
+            <ac:spMk id="6" creationId="{3FF27FA6-234D-EB6E-7AD4-4E52F151A639}"/>
+          </ac:spMkLst>
+        </pc:spChg>
+      </pc:sldChg>
+      <pc:sldChg chg="modSp mod">
+        <pc:chgData name="Matthieu De Mari" userId="dfb708c9-d8dc-439f-9a3b-c772bf4a311c" providerId="ADAL" clId="{2AD250E2-609D-44C9-A6CB-54091931272C}" dt="2024-01-18T07:50:04.591" v="58"/>
+        <pc:sldMkLst>
+          <pc:docMk/>
+          <pc:sldMk cId="1974002731" sldId="490"/>
+        </pc:sldMkLst>
+        <pc:spChg chg="mod">
+          <ac:chgData name="Matthieu De Mari" userId="dfb708c9-d8dc-439f-9a3b-c772bf4a311c" providerId="ADAL" clId="{2AD250E2-609D-44C9-A6CB-54091931272C}" dt="2024-01-18T07:50:04.591" v="58"/>
+          <ac:spMkLst>
+            <pc:docMk/>
+            <pc:sldMk cId="1974002731" sldId="490"/>
+            <ac:spMk id="6" creationId="{3FF27FA6-234D-EB6E-7AD4-4E52F151A639}"/>
+          </ac:spMkLst>
+        </pc:spChg>
+      </pc:sldChg>
+      <pc:sldChg chg="modSp mod">
+        <pc:chgData name="Matthieu De Mari" userId="dfb708c9-d8dc-439f-9a3b-c772bf4a311c" providerId="ADAL" clId="{2AD250E2-609D-44C9-A6CB-54091931272C}" dt="2024-01-18T07:50:42.119" v="123" actId="20577"/>
+        <pc:sldMkLst>
+          <pc:docMk/>
+          <pc:sldMk cId="1249800631" sldId="492"/>
+        </pc:sldMkLst>
+        <pc:spChg chg="mod">
+          <ac:chgData name="Matthieu De Mari" userId="dfb708c9-d8dc-439f-9a3b-c772bf4a311c" providerId="ADAL" clId="{2AD250E2-609D-44C9-A6CB-54091931272C}" dt="2024-01-18T07:50:42.119" v="123" actId="20577"/>
+          <ac:spMkLst>
+            <pc:docMk/>
+            <pc:sldMk cId="1249800631" sldId="492"/>
+            <ac:spMk id="2" creationId="{37C84060-31A2-3AFB-B38D-81D7652356D5}"/>
+          </ac:spMkLst>
+        </pc:spChg>
+      </pc:sldChg>
+      <pc:sldChg chg="modSp mod">
+        <pc:chgData name="Matthieu De Mari" userId="dfb708c9-d8dc-439f-9a3b-c772bf4a311c" providerId="ADAL" clId="{2AD250E2-609D-44C9-A6CB-54091931272C}" dt="2024-01-18T07:51:39.088" v="215" actId="20577"/>
+        <pc:sldMkLst>
+          <pc:docMk/>
+          <pc:sldMk cId="2138921819" sldId="493"/>
+        </pc:sldMkLst>
+        <pc:spChg chg="mod">
+          <ac:chgData name="Matthieu De Mari" userId="dfb708c9-d8dc-439f-9a3b-c772bf4a311c" providerId="ADAL" clId="{2AD250E2-609D-44C9-A6CB-54091931272C}" dt="2024-01-18T07:51:39.088" v="215" actId="20577"/>
+          <ac:spMkLst>
+            <pc:docMk/>
+            <pc:sldMk cId="2138921819" sldId="493"/>
+            <ac:spMk id="3" creationId="{420487D3-EA12-DF6F-4A31-967FCF611809}"/>
+          </ac:spMkLst>
+        </pc:spChg>
+      </pc:sldChg>
+      <pc:sldChg chg="modSp mod">
+        <pc:chgData name="Matthieu De Mari" userId="dfb708c9-d8dc-439f-9a3b-c772bf4a311c" providerId="ADAL" clId="{2AD250E2-609D-44C9-A6CB-54091931272C}" dt="2024-01-18T07:52:49.317" v="218" actId="1076"/>
+        <pc:sldMkLst>
+          <pc:docMk/>
+          <pc:sldMk cId="2678082427" sldId="499"/>
+        </pc:sldMkLst>
+        <pc:spChg chg="mod">
+          <ac:chgData name="Matthieu De Mari" userId="dfb708c9-d8dc-439f-9a3b-c772bf4a311c" providerId="ADAL" clId="{2AD250E2-609D-44C9-A6CB-54091931272C}" dt="2024-01-18T07:52:49.317" v="218" actId="1076"/>
+          <ac:spMkLst>
+            <pc:docMk/>
+            <pc:sldMk cId="2678082427" sldId="499"/>
+            <ac:spMk id="6" creationId="{E104F76B-BBAC-9021-8132-85B53E4D630A}"/>
+          </ac:spMkLst>
+        </pc:spChg>
+      </pc:sldChg>
+      <pc:sldChg chg="addSp delSp modSp mod">
+        <pc:chgData name="Matthieu De Mari" userId="dfb708c9-d8dc-439f-9a3b-c772bf4a311c" providerId="ADAL" clId="{2AD250E2-609D-44C9-A6CB-54091931272C}" dt="2024-01-18T07:53:01.524" v="223" actId="1076"/>
+        <pc:sldMkLst>
+          <pc:docMk/>
+          <pc:sldMk cId="2304872241" sldId="500"/>
+        </pc:sldMkLst>
+        <pc:spChg chg="mod">
+          <ac:chgData name="Matthieu De Mari" userId="dfb708c9-d8dc-439f-9a3b-c772bf4a311c" providerId="ADAL" clId="{2AD250E2-609D-44C9-A6CB-54091931272C}" dt="2024-01-18T07:53:01.524" v="223" actId="1076"/>
+          <ac:spMkLst>
+            <pc:docMk/>
+            <pc:sldMk cId="2304872241" sldId="500"/>
+            <ac:spMk id="3" creationId="{3E99D0FB-50CA-AAC3-96C1-58557976DF48}"/>
+          </ac:spMkLst>
+        </pc:spChg>
+        <pc:spChg chg="add mod">
+          <ac:chgData name="Matthieu De Mari" userId="dfb708c9-d8dc-439f-9a3b-c772bf4a311c" providerId="ADAL" clId="{2AD250E2-609D-44C9-A6CB-54091931272C}" dt="2024-01-18T07:52:56.354" v="220"/>
+          <ac:spMkLst>
+            <pc:docMk/>
+            <pc:sldMk cId="2304872241" sldId="500"/>
+            <ac:spMk id="4" creationId="{65EE1994-5E25-58AB-E291-D5D57427A351}"/>
+          </ac:spMkLst>
+        </pc:spChg>
+        <pc:spChg chg="del">
+          <ac:chgData name="Matthieu De Mari" userId="dfb708c9-d8dc-439f-9a3b-c772bf4a311c" providerId="ADAL" clId="{2AD250E2-609D-44C9-A6CB-54091931272C}" dt="2024-01-18T07:52:55.964" v="219" actId="478"/>
+          <ac:spMkLst>
+            <pc:docMk/>
+            <pc:sldMk cId="2304872241" sldId="500"/>
+            <ac:spMk id="6" creationId="{E104F76B-BBAC-9021-8132-85B53E4D630A}"/>
+          </ac:spMkLst>
+        </pc:spChg>
+      </pc:sldChg>
+      <pc:sldChg chg="modSp mod">
+        <pc:chgData name="Matthieu De Mari" userId="dfb708c9-d8dc-439f-9a3b-c772bf4a311c" providerId="ADAL" clId="{2AD250E2-609D-44C9-A6CB-54091931272C}" dt="2024-01-18T07:53:06.488" v="225" actId="403"/>
+        <pc:sldMkLst>
+          <pc:docMk/>
+          <pc:sldMk cId="2411344912" sldId="502"/>
+        </pc:sldMkLst>
+        <pc:spChg chg="mod">
+          <ac:chgData name="Matthieu De Mari" userId="dfb708c9-d8dc-439f-9a3b-c772bf4a311c" providerId="ADAL" clId="{2AD250E2-609D-44C9-A6CB-54091931272C}" dt="2024-01-18T07:53:06.488" v="225" actId="403"/>
+          <ac:spMkLst>
+            <pc:docMk/>
+            <pc:sldMk cId="2411344912" sldId="502"/>
+            <ac:spMk id="6" creationId="{E104F76B-BBAC-9021-8132-85B53E4D630A}"/>
+          </ac:spMkLst>
+        </pc:spChg>
+      </pc:sldChg>
+      <pc:sldChg chg="modSp mod">
+        <pc:chgData name="Matthieu De Mari" userId="dfb708c9-d8dc-439f-9a3b-c772bf4a311c" providerId="ADAL" clId="{2AD250E2-609D-44C9-A6CB-54091931272C}" dt="2024-01-18T07:53:28.237" v="237" actId="12"/>
+        <pc:sldMkLst>
+          <pc:docMk/>
+          <pc:sldMk cId="1636732520" sldId="503"/>
+        </pc:sldMkLst>
+        <pc:spChg chg="mod">
+          <ac:chgData name="Matthieu De Mari" userId="dfb708c9-d8dc-439f-9a3b-c772bf4a311c" providerId="ADAL" clId="{2AD250E2-609D-44C9-A6CB-54091931272C}" dt="2024-01-18T07:53:28.237" v="237" actId="12"/>
+          <ac:spMkLst>
+            <pc:docMk/>
+            <pc:sldMk cId="1636732520" sldId="503"/>
+            <ac:spMk id="4" creationId="{5E76589E-870E-419D-CF95-4309EACDB190}"/>
+          </ac:spMkLst>
+        </pc:spChg>
+      </pc:sldChg>
+      <pc:sldChg chg="addSp delSp modSp mod">
+        <pc:chgData name="Matthieu De Mari" userId="dfb708c9-d8dc-439f-9a3b-c772bf4a311c" providerId="ADAL" clId="{2AD250E2-609D-44C9-A6CB-54091931272C}" dt="2024-01-18T07:58:28.480" v="266" actId="478"/>
+        <pc:sldMkLst>
+          <pc:docMk/>
+          <pc:sldMk cId="710884314" sldId="506"/>
+        </pc:sldMkLst>
+        <pc:spChg chg="add del mod">
+          <ac:chgData name="Matthieu De Mari" userId="dfb708c9-d8dc-439f-9a3b-c772bf4a311c" providerId="ADAL" clId="{2AD250E2-609D-44C9-A6CB-54091931272C}" dt="2024-01-18T07:58:28.480" v="266" actId="478"/>
+          <ac:spMkLst>
+            <pc:docMk/>
+            <pc:sldMk cId="710884314" sldId="506"/>
+            <ac:spMk id="2" creationId="{7E8004EF-5A8C-5081-A7AD-65F92DB1C7E9}"/>
+          </ac:spMkLst>
+        </pc:spChg>
+      </pc:sldChg>
+      <pc:sldChg chg="modSp mod">
+        <pc:chgData name="Matthieu De Mari" userId="dfb708c9-d8dc-439f-9a3b-c772bf4a311c" providerId="ADAL" clId="{2AD250E2-609D-44C9-A6CB-54091931272C}" dt="2024-01-18T07:59:24.286" v="295" actId="20577"/>
+        <pc:sldMkLst>
+          <pc:docMk/>
+          <pc:sldMk cId="3607984374" sldId="535"/>
+        </pc:sldMkLst>
+        <pc:spChg chg="mod">
+          <ac:chgData name="Matthieu De Mari" userId="dfb708c9-d8dc-439f-9a3b-c772bf4a311c" providerId="ADAL" clId="{2AD250E2-609D-44C9-A6CB-54091931272C}" dt="2024-01-18T07:59:24.286" v="295" actId="20577"/>
+          <ac:spMkLst>
+            <pc:docMk/>
+            <pc:sldMk cId="3607984374" sldId="535"/>
+            <ac:spMk id="6" creationId="{035BA096-4E67-B5D5-DBD3-F226777FADC7}"/>
+          </ac:spMkLst>
+        </pc:spChg>
+      </pc:sldChg>
+      <pc:sldChg chg="modSp mod">
+        <pc:chgData name="Matthieu De Mari" userId="dfb708c9-d8dc-439f-9a3b-c772bf4a311c" providerId="ADAL" clId="{2AD250E2-609D-44C9-A6CB-54091931272C}" dt="2024-01-18T07:50:13.416" v="59"/>
+        <pc:sldMkLst>
+          <pc:docMk/>
+          <pc:sldMk cId="3487424720" sldId="536"/>
+        </pc:sldMkLst>
+        <pc:spChg chg="mod">
+          <ac:chgData name="Matthieu De Mari" userId="dfb708c9-d8dc-439f-9a3b-c772bf4a311c" providerId="ADAL" clId="{2AD250E2-609D-44C9-A6CB-54091931272C}" dt="2024-01-18T07:50:13.416" v="59"/>
+          <ac:spMkLst>
+            <pc:docMk/>
+            <pc:sldMk cId="3487424720" sldId="536"/>
+            <ac:spMk id="6" creationId="{3FF27FA6-234D-EB6E-7AD4-4E52F151A639}"/>
+          </ac:spMkLst>
+        </pc:spChg>
+      </pc:sldChg>
+      <pc:sldChg chg="add">
+        <pc:chgData name="Matthieu De Mari" userId="dfb708c9-d8dc-439f-9a3b-c772bf4a311c" providerId="ADAL" clId="{2AD250E2-609D-44C9-A6CB-54091931272C}" dt="2024-01-18T07:58:25.789" v="265"/>
+        <pc:sldMkLst>
+          <pc:docMk/>
+          <pc:sldMk cId="1671560902" sldId="538"/>
+        </pc:sldMkLst>
+      </pc:sldChg>
+    </pc:docChg>
+  </pc:docChgLst>
   <pc:docChgLst>
     <pc:chgData name="Matthieu De Mari" userId="dfb708c9-d8dc-439f-9a3b-c772bf4a311c" providerId="ADAL" clId="{8EE40018-26BD-4A7B-8D17-70AC8417C2D0}"/>
     <pc:docChg chg="undo custSel addSld delSld modSld sldOrd addSection delSection modSection">
@@ -11047,7 +11357,7 @@
           <a:p>
             <a:fld id="{61478373-EB31-4867-8CF0-FA31364748A5}" type="datetimeFigureOut">
               <a:rPr lang="en-GB" smtClean="0"/>
-              <a:t>15/06/2023</a:t>
+              <a:t>18/01/2024</a:t>
             </a:fld>
             <a:endParaRPr lang="en-GB"/>
           </a:p>
@@ -11464,7 +11774,7 @@
           <a:p>
             <a:fld id="{E85DF616-B21E-4EF6-A6A5-95E2FB3EB1A1}" type="datetimeFigureOut">
               <a:rPr lang="en-GB" smtClean="0"/>
-              <a:t>15/06/2023</a:t>
+              <a:t>18/01/2024</a:t>
             </a:fld>
             <a:endParaRPr lang="en-GB"/>
           </a:p>
@@ -11664,7 +11974,7 @@
           <a:p>
             <a:fld id="{E85DF616-B21E-4EF6-A6A5-95E2FB3EB1A1}" type="datetimeFigureOut">
               <a:rPr lang="en-GB" smtClean="0"/>
-              <a:t>15/06/2023</a:t>
+              <a:t>18/01/2024</a:t>
             </a:fld>
             <a:endParaRPr lang="en-GB"/>
           </a:p>
@@ -11874,7 +12184,7 @@
           <a:p>
             <a:fld id="{E85DF616-B21E-4EF6-A6A5-95E2FB3EB1A1}" type="datetimeFigureOut">
               <a:rPr lang="en-GB" smtClean="0"/>
-              <a:t>15/06/2023</a:t>
+              <a:t>18/01/2024</a:t>
             </a:fld>
             <a:endParaRPr lang="en-GB"/>
           </a:p>
@@ -12074,7 +12384,7 @@
           <a:p>
             <a:fld id="{E85DF616-B21E-4EF6-A6A5-95E2FB3EB1A1}" type="datetimeFigureOut">
               <a:rPr lang="en-GB" smtClean="0"/>
-              <a:t>15/06/2023</a:t>
+              <a:t>18/01/2024</a:t>
             </a:fld>
             <a:endParaRPr lang="en-GB"/>
           </a:p>
@@ -12350,7 +12660,7 @@
           <a:p>
             <a:fld id="{E85DF616-B21E-4EF6-A6A5-95E2FB3EB1A1}" type="datetimeFigureOut">
               <a:rPr lang="en-GB" smtClean="0"/>
-              <a:t>15/06/2023</a:t>
+              <a:t>18/01/2024</a:t>
             </a:fld>
             <a:endParaRPr lang="en-GB"/>
           </a:p>
@@ -12618,7 +12928,7 @@
           <a:p>
             <a:fld id="{E85DF616-B21E-4EF6-A6A5-95E2FB3EB1A1}" type="datetimeFigureOut">
               <a:rPr lang="en-GB" smtClean="0"/>
-              <a:t>15/06/2023</a:t>
+              <a:t>18/01/2024</a:t>
             </a:fld>
             <a:endParaRPr lang="en-GB"/>
           </a:p>
@@ -13033,7 +13343,7 @@
           <a:p>
             <a:fld id="{E85DF616-B21E-4EF6-A6A5-95E2FB3EB1A1}" type="datetimeFigureOut">
               <a:rPr lang="en-GB" smtClean="0"/>
-              <a:t>15/06/2023</a:t>
+              <a:t>18/01/2024</a:t>
             </a:fld>
             <a:endParaRPr lang="en-GB"/>
           </a:p>
@@ -13175,7 +13485,7 @@
           <a:p>
             <a:fld id="{E85DF616-B21E-4EF6-A6A5-95E2FB3EB1A1}" type="datetimeFigureOut">
               <a:rPr lang="en-GB" smtClean="0"/>
-              <a:t>15/06/2023</a:t>
+              <a:t>18/01/2024</a:t>
             </a:fld>
             <a:endParaRPr lang="en-GB"/>
           </a:p>
@@ -13288,7 +13598,7 @@
           <a:p>
             <a:fld id="{E85DF616-B21E-4EF6-A6A5-95E2FB3EB1A1}" type="datetimeFigureOut">
               <a:rPr lang="en-GB" smtClean="0"/>
-              <a:t>15/06/2023</a:t>
+              <a:t>18/01/2024</a:t>
             </a:fld>
             <a:endParaRPr lang="en-GB"/>
           </a:p>
@@ -13601,7 +13911,7 @@
           <a:p>
             <a:fld id="{E85DF616-B21E-4EF6-A6A5-95E2FB3EB1A1}" type="datetimeFigureOut">
               <a:rPr lang="en-GB" smtClean="0"/>
-              <a:t>15/06/2023</a:t>
+              <a:t>18/01/2024</a:t>
             </a:fld>
             <a:endParaRPr lang="en-GB"/>
           </a:p>
@@ -13890,7 +14200,7 @@
           <a:p>
             <a:fld id="{E85DF616-B21E-4EF6-A6A5-95E2FB3EB1A1}" type="datetimeFigureOut">
               <a:rPr lang="en-GB" smtClean="0"/>
-              <a:t>15/06/2023</a:t>
+              <a:t>18/01/2024</a:t>
             </a:fld>
             <a:endParaRPr lang="en-GB"/>
           </a:p>
@@ -14133,7 +14443,7 @@
           <a:p>
             <a:fld id="{E85DF616-B21E-4EF6-A6A5-95E2FB3EB1A1}" type="datetimeFigureOut">
               <a:rPr lang="en-GB" smtClean="0"/>
-              <a:t>15/06/2023</a:t>
+              <a:t>18/01/2024</a:t>
             </a:fld>
             <a:endParaRPr lang="en-GB"/>
           </a:p>
@@ -15127,8 +15437,8 @@
           </a:p>
         </p:txBody>
       </p:sp>
-      <mc:AlternateContent xmlns:mc="http://schemas.openxmlformats.org/markup-compatibility/2006" xmlns:a14="http://schemas.microsoft.com/office/drawing/2010/main">
-        <mc:Choice Requires="a14">
+      <mc:AlternateContent xmlns:mc="http://schemas.openxmlformats.org/markup-compatibility/2006">
+        <mc:Choice xmlns:a14="http://schemas.microsoft.com/office/drawing/2010/main" Requires="a14">
           <p:sp>
             <p:nvSpPr>
               <p:cNvPr id="3" name="Content Placeholder 2">
@@ -15392,13 +15702,13 @@
               <a:p>
                 <a:r>
                   <a:rPr lang="en-GB" dirty="0"/>
-                  <a:t>In addition, we will add a random noise to the final pricing, with a +/- 10% drift as before.</a:t>
+                  <a:t>In addition, we will add a random noise to the final pricing, with a random +/- 10% drift as before.</a:t>
                 </a:r>
               </a:p>
             </p:txBody>
           </p:sp>
         </mc:Choice>
-        <mc:Fallback xmlns="">
+        <mc:Fallback>
           <p:sp>
             <p:nvSpPr>
               <p:cNvPr id="3" name="Content Placeholder 2">
@@ -15423,7 +15733,7 @@
               <a:blipFill>
                 <a:blip r:embed="rId2"/>
                 <a:stretch>
-                  <a:fillRect l="-1217" t="-1937"/>
+                  <a:fillRect l="-1217" t="-1937" r="-232"/>
                 </a:stretch>
               </a:blipFill>
             </p:spPr>
@@ -15432,7 +15742,7 @@
               <a:lstStyle/>
               <a:p>
                 <a:r>
-                  <a:rPr lang="en-SG">
+                  <a:rPr lang="en-GB">
                     <a:noFill/>
                   </a:rPr>
                   <a:t> </a:t>
@@ -15501,380 +15811,6 @@
           </a:p>
         </p:txBody>
       </p:sp>
-      <mc:AlternateContent xmlns:mc="http://schemas.openxmlformats.org/markup-compatibility/2006" xmlns:a14="http://schemas.microsoft.com/office/drawing/2010/main">
-        <mc:Choice Requires="a14">
-          <p:sp>
-            <p:nvSpPr>
-              <p:cNvPr id="3" name="Content Placeholder 2">
-                <a:extLst>
-                  <a:ext uri="{FF2B5EF4-FFF2-40B4-BE49-F238E27FC236}">
-                    <a16:creationId xmlns:a16="http://schemas.microsoft.com/office/drawing/2014/main" id="{09ACEEFD-8460-F540-F80C-BEACC2297773}"/>
-                  </a:ext>
-                </a:extLst>
-              </p:cNvPr>
-              <p:cNvSpPr>
-                <a:spLocks noGrp="1"/>
-              </p:cNvSpPr>
-              <p:nvPr>
-                <p:ph idx="1"/>
-              </p:nvPr>
-            </p:nvSpPr>
-            <p:spPr>
-              <a:xfrm>
-                <a:off x="838200" y="1825624"/>
-                <a:ext cx="10515600" cy="5032375"/>
-              </a:xfrm>
-            </p:spPr>
-            <p:txBody>
-              <a:bodyPr>
-                <a:normAutofit/>
-              </a:bodyPr>
-              <a:lstStyle/>
-              <a:p>
-                <a:pPr marL="0" indent="0">
-                  <a:buNone/>
-                </a:pPr>
-                <a:r>
-                  <a:rPr lang="en-GB" dirty="0"/>
-                  <a:t>We will follow the same steps as before with linear regression, starting with a mock dataset.</a:t>
-                </a:r>
-              </a:p>
-              <a:p>
-                <a:r>
-                  <a:rPr lang="en-GB" dirty="0"/>
-                  <a:t>This will be different compared than what has been implemented in notebooks 1 and 2, as we will generate prices </a:t>
-                </a:r>
-                <a14:m>
-                  <m:oMath xmlns:m="http://schemas.openxmlformats.org/officeDocument/2006/math">
-                    <m:sSub>
-                      <m:sSubPr>
-                        <m:ctrlPr>
-                          <a:rPr lang="en-GB" i="1" dirty="0" smtClean="0">
-                            <a:latin typeface="Cambria Math" panose="02040503050406030204" pitchFamily="18" charset="0"/>
-                          </a:rPr>
-                        </m:ctrlPr>
-                      </m:sSubPr>
-                      <m:e>
-                        <m:r>
-                          <a:rPr lang="en-GB" i="1" dirty="0" smtClean="0">
-                            <a:latin typeface="Cambria Math" panose="02040503050406030204" pitchFamily="18" charset="0"/>
-                          </a:rPr>
-                          <m:t>𝑦</m:t>
-                        </m:r>
-                      </m:e>
-                      <m:sub>
-                        <m:r>
-                          <a:rPr lang="en-GB" i="1" dirty="0" smtClean="0">
-                            <a:latin typeface="Cambria Math" panose="02040503050406030204" pitchFamily="18" charset="0"/>
-                          </a:rPr>
-                          <m:t>𝑖</m:t>
-                        </m:r>
-                      </m:sub>
-                    </m:sSub>
-                  </m:oMath>
-                </a14:m>
-                <a:r>
-                  <a:rPr lang="en-GB" dirty="0"/>
-                  <a:t> as a polynomial function of the surfaces </a:t>
-                </a:r>
-                <a14:m>
-                  <m:oMath xmlns:m="http://schemas.openxmlformats.org/officeDocument/2006/math">
-                    <m:sSub>
-                      <m:sSubPr>
-                        <m:ctrlPr>
-                          <a:rPr lang="en-GB" i="1" dirty="0" smtClean="0">
-                            <a:latin typeface="Cambria Math" panose="02040503050406030204" pitchFamily="18" charset="0"/>
-                          </a:rPr>
-                        </m:ctrlPr>
-                      </m:sSubPr>
-                      <m:e>
-                        <m:r>
-                          <a:rPr lang="en-GB" i="1" dirty="0" smtClean="0">
-                            <a:latin typeface="Cambria Math" panose="02040503050406030204" pitchFamily="18" charset="0"/>
-                          </a:rPr>
-                          <m:t>𝑥</m:t>
-                        </m:r>
-                      </m:e>
-                      <m:sub>
-                        <m:r>
-                          <a:rPr lang="en-GB" i="1" dirty="0" smtClean="0">
-                            <a:latin typeface="Cambria Math" panose="02040503050406030204" pitchFamily="18" charset="0"/>
-                          </a:rPr>
-                          <m:t>𝑖</m:t>
-                        </m:r>
-                      </m:sub>
-                    </m:sSub>
-                  </m:oMath>
-                </a14:m>
-                <a:r>
-                  <a:rPr lang="en-GB" dirty="0"/>
-                  <a:t>.</a:t>
-                </a:r>
-              </a:p>
-              <a:p>
-                <a:r>
-                  <a:rPr lang="en-GB" dirty="0"/>
-                  <a:t>We will assume that the function </a:t>
-                </a:r>
-                <a14:m>
-                  <m:oMath xmlns:m="http://schemas.openxmlformats.org/officeDocument/2006/math">
-                    <m:r>
-                      <a:rPr lang="en-GB" b="0" i="1" dirty="0" smtClean="0">
-                        <a:latin typeface="Cambria Math" panose="02040503050406030204" pitchFamily="18" charset="0"/>
-                      </a:rPr>
-                      <m:t>𝑦</m:t>
-                    </m:r>
-                    <m:r>
-                      <a:rPr lang="en-GB" b="0" i="1" dirty="0" smtClean="0">
-                        <a:latin typeface="Cambria Math" panose="02040503050406030204" pitchFamily="18" charset="0"/>
-                      </a:rPr>
-                      <m:t>=</m:t>
-                    </m:r>
-                    <m:r>
-                      <a:rPr lang="en-GB" b="0" i="1" dirty="0" smtClean="0">
-                        <a:latin typeface="Cambria Math" panose="02040503050406030204" pitchFamily="18" charset="0"/>
-                      </a:rPr>
-                      <m:t>𝑓</m:t>
-                    </m:r>
-                    <m:r>
-                      <a:rPr lang="en-GB" i="1" dirty="0" smtClean="0">
-                        <a:latin typeface="Cambria Math" panose="02040503050406030204" pitchFamily="18" charset="0"/>
-                      </a:rPr>
-                      <m:t>(</m:t>
-                    </m:r>
-                    <m:r>
-                      <a:rPr lang="en-GB" i="1" dirty="0" smtClean="0">
-                        <a:latin typeface="Cambria Math" panose="02040503050406030204" pitchFamily="18" charset="0"/>
-                      </a:rPr>
-                      <m:t>𝑥</m:t>
-                    </m:r>
-                    <m:r>
-                      <a:rPr lang="en-GB" i="1" dirty="0" smtClean="0">
-                        <a:latin typeface="Cambria Math" panose="02040503050406030204" pitchFamily="18" charset="0"/>
-                      </a:rPr>
-                      <m:t>)</m:t>
-                    </m:r>
-                  </m:oMath>
-                </a14:m>
-                <a:r>
-                  <a:rPr lang="en-GB" dirty="0"/>
-                  <a:t>, giving the price of an apartment with surface </a:t>
-                </a:r>
-                <a14:m>
-                  <m:oMath xmlns:m="http://schemas.openxmlformats.org/officeDocument/2006/math">
-                    <m:r>
-                      <a:rPr lang="en-GB" i="1" dirty="0" smtClean="0">
-                        <a:latin typeface="Cambria Math" panose="02040503050406030204" pitchFamily="18" charset="0"/>
-                      </a:rPr>
-                      <m:t>𝑥</m:t>
-                    </m:r>
-                  </m:oMath>
-                </a14:m>
-                <a:r>
-                  <a:rPr lang="en-GB" dirty="0"/>
-                  <a:t>, is defined as a polynomial function with degree 3.</a:t>
-                </a:r>
-              </a:p>
-              <a:p>
-                <a:pPr marL="0" indent="0">
-                  <a:buNone/>
-                </a:pPr>
-                <a14:m>
-                  <m:oMathPara xmlns:m="http://schemas.openxmlformats.org/officeDocument/2006/math">
-                    <m:oMathParaPr>
-                      <m:jc m:val="centerGroup"/>
-                    </m:oMathParaPr>
-                    <m:oMath xmlns:m="http://schemas.openxmlformats.org/officeDocument/2006/math">
-                      <m:r>
-                        <a:rPr lang="en-GB" i="1" dirty="0" smtClean="0">
-                          <a:latin typeface="Cambria Math" panose="02040503050406030204" pitchFamily="18" charset="0"/>
-                        </a:rPr>
-                        <m:t>𝑦</m:t>
-                      </m:r>
-                      <m:r>
-                        <a:rPr lang="en-GB" i="1" dirty="0">
-                          <a:latin typeface="Cambria Math" panose="02040503050406030204" pitchFamily="18" charset="0"/>
-                        </a:rPr>
-                        <m:t>=</m:t>
-                      </m:r>
-                      <m:r>
-                        <a:rPr lang="en-GB" i="1" dirty="0" smtClean="0">
-                          <a:latin typeface="Cambria Math" panose="02040503050406030204" pitchFamily="18" charset="0"/>
-                        </a:rPr>
-                        <m:t>𝑓</m:t>
-                      </m:r>
-                      <m:r>
-                        <a:rPr lang="en-GB" i="1" dirty="0" smtClean="0">
-                          <a:latin typeface="Cambria Math" panose="02040503050406030204" pitchFamily="18" charset="0"/>
-                        </a:rPr>
-                        <m:t>(</m:t>
-                      </m:r>
-                      <m:r>
-                        <a:rPr lang="en-GB" i="1" dirty="0" smtClean="0">
-                          <a:latin typeface="Cambria Math" panose="02040503050406030204" pitchFamily="18" charset="0"/>
-                        </a:rPr>
-                        <m:t>𝑥</m:t>
-                      </m:r>
-                      <m:r>
-                        <a:rPr lang="en-GB" i="1" dirty="0" smtClean="0">
-                          <a:latin typeface="Cambria Math" panose="02040503050406030204" pitchFamily="18" charset="0"/>
-                        </a:rPr>
-                        <m:t>) = 100000 + 14373</m:t>
-                      </m:r>
-                      <m:r>
-                        <a:rPr lang="en-GB" i="1" dirty="0" smtClean="0">
-                          <a:latin typeface="Cambria Math" panose="02040503050406030204" pitchFamily="18" charset="0"/>
-                        </a:rPr>
-                        <m:t>𝑥</m:t>
-                      </m:r>
-                      <m:r>
-                        <a:rPr lang="en-GB" i="1" dirty="0" smtClean="0">
-                          <a:latin typeface="Cambria Math" panose="02040503050406030204" pitchFamily="18" charset="0"/>
-                        </a:rPr>
-                        <m:t> + 3</m:t>
-                      </m:r>
-                      <m:sSup>
-                        <m:sSupPr>
-                          <m:ctrlPr>
-                            <a:rPr lang="en-GB" i="1" dirty="0" smtClean="0">
-                              <a:latin typeface="Cambria Math" panose="02040503050406030204" pitchFamily="18" charset="0"/>
-                            </a:rPr>
-                          </m:ctrlPr>
-                        </m:sSupPr>
-                        <m:e>
-                          <m:r>
-                            <a:rPr lang="en-GB" i="1" dirty="0" smtClean="0">
-                              <a:latin typeface="Cambria Math" panose="02040503050406030204" pitchFamily="18" charset="0"/>
-                            </a:rPr>
-                            <m:t>𝑥</m:t>
-                          </m:r>
-                        </m:e>
-                        <m:sup>
-                          <m:r>
-                            <a:rPr lang="en-GB" i="1" dirty="0" smtClean="0">
-                              <a:latin typeface="Cambria Math" panose="02040503050406030204" pitchFamily="18" charset="0"/>
-                            </a:rPr>
-                            <m:t>3</m:t>
-                          </m:r>
-                        </m:sup>
-                      </m:sSup>
-                    </m:oMath>
-                  </m:oMathPara>
-                </a14:m>
-                <a:endParaRPr lang="en-GB" dirty="0"/>
-              </a:p>
-              <a:p>
-                <a:r>
-                  <a:rPr lang="en-GB" dirty="0"/>
-                  <a:t>In addition, we will add a random noise to the final pricing, with a +/- 10% drift as before.</a:t>
-                </a:r>
-              </a:p>
-            </p:txBody>
-          </p:sp>
-        </mc:Choice>
-        <mc:Fallback xmlns="">
-          <p:sp>
-            <p:nvSpPr>
-              <p:cNvPr id="3" name="Content Placeholder 2">
-                <a:extLst>
-                  <a:ext uri="{FF2B5EF4-FFF2-40B4-BE49-F238E27FC236}">
-                    <a16:creationId xmlns:a16="http://schemas.microsoft.com/office/drawing/2014/main" id="{09ACEEFD-8460-F540-F80C-BEACC2297773}"/>
-                  </a:ext>
-                </a:extLst>
-              </p:cNvPr>
-              <p:cNvSpPr>
-                <a:spLocks noGrp="1" noRot="1" noChangeAspect="1" noMove="1" noResize="1" noEditPoints="1" noAdjustHandles="1" noChangeArrowheads="1" noChangeShapeType="1" noTextEdit="1"/>
-              </p:cNvSpPr>
-              <p:nvPr>
-                <p:ph idx="1"/>
-              </p:nvPr>
-            </p:nvSpPr>
-            <p:spPr>
-              <a:xfrm>
-                <a:off x="838200" y="1825624"/>
-                <a:ext cx="10515600" cy="5032375"/>
-              </a:xfrm>
-              <a:blipFill>
-                <a:blip r:embed="rId2"/>
-                <a:stretch>
-                  <a:fillRect l="-1217" t="-1937" r="-232"/>
-                </a:stretch>
-              </a:blipFill>
-            </p:spPr>
-            <p:txBody>
-              <a:bodyPr/>
-              <a:lstStyle/>
-              <a:p>
-                <a:r>
-                  <a:rPr lang="en-SG">
-                    <a:noFill/>
-                  </a:rPr>
-                  <a:t> </a:t>
-                </a:r>
-              </a:p>
-            </p:txBody>
-          </p:sp>
-        </mc:Fallback>
-      </mc:AlternateContent>
-    </p:spTree>
-    <p:extLst>
-      <p:ext uri="{BB962C8B-B14F-4D97-AF65-F5344CB8AC3E}">
-        <p14:creationId xmlns:p14="http://schemas.microsoft.com/office/powerpoint/2010/main" val="204189001"/>
-      </p:ext>
-    </p:extLst>
-  </p:cSld>
-  <p:clrMapOvr>
-    <a:masterClrMapping/>
-  </p:clrMapOvr>
-</p:sld>
-</file>
-
-<file path=ppt/slides/slide13.xml><?xml version="1.0" encoding="utf-8"?>
-<p:sld xmlns:a="http://schemas.openxmlformats.org/drawingml/2006/main" xmlns:r="http://schemas.openxmlformats.org/officeDocument/2006/relationships" xmlns:p="http://schemas.openxmlformats.org/presentationml/2006/main">
-  <p:cSld>
-    <p:spTree>
-      <p:nvGrpSpPr>
-        <p:cNvPr id="1" name=""/>
-        <p:cNvGrpSpPr/>
-        <p:nvPr/>
-      </p:nvGrpSpPr>
-      <p:grpSpPr>
-        <a:xfrm>
-          <a:off x="0" y="0"/>
-          <a:ext cx="0" cy="0"/>
-          <a:chOff x="0" y="0"/>
-          <a:chExt cx="0" cy="0"/>
-        </a:xfrm>
-      </p:grpSpPr>
-      <p:sp>
-        <p:nvSpPr>
-          <p:cNvPr id="2" name="Title 1">
-            <a:extLst>
-              <a:ext uri="{FF2B5EF4-FFF2-40B4-BE49-F238E27FC236}">
-                <a16:creationId xmlns:a16="http://schemas.microsoft.com/office/drawing/2014/main" id="{A51540BB-97C7-1060-F5DD-F4A4417D2522}"/>
-              </a:ext>
-            </a:extLst>
-          </p:cNvPr>
-          <p:cNvSpPr>
-            <a:spLocks noGrp="1"/>
-          </p:cNvSpPr>
-          <p:nvPr>
-            <p:ph type="title"/>
-          </p:nvPr>
-        </p:nvSpPr>
-        <p:spPr/>
-        <p:txBody>
-          <a:bodyPr/>
-          <a:lstStyle/>
-          <a:p>
-            <a:r>
-              <a:rPr lang="en-GB" dirty="0"/>
-              <a:t>From Linear to Polynomial Regression</a:t>
-            </a:r>
-            <a:endParaRPr lang="en-SG" dirty="0"/>
-          </a:p>
-        </p:txBody>
-      </p:sp>
       <p:pic>
         <p:nvPicPr>
           <p:cNvPr id="7" name="Picture 6">
@@ -15918,7 +15854,7 @@
 </p:sld>
 </file>
 
-<file path=ppt/slides/slide14.xml><?xml version="1.0" encoding="utf-8"?>
+<file path=ppt/slides/slide13.xml><?xml version="1.0" encoding="utf-8"?>
 <p:sld xmlns:a="http://schemas.openxmlformats.org/drawingml/2006/main" xmlns:r="http://schemas.openxmlformats.org/officeDocument/2006/relationships" xmlns:p="http://schemas.openxmlformats.org/presentationml/2006/main">
   <p:cSld>
     <p:spTree>
@@ -15979,8 +15915,8 @@
         </p:nvSpPr>
         <p:spPr>
           <a:xfrm>
-            <a:off x="2868247" y="1498545"/>
-            <a:ext cx="3313724" cy="1477328"/>
+            <a:off x="2782276" y="947939"/>
+            <a:ext cx="3313724" cy="2677656"/>
           </a:xfrm>
           <a:prstGeom prst="rect">
             <a:avLst/>
@@ -15995,7 +15931,7 @@
           <a:p>
             <a:pPr algn="ctr"/>
             <a:r>
-              <a:rPr lang="en-GB" b="1" dirty="0">
+              <a:rPr lang="en-GB" sz="2400" b="1" dirty="0">
                 <a:solidFill>
                   <a:schemeClr val="accent2"/>
                 </a:solidFill>
@@ -16006,14 +15942,14 @@
           <a:p>
             <a:pPr algn="ctr"/>
             <a:r>
-              <a:rPr lang="en-GB" b="1" dirty="0">
+              <a:rPr lang="en-GB" sz="2400" b="1" dirty="0">
                 <a:solidFill>
                   <a:schemeClr val="accent2"/>
                 </a:solidFill>
               </a:rPr>
-              <a:t>Using a Linear Regressor would be a mistake, as it would not properly fit the data.</a:t>
-            </a:r>
-            <a:endParaRPr lang="en-SG" b="1" dirty="0">
+              <a:t>Using a Linear Regressor would be a mistake here, as it would not properly fit the data.</a:t>
+            </a:r>
+            <a:endParaRPr lang="en-SG" sz="2400" b="1" dirty="0">
               <a:solidFill>
                 <a:schemeClr val="accent2"/>
               </a:solidFill>
@@ -16034,7 +15970,7 @@
 </p:sld>
 </file>
 
-<file path=ppt/slides/slide15.xml><?xml version="1.0" encoding="utf-8"?>
+<file path=ppt/slides/slide14.xml><?xml version="1.0" encoding="utf-8"?>
 <p:sld xmlns:a="http://schemas.openxmlformats.org/drawingml/2006/main" xmlns:r="http://schemas.openxmlformats.org/officeDocument/2006/relationships" xmlns:p="http://schemas.openxmlformats.org/presentationml/2006/main">
   <p:cSld>
     <p:spTree>
@@ -16675,7 +16611,7 @@
 </p:sld>
 </file>
 
-<file path=ppt/slides/slide16.xml><?xml version="1.0" encoding="utf-8"?>
+<file path=ppt/slides/slide15.xml><?xml version="1.0" encoding="utf-8"?>
 <p:sld xmlns:a="http://schemas.openxmlformats.org/drawingml/2006/main" xmlns:r="http://schemas.openxmlformats.org/officeDocument/2006/relationships" xmlns:p="http://schemas.openxmlformats.org/presentationml/2006/main">
   <p:cSld>
     <p:spTree>
@@ -16883,7 +16819,7 @@
 </p:sld>
 </file>
 
-<file path=ppt/slides/slide17.xml><?xml version="1.0" encoding="utf-8"?>
+<file path=ppt/slides/slide16.xml><?xml version="1.0" encoding="utf-8"?>
 <p:sld xmlns:a="http://schemas.openxmlformats.org/drawingml/2006/main" xmlns:r="http://schemas.openxmlformats.org/officeDocument/2006/relationships" xmlns:p="http://schemas.openxmlformats.org/presentationml/2006/main">
   <p:cSld>
     <p:spTree>
@@ -16945,7 +16881,7 @@
         <p:spPr>
           <a:xfrm>
             <a:off x="2802933" y="2011728"/>
-            <a:ext cx="2571500" cy="646331"/>
+            <a:ext cx="2571500" cy="1384995"/>
           </a:xfrm>
           <a:prstGeom prst="rect">
             <a:avLst/>
@@ -16960,14 +16896,14 @@
           <a:p>
             <a:pPr algn="ctr"/>
             <a:r>
-              <a:rPr lang="en-GB" b="1" dirty="0">
+              <a:rPr lang="en-GB" sz="2800" b="1" dirty="0">
                 <a:solidFill>
                   <a:schemeClr val="accent2"/>
                 </a:solidFill>
               </a:rPr>
               <a:t>A much better fit, with a lower MSE loss</a:t>
             </a:r>
-            <a:endParaRPr lang="en-SG" b="1" dirty="0">
+            <a:endParaRPr lang="en-SG" sz="2800" b="1" dirty="0">
               <a:solidFill>
                 <a:schemeClr val="accent2"/>
               </a:solidFill>
@@ -16988,7 +16924,7 @@
 </p:sld>
 </file>
 
-<file path=ppt/slides/slide18.xml><?xml version="1.0" encoding="utf-8"?>
+<file path=ppt/slides/slide17.xml><?xml version="1.0" encoding="utf-8"?>
 <p:sld xmlns:a="http://schemas.openxmlformats.org/drawingml/2006/main" xmlns:r="http://schemas.openxmlformats.org/officeDocument/2006/relationships" xmlns:p="http://schemas.openxmlformats.org/presentationml/2006/main">
   <p:cSld>
     <p:spTree>
@@ -17049,8 +16985,8 @@
         </p:nvSpPr>
         <p:spPr>
           <a:xfrm>
-            <a:off x="2802933" y="2011728"/>
-            <a:ext cx="2571500" cy="1754326"/>
+            <a:off x="2665281" y="969509"/>
+            <a:ext cx="3145584" cy="3108543"/>
           </a:xfrm>
           <a:prstGeom prst="rect">
             <a:avLst/>
@@ -17065,7 +17001,7 @@
           <a:p>
             <a:pPr algn="ctr"/>
             <a:r>
-              <a:rPr lang="en-GB" b="1" dirty="0">
+              <a:rPr lang="en-GB" sz="2800" b="1" dirty="0">
                 <a:solidFill>
                   <a:schemeClr val="accent2"/>
                 </a:solidFill>
@@ -17076,14 +17012,14 @@
           <a:p>
             <a:pPr algn="ctr"/>
             <a:r>
-              <a:rPr lang="en-GB" b="1" dirty="0">
+              <a:rPr lang="en-GB" sz="2800" b="1" dirty="0">
                 <a:solidFill>
                   <a:schemeClr val="accent2"/>
                 </a:solidFill>
               </a:rPr>
               <a:t>Higher degree is not always better!</a:t>
             </a:r>
-            <a:endParaRPr lang="en-SG" b="1" dirty="0">
+            <a:endParaRPr lang="en-SG" sz="2800" b="1" dirty="0">
               <a:solidFill>
                 <a:schemeClr val="accent2"/>
               </a:solidFill>
@@ -17104,7 +17040,7 @@
 </p:sld>
 </file>
 
-<file path=ppt/slides/slide19.xml><?xml version="1.0" encoding="utf-8"?>
+<file path=ppt/slides/slide18.xml><?xml version="1.0" encoding="utf-8"?>
 <p:sld xmlns:a="http://schemas.openxmlformats.org/drawingml/2006/main" xmlns:r="http://schemas.openxmlformats.org/officeDocument/2006/relationships" xmlns:p="http://schemas.openxmlformats.org/presentationml/2006/main">
   <p:cSld>
     <p:spTree>
@@ -17151,62 +17087,6 @@
           </a:prstGeom>
         </p:spPr>
       </p:pic>
-      <p:sp>
-        <p:nvSpPr>
-          <p:cNvPr id="11" name="TextBox 10">
-            <a:extLst>
-              <a:ext uri="{FF2B5EF4-FFF2-40B4-BE49-F238E27FC236}">
-                <a16:creationId xmlns:a16="http://schemas.microsoft.com/office/drawing/2014/main" id="{CB693548-F6EE-8552-D1CD-B1EEB33BC591}"/>
-              </a:ext>
-            </a:extLst>
-          </p:cNvPr>
-          <p:cNvSpPr txBox="1"/>
-          <p:nvPr/>
-        </p:nvSpPr>
-        <p:spPr>
-          <a:xfrm>
-            <a:off x="2802933" y="2011728"/>
-            <a:ext cx="2571500" cy="1754326"/>
-          </a:xfrm>
-          <a:prstGeom prst="rect">
-            <a:avLst/>
-          </a:prstGeom>
-          <a:noFill/>
-        </p:spPr>
-        <p:txBody>
-          <a:bodyPr wrap="square" rtlCol="0">
-            <a:spAutoFit/>
-          </a:bodyPr>
-          <a:lstStyle/>
-          <a:p>
-            <a:pPr algn="ctr"/>
-            <a:r>
-              <a:rPr lang="en-GB" b="1" dirty="0">
-                <a:solidFill>
-                  <a:schemeClr val="accent2"/>
-                </a:solidFill>
-              </a:rPr>
-              <a:t>Be careful however on the degree you use for the polynomial regression.</a:t>
-            </a:r>
-          </a:p>
-          <a:p>
-            <a:pPr algn="ctr"/>
-            <a:r>
-              <a:rPr lang="en-GB" b="1" dirty="0">
-                <a:solidFill>
-                  <a:schemeClr val="accent2"/>
-                </a:solidFill>
-              </a:rPr>
-              <a:t>Higher degree is not always better!</a:t>
-            </a:r>
-            <a:endParaRPr lang="en-SG" b="1" dirty="0">
-              <a:solidFill>
-                <a:schemeClr val="accent2"/>
-              </a:solidFill>
-            </a:endParaRPr>
-          </a:p>
-        </p:txBody>
-      </p:sp>
       <p:sp>
         <p:nvSpPr>
           <p:cNvPr id="2" name="Oval 1">
@@ -17274,8 +17154,8 @@
         </p:nvSpPr>
         <p:spPr>
           <a:xfrm>
-            <a:off x="8135577" y="4102343"/>
-            <a:ext cx="2571500" cy="1200329"/>
+            <a:off x="8135577" y="3148614"/>
+            <a:ext cx="2571500" cy="2677656"/>
           </a:xfrm>
           <a:prstGeom prst="rect">
             <a:avLst/>
@@ -17290,14 +17170,70 @@
           <a:p>
             <a:pPr algn="ctr"/>
             <a:r>
-              <a:rPr lang="en-GB" b="1" dirty="0">
+              <a:rPr lang="en-GB" sz="2800" b="1" dirty="0">
                 <a:solidFill>
                   <a:schemeClr val="accent2"/>
                 </a:solidFill>
               </a:rPr>
               <a:t>Red model (high degree) will struggle to predict price of a 150sqm apartment!</a:t>
             </a:r>
-            <a:endParaRPr lang="en-SG" b="1" dirty="0">
+            <a:endParaRPr lang="en-SG" sz="2800" b="1" dirty="0">
+              <a:solidFill>
+                <a:schemeClr val="accent2"/>
+              </a:solidFill>
+            </a:endParaRPr>
+          </a:p>
+        </p:txBody>
+      </p:sp>
+      <p:sp>
+        <p:nvSpPr>
+          <p:cNvPr id="5" name="TextBox 4">
+            <a:extLst>
+              <a:ext uri="{FF2B5EF4-FFF2-40B4-BE49-F238E27FC236}">
+                <a16:creationId xmlns:a16="http://schemas.microsoft.com/office/drawing/2014/main" id="{EE0568AC-DCA0-63B7-9EE3-65ABDDC04E97}"/>
+              </a:ext>
+            </a:extLst>
+          </p:cNvPr>
+          <p:cNvSpPr txBox="1"/>
+          <p:nvPr/>
+        </p:nvSpPr>
+        <p:spPr>
+          <a:xfrm>
+            <a:off x="2665281" y="969509"/>
+            <a:ext cx="3145584" cy="3108543"/>
+          </a:xfrm>
+          <a:prstGeom prst="rect">
+            <a:avLst/>
+          </a:prstGeom>
+          <a:noFill/>
+        </p:spPr>
+        <p:txBody>
+          <a:bodyPr wrap="square" rtlCol="0">
+            <a:spAutoFit/>
+          </a:bodyPr>
+          <a:lstStyle/>
+          <a:p>
+            <a:pPr algn="ctr"/>
+            <a:r>
+              <a:rPr lang="en-GB" sz="2800" b="1" dirty="0">
+                <a:solidFill>
+                  <a:schemeClr val="accent2"/>
+                </a:solidFill>
+              </a:rPr>
+              <a:t>Be careful however on the degree you use for the polynomial regression.</a:t>
+            </a:r>
+          </a:p>
+          <a:p>
+            <a:pPr algn="ctr"/>
+            <a:r>
+              <a:rPr lang="en-GB" sz="2800" b="1" dirty="0">
+                <a:solidFill>
+                  <a:schemeClr val="accent2"/>
+                </a:solidFill>
+              </a:rPr>
+              <a:t>Higher degree is not always better!</a:t>
+            </a:r>
+            <a:endParaRPr lang="en-SG" sz="2800" b="1" dirty="0">
               <a:solidFill>
                 <a:schemeClr val="accent2"/>
               </a:solidFill>
@@ -17318,378 +17254,7 @@
 </p:sld>
 </file>
 
-<file path=ppt/slides/slide2.xml><?xml version="1.0" encoding="utf-8"?>
-<p:sld xmlns:a="http://schemas.openxmlformats.org/drawingml/2006/main" xmlns:r="http://schemas.openxmlformats.org/officeDocument/2006/relationships" xmlns:p="http://schemas.openxmlformats.org/presentationml/2006/main">
-  <p:cSld>
-    <p:spTree>
-      <p:nvGrpSpPr>
-        <p:cNvPr id="1" name=""/>
-        <p:cNvGrpSpPr/>
-        <p:nvPr/>
-      </p:nvGrpSpPr>
-      <p:grpSpPr>
-        <a:xfrm>
-          <a:off x="0" y="0"/>
-          <a:ext cx="0" cy="0"/>
-          <a:chOff x="0" y="0"/>
-          <a:chExt cx="0" cy="0"/>
-        </a:xfrm>
-      </p:grpSpPr>
-      <p:sp>
-        <p:nvSpPr>
-          <p:cNvPr id="2" name="Title 1">
-            <a:extLst>
-              <a:ext uri="{FF2B5EF4-FFF2-40B4-BE49-F238E27FC236}">
-                <a16:creationId xmlns:a16="http://schemas.microsoft.com/office/drawing/2014/main" id="{49D40417-A4D3-4CE8-96E7-708E2439AE7B}"/>
-              </a:ext>
-            </a:extLst>
-          </p:cNvPr>
-          <p:cNvSpPr>
-            <a:spLocks noGrp="1"/>
-          </p:cNvSpPr>
-          <p:nvPr>
-            <p:ph type="title"/>
-          </p:nvPr>
-        </p:nvSpPr>
-        <p:spPr/>
-        <p:txBody>
-          <a:bodyPr/>
-          <a:lstStyle/>
-          <a:p>
-            <a:r>
-              <a:rPr lang="en-US" dirty="0"/>
-              <a:t>About this week (Week 1)</a:t>
-            </a:r>
-            <a:endParaRPr lang="en-GB" dirty="0"/>
-          </a:p>
-        </p:txBody>
-      </p:sp>
-      <p:sp>
-        <p:nvSpPr>
-          <p:cNvPr id="3" name="Content Placeholder 2">
-            <a:extLst>
-              <a:ext uri="{FF2B5EF4-FFF2-40B4-BE49-F238E27FC236}">
-                <a16:creationId xmlns:a16="http://schemas.microsoft.com/office/drawing/2014/main" id="{35995840-A9D9-479A-A34F-EA7DC229D38E}"/>
-              </a:ext>
-            </a:extLst>
-          </p:cNvPr>
-          <p:cNvSpPr>
-            <a:spLocks noGrp="1"/>
-          </p:cNvSpPr>
-          <p:nvPr>
-            <p:ph idx="1"/>
-          </p:nvPr>
-        </p:nvSpPr>
-        <p:spPr>
-          <a:xfrm>
-            <a:off x="838200" y="1825625"/>
-            <a:ext cx="10515600" cy="4827102"/>
-          </a:xfrm>
-        </p:spPr>
-        <p:txBody>
-          <a:bodyPr/>
-          <a:lstStyle/>
-          <a:p>
-            <a:pPr marL="514350" indent="-514350">
-              <a:buFont typeface="+mj-lt"/>
-              <a:buAutoNum type="arabicPeriod"/>
-            </a:pPr>
-            <a:r>
-              <a:rPr lang="en-US" dirty="0"/>
-              <a:t>What are the </a:t>
-            </a:r>
-            <a:r>
-              <a:rPr lang="en-US" b="1" dirty="0"/>
-              <a:t>typical</a:t>
-            </a:r>
-            <a:r>
-              <a:rPr lang="en-US" dirty="0"/>
-              <a:t> </a:t>
-            </a:r>
-            <a:r>
-              <a:rPr lang="en-US" b="1" dirty="0"/>
-              <a:t>concepts</a:t>
-            </a:r>
-            <a:r>
-              <a:rPr lang="en-US" dirty="0"/>
-              <a:t> </a:t>
-            </a:r>
-            <a:r>
-              <a:rPr lang="en-US" b="1" dirty="0"/>
-              <a:t>of</a:t>
-            </a:r>
-            <a:r>
-              <a:rPr lang="en-US" dirty="0"/>
-              <a:t> </a:t>
-            </a:r>
-            <a:r>
-              <a:rPr lang="en-US" b="1" dirty="0"/>
-              <a:t>Machine</a:t>
-            </a:r>
-            <a:r>
-              <a:rPr lang="en-US" dirty="0"/>
-              <a:t> </a:t>
-            </a:r>
-            <a:r>
-              <a:rPr lang="en-US" b="1" dirty="0"/>
-              <a:t>Learning</a:t>
-            </a:r>
-            <a:r>
-              <a:rPr lang="en-US" dirty="0"/>
-              <a:t> to be used as a starting point for this course?</a:t>
-            </a:r>
-          </a:p>
-          <a:p>
-            <a:pPr marL="514350" indent="-514350">
-              <a:buFont typeface="+mj-lt"/>
-              <a:buAutoNum type="arabicPeriod"/>
-            </a:pPr>
-            <a:r>
-              <a:rPr lang="en-GB" dirty="0"/>
-              <a:t>What are the </a:t>
-            </a:r>
-            <a:r>
-              <a:rPr lang="en-GB" b="1" dirty="0"/>
-              <a:t>different</a:t>
-            </a:r>
-            <a:r>
-              <a:rPr lang="en-GB" dirty="0"/>
-              <a:t> </a:t>
-            </a:r>
-            <a:r>
-              <a:rPr lang="en-GB" b="1" dirty="0"/>
-              <a:t>families</a:t>
-            </a:r>
-            <a:r>
-              <a:rPr lang="en-GB" dirty="0"/>
-              <a:t> </a:t>
-            </a:r>
-            <a:r>
-              <a:rPr lang="en-GB" b="1" dirty="0"/>
-              <a:t>of</a:t>
-            </a:r>
-            <a:r>
-              <a:rPr lang="en-GB" dirty="0"/>
-              <a:t> </a:t>
-            </a:r>
-            <a:r>
-              <a:rPr lang="en-GB" b="1" dirty="0"/>
-              <a:t>problems</a:t>
-            </a:r>
-            <a:r>
-              <a:rPr lang="en-GB" dirty="0"/>
-              <a:t> in Deep Learning?</a:t>
-            </a:r>
-          </a:p>
-          <a:p>
-            <a:pPr marL="514350" indent="-514350">
-              <a:buFont typeface="+mj-lt"/>
-              <a:buAutoNum type="arabicPeriod"/>
-            </a:pPr>
-            <a:r>
-              <a:rPr lang="en-GB" dirty="0"/>
-              <a:t>What is the </a:t>
-            </a:r>
-            <a:r>
-              <a:rPr lang="en-GB" b="1" dirty="0"/>
-              <a:t>typical</a:t>
-            </a:r>
-            <a:r>
-              <a:rPr lang="en-GB" dirty="0"/>
-              <a:t> </a:t>
-            </a:r>
-            <a:r>
-              <a:rPr lang="en-GB" b="1" dirty="0"/>
-              <a:t>structure</a:t>
-            </a:r>
-            <a:r>
-              <a:rPr lang="en-GB" dirty="0"/>
-              <a:t> </a:t>
-            </a:r>
-            <a:r>
-              <a:rPr lang="en-GB" b="1" dirty="0"/>
-              <a:t>of a Deep Learning problem</a:t>
-            </a:r>
-            <a:r>
-              <a:rPr lang="en-GB" dirty="0"/>
-              <a:t>?</a:t>
-            </a:r>
-          </a:p>
-          <a:p>
-            <a:pPr marL="514350" indent="-514350">
-              <a:buFont typeface="+mj-lt"/>
-              <a:buAutoNum type="arabicPeriod"/>
-            </a:pPr>
-            <a:r>
-              <a:rPr lang="en-GB" dirty="0"/>
-              <a:t>What is </a:t>
-            </a:r>
-            <a:r>
-              <a:rPr lang="en-GB" b="1" dirty="0"/>
-              <a:t>linear</a:t>
-            </a:r>
-            <a:r>
-              <a:rPr lang="en-GB" dirty="0"/>
-              <a:t> </a:t>
-            </a:r>
-            <a:r>
-              <a:rPr lang="en-GB" b="1" dirty="0"/>
-              <a:t>regression</a:t>
-            </a:r>
-            <a:r>
-              <a:rPr lang="en-GB" dirty="0"/>
-              <a:t> and how to implement it?</a:t>
-            </a:r>
-          </a:p>
-          <a:p>
-            <a:pPr marL="514350" indent="-514350">
-              <a:buFont typeface="+mj-lt"/>
-              <a:buAutoNum type="arabicPeriod"/>
-            </a:pPr>
-            <a:r>
-              <a:rPr lang="en-GB" dirty="0"/>
-              <a:t>What is the </a:t>
-            </a:r>
-            <a:r>
-              <a:rPr lang="en-GB" b="1" dirty="0"/>
-              <a:t>gradient</a:t>
-            </a:r>
-            <a:r>
-              <a:rPr lang="en-GB" dirty="0"/>
-              <a:t> </a:t>
-            </a:r>
-            <a:r>
-              <a:rPr lang="en-GB" b="1" dirty="0"/>
-              <a:t>descent</a:t>
-            </a:r>
-            <a:r>
-              <a:rPr lang="en-GB" dirty="0"/>
-              <a:t> </a:t>
-            </a:r>
-            <a:r>
-              <a:rPr lang="en-GB" b="1" dirty="0"/>
-              <a:t>algorithm</a:t>
-            </a:r>
-            <a:r>
-              <a:rPr lang="en-GB" dirty="0"/>
-              <a:t> and how is it used to </a:t>
-            </a:r>
-            <a:r>
-              <a:rPr lang="en-GB" b="1" dirty="0"/>
-              <a:t>train</a:t>
-            </a:r>
-            <a:r>
-              <a:rPr lang="en-GB" dirty="0"/>
-              <a:t> </a:t>
-            </a:r>
-            <a:r>
-              <a:rPr lang="en-GB" b="1" dirty="0"/>
-              <a:t>Machine</a:t>
-            </a:r>
-            <a:r>
-              <a:rPr lang="en-GB" dirty="0"/>
-              <a:t> </a:t>
-            </a:r>
-            <a:r>
-              <a:rPr lang="en-GB" b="1" dirty="0"/>
-              <a:t>Learning</a:t>
-            </a:r>
-            <a:r>
-              <a:rPr lang="en-GB" dirty="0"/>
-              <a:t> </a:t>
-            </a:r>
-            <a:r>
-              <a:rPr lang="en-GB" b="1" dirty="0"/>
-              <a:t>models</a:t>
-            </a:r>
-            <a:r>
-              <a:rPr lang="en-GB" dirty="0"/>
-              <a:t>?</a:t>
-            </a:r>
-          </a:p>
-          <a:p>
-            <a:pPr marL="514350" indent="-514350">
-              <a:buFont typeface="+mj-lt"/>
-              <a:buAutoNum type="arabicPeriod"/>
-            </a:pPr>
-            <a:r>
-              <a:rPr lang="en-GB" dirty="0"/>
-              <a:t>What is </a:t>
-            </a:r>
-            <a:r>
-              <a:rPr lang="en-GB" b="1" dirty="0"/>
-              <a:t>polynomial</a:t>
-            </a:r>
-            <a:r>
-              <a:rPr lang="en-GB" dirty="0"/>
-              <a:t> </a:t>
-            </a:r>
-            <a:r>
-              <a:rPr lang="en-GB" b="1" dirty="0"/>
-              <a:t>regression</a:t>
-            </a:r>
-            <a:r>
-              <a:rPr lang="en-GB" dirty="0"/>
-              <a:t> and how to implement it?</a:t>
-            </a:r>
-          </a:p>
-          <a:p>
-            <a:pPr marL="514350" indent="-514350">
-              <a:buFont typeface="+mj-lt"/>
-              <a:buAutoNum type="arabicPeriod"/>
-            </a:pPr>
-            <a:r>
-              <a:rPr lang="en-GB" dirty="0"/>
-              <a:t>What is </a:t>
-            </a:r>
-            <a:r>
-              <a:rPr lang="en-GB" b="1" dirty="0"/>
-              <a:t>regularization</a:t>
-            </a:r>
-            <a:r>
-              <a:rPr lang="en-GB" dirty="0"/>
-              <a:t> and how to implement it in </a:t>
-            </a:r>
-            <a:r>
-              <a:rPr lang="en-GB" b="1" dirty="0"/>
-              <a:t>Ridge</a:t>
-            </a:r>
-            <a:r>
-              <a:rPr lang="en-GB" dirty="0"/>
-              <a:t> </a:t>
-            </a:r>
-            <a:r>
-              <a:rPr lang="en-GB" b="1" dirty="0"/>
-              <a:t>regression</a:t>
-            </a:r>
-            <a:r>
-              <a:rPr lang="en-GB" dirty="0"/>
-              <a:t>?</a:t>
-            </a:r>
-          </a:p>
-          <a:p>
-            <a:pPr marL="514350" indent="-514350">
-              <a:buFont typeface="+mj-lt"/>
-              <a:buAutoNum type="arabicPeriod"/>
-            </a:pPr>
-            <a:endParaRPr lang="en-GB" dirty="0"/>
-          </a:p>
-        </p:txBody>
-      </p:sp>
-    </p:spTree>
-    <p:extLst>
-      <p:ext uri="{BB962C8B-B14F-4D97-AF65-F5344CB8AC3E}">
-        <p14:creationId xmlns:p14="http://schemas.microsoft.com/office/powerpoint/2010/main" val="3442501962"/>
-      </p:ext>
-    </p:extLst>
-  </p:cSld>
-  <p:clrMapOvr>
-    <a:masterClrMapping/>
-  </p:clrMapOvr>
-</p:sld>
-</file>
-
-<file path=ppt/slides/slide20.xml><?xml version="1.0" encoding="utf-8"?>
+<file path=ppt/slides/slide19.xml><?xml version="1.0" encoding="utf-8"?>
 <p:sld xmlns:a="http://schemas.openxmlformats.org/drawingml/2006/main" xmlns:r="http://schemas.openxmlformats.org/officeDocument/2006/relationships" xmlns:p="http://schemas.openxmlformats.org/presentationml/2006/main">
   <p:cSld>
     <p:spTree>
@@ -17862,7 +17427,7 @@
           <p:nvPr/>
         </p:nvPicPr>
         <p:blipFill>
-          <a:blip r:embed="rId3"/>
+          <a:blip r:embed="rId2"/>
           <a:stretch>
             <a:fillRect/>
           </a:stretch>
@@ -17881,6 +17446,538 @@
     <p:extLst>
       <p:ext uri="{BB962C8B-B14F-4D97-AF65-F5344CB8AC3E}">
         <p14:creationId xmlns:p14="http://schemas.microsoft.com/office/powerpoint/2010/main" val="4026475787"/>
+      </p:ext>
+    </p:extLst>
+  </p:cSld>
+  <p:clrMapOvr>
+    <a:masterClrMapping/>
+  </p:clrMapOvr>
+</p:sld>
+</file>
+
+<file path=ppt/slides/slide2.xml><?xml version="1.0" encoding="utf-8"?>
+<p:sld xmlns:a="http://schemas.openxmlformats.org/drawingml/2006/main" xmlns:r="http://schemas.openxmlformats.org/officeDocument/2006/relationships" xmlns:p="http://schemas.openxmlformats.org/presentationml/2006/main">
+  <p:cSld>
+    <p:spTree>
+      <p:nvGrpSpPr>
+        <p:cNvPr id="1" name=""/>
+        <p:cNvGrpSpPr/>
+        <p:nvPr/>
+      </p:nvGrpSpPr>
+      <p:grpSpPr>
+        <a:xfrm>
+          <a:off x="0" y="0"/>
+          <a:ext cx="0" cy="0"/>
+          <a:chOff x="0" y="0"/>
+          <a:chExt cx="0" cy="0"/>
+        </a:xfrm>
+      </p:grpSpPr>
+      <p:sp>
+        <p:nvSpPr>
+          <p:cNvPr id="2" name="Title 1">
+            <a:extLst>
+              <a:ext uri="{FF2B5EF4-FFF2-40B4-BE49-F238E27FC236}">
+                <a16:creationId xmlns:a16="http://schemas.microsoft.com/office/drawing/2014/main" id="{49D40417-A4D3-4CE8-96E7-708E2439AE7B}"/>
+              </a:ext>
+            </a:extLst>
+          </p:cNvPr>
+          <p:cNvSpPr>
+            <a:spLocks noGrp="1"/>
+          </p:cNvSpPr>
+          <p:nvPr>
+            <p:ph type="title"/>
+          </p:nvPr>
+        </p:nvSpPr>
+        <p:spPr/>
+        <p:txBody>
+          <a:bodyPr/>
+          <a:lstStyle/>
+          <a:p>
+            <a:r>
+              <a:rPr lang="en-US" dirty="0"/>
+              <a:t>About this week (Week 1)</a:t>
+            </a:r>
+            <a:endParaRPr lang="en-GB" dirty="0"/>
+          </a:p>
+        </p:txBody>
+      </p:sp>
+      <p:sp>
+        <p:nvSpPr>
+          <p:cNvPr id="3" name="Content Placeholder 2">
+            <a:extLst>
+              <a:ext uri="{FF2B5EF4-FFF2-40B4-BE49-F238E27FC236}">
+                <a16:creationId xmlns:a16="http://schemas.microsoft.com/office/drawing/2014/main" id="{35995840-A9D9-479A-A34F-EA7DC229D38E}"/>
+              </a:ext>
+            </a:extLst>
+          </p:cNvPr>
+          <p:cNvSpPr>
+            <a:spLocks noGrp="1"/>
+          </p:cNvSpPr>
+          <p:nvPr>
+            <p:ph idx="1"/>
+          </p:nvPr>
+        </p:nvSpPr>
+        <p:spPr>
+          <a:xfrm>
+            <a:off x="838200" y="1825625"/>
+            <a:ext cx="10515600" cy="4827102"/>
+          </a:xfrm>
+        </p:spPr>
+        <p:txBody>
+          <a:bodyPr/>
+          <a:lstStyle/>
+          <a:p>
+            <a:pPr marL="514350" indent="-514350">
+              <a:buFont typeface="+mj-lt"/>
+              <a:buAutoNum type="arabicPeriod"/>
+            </a:pPr>
+            <a:r>
+              <a:rPr lang="en-US" dirty="0"/>
+              <a:t>What are the </a:t>
+            </a:r>
+            <a:r>
+              <a:rPr lang="en-US" b="1" dirty="0"/>
+              <a:t>typical</a:t>
+            </a:r>
+            <a:r>
+              <a:rPr lang="en-US" dirty="0"/>
+              <a:t> </a:t>
+            </a:r>
+            <a:r>
+              <a:rPr lang="en-US" b="1" dirty="0"/>
+              <a:t>concepts</a:t>
+            </a:r>
+            <a:r>
+              <a:rPr lang="en-US" dirty="0"/>
+              <a:t> </a:t>
+            </a:r>
+            <a:r>
+              <a:rPr lang="en-US" b="1" dirty="0"/>
+              <a:t>of</a:t>
+            </a:r>
+            <a:r>
+              <a:rPr lang="en-US" dirty="0"/>
+              <a:t> </a:t>
+            </a:r>
+            <a:r>
+              <a:rPr lang="en-US" b="1" dirty="0"/>
+              <a:t>Machine</a:t>
+            </a:r>
+            <a:r>
+              <a:rPr lang="en-US" dirty="0"/>
+              <a:t> </a:t>
+            </a:r>
+            <a:r>
+              <a:rPr lang="en-US" b="1" dirty="0"/>
+              <a:t>Learning</a:t>
+            </a:r>
+            <a:r>
+              <a:rPr lang="en-US" dirty="0"/>
+              <a:t> to be used as a starting point for this course?</a:t>
+            </a:r>
+          </a:p>
+          <a:p>
+            <a:pPr marL="514350" indent="-514350">
+              <a:buFont typeface="+mj-lt"/>
+              <a:buAutoNum type="arabicPeriod"/>
+            </a:pPr>
+            <a:r>
+              <a:rPr lang="en-GB" dirty="0"/>
+              <a:t>What are the </a:t>
+            </a:r>
+            <a:r>
+              <a:rPr lang="en-GB" b="1" dirty="0"/>
+              <a:t>different</a:t>
+            </a:r>
+            <a:r>
+              <a:rPr lang="en-GB" dirty="0"/>
+              <a:t> </a:t>
+            </a:r>
+            <a:r>
+              <a:rPr lang="en-GB" b="1" dirty="0"/>
+              <a:t>families</a:t>
+            </a:r>
+            <a:r>
+              <a:rPr lang="en-GB" dirty="0"/>
+              <a:t> </a:t>
+            </a:r>
+            <a:r>
+              <a:rPr lang="en-GB" b="1" dirty="0"/>
+              <a:t>of</a:t>
+            </a:r>
+            <a:r>
+              <a:rPr lang="en-GB" dirty="0"/>
+              <a:t> </a:t>
+            </a:r>
+            <a:r>
+              <a:rPr lang="en-GB" b="1" dirty="0"/>
+              <a:t>problems</a:t>
+            </a:r>
+            <a:r>
+              <a:rPr lang="en-GB" dirty="0"/>
+              <a:t> in Deep Learning?</a:t>
+            </a:r>
+          </a:p>
+          <a:p>
+            <a:pPr marL="514350" indent="-514350">
+              <a:buFont typeface="+mj-lt"/>
+              <a:buAutoNum type="arabicPeriod"/>
+            </a:pPr>
+            <a:r>
+              <a:rPr lang="en-GB" dirty="0"/>
+              <a:t>What is the </a:t>
+            </a:r>
+            <a:r>
+              <a:rPr lang="en-GB" b="1" dirty="0"/>
+              <a:t>typical</a:t>
+            </a:r>
+            <a:r>
+              <a:rPr lang="en-GB" dirty="0"/>
+              <a:t> </a:t>
+            </a:r>
+            <a:r>
+              <a:rPr lang="en-GB" b="1" dirty="0"/>
+              <a:t>structure</a:t>
+            </a:r>
+            <a:r>
+              <a:rPr lang="en-GB" dirty="0"/>
+              <a:t> </a:t>
+            </a:r>
+            <a:r>
+              <a:rPr lang="en-GB" b="1" dirty="0"/>
+              <a:t>of a Deep Learning problem</a:t>
+            </a:r>
+            <a:r>
+              <a:rPr lang="en-GB" dirty="0"/>
+              <a:t>?</a:t>
+            </a:r>
+          </a:p>
+          <a:p>
+            <a:pPr marL="514350" indent="-514350">
+              <a:buFont typeface="+mj-lt"/>
+              <a:buAutoNum type="arabicPeriod"/>
+            </a:pPr>
+            <a:r>
+              <a:rPr lang="en-GB" dirty="0"/>
+              <a:t>What is </a:t>
+            </a:r>
+            <a:r>
+              <a:rPr lang="en-GB" b="1" dirty="0"/>
+              <a:t>linear</a:t>
+            </a:r>
+            <a:r>
+              <a:rPr lang="en-GB" dirty="0"/>
+              <a:t> </a:t>
+            </a:r>
+            <a:r>
+              <a:rPr lang="en-GB" b="1" dirty="0"/>
+              <a:t>regression</a:t>
+            </a:r>
+            <a:r>
+              <a:rPr lang="en-GB" dirty="0"/>
+              <a:t> and how to implement it?</a:t>
+            </a:r>
+          </a:p>
+          <a:p>
+            <a:pPr marL="514350" indent="-514350">
+              <a:buFont typeface="+mj-lt"/>
+              <a:buAutoNum type="arabicPeriod"/>
+            </a:pPr>
+            <a:r>
+              <a:rPr lang="en-GB" dirty="0"/>
+              <a:t>What is the </a:t>
+            </a:r>
+            <a:r>
+              <a:rPr lang="en-GB" b="1" dirty="0"/>
+              <a:t>gradient</a:t>
+            </a:r>
+            <a:r>
+              <a:rPr lang="en-GB" dirty="0"/>
+              <a:t> </a:t>
+            </a:r>
+            <a:r>
+              <a:rPr lang="en-GB" b="1" dirty="0"/>
+              <a:t>descent</a:t>
+            </a:r>
+            <a:r>
+              <a:rPr lang="en-GB" dirty="0"/>
+              <a:t> </a:t>
+            </a:r>
+            <a:r>
+              <a:rPr lang="en-GB" b="1" dirty="0"/>
+              <a:t>algorithm</a:t>
+            </a:r>
+            <a:r>
+              <a:rPr lang="en-GB" dirty="0"/>
+              <a:t> and how is it used to </a:t>
+            </a:r>
+            <a:r>
+              <a:rPr lang="en-GB" b="1" dirty="0"/>
+              <a:t>train</a:t>
+            </a:r>
+            <a:r>
+              <a:rPr lang="en-GB" dirty="0"/>
+              <a:t> </a:t>
+            </a:r>
+            <a:r>
+              <a:rPr lang="en-GB" b="1" dirty="0"/>
+              <a:t>Machine</a:t>
+            </a:r>
+            <a:r>
+              <a:rPr lang="en-GB" dirty="0"/>
+              <a:t> </a:t>
+            </a:r>
+            <a:r>
+              <a:rPr lang="en-GB" b="1" dirty="0"/>
+              <a:t>Learning</a:t>
+            </a:r>
+            <a:r>
+              <a:rPr lang="en-GB" dirty="0"/>
+              <a:t> </a:t>
+            </a:r>
+            <a:r>
+              <a:rPr lang="en-GB" b="1" dirty="0"/>
+              <a:t>models</a:t>
+            </a:r>
+            <a:r>
+              <a:rPr lang="en-GB" dirty="0"/>
+              <a:t>?</a:t>
+            </a:r>
+          </a:p>
+          <a:p>
+            <a:pPr marL="514350" indent="-514350">
+              <a:buFont typeface="+mj-lt"/>
+              <a:buAutoNum type="arabicPeriod"/>
+            </a:pPr>
+            <a:r>
+              <a:rPr lang="en-GB" dirty="0"/>
+              <a:t>What is </a:t>
+            </a:r>
+            <a:r>
+              <a:rPr lang="en-GB" b="1" dirty="0"/>
+              <a:t>polynomial</a:t>
+            </a:r>
+            <a:r>
+              <a:rPr lang="en-GB" dirty="0"/>
+              <a:t> </a:t>
+            </a:r>
+            <a:r>
+              <a:rPr lang="en-GB" b="1" dirty="0"/>
+              <a:t>regression</a:t>
+            </a:r>
+            <a:r>
+              <a:rPr lang="en-GB" dirty="0"/>
+              <a:t> and how to implement it?</a:t>
+            </a:r>
+          </a:p>
+          <a:p>
+            <a:pPr marL="514350" indent="-514350">
+              <a:buFont typeface="+mj-lt"/>
+              <a:buAutoNum type="arabicPeriod"/>
+            </a:pPr>
+            <a:r>
+              <a:rPr lang="en-GB" dirty="0"/>
+              <a:t>What is </a:t>
+            </a:r>
+            <a:r>
+              <a:rPr lang="en-GB" b="1" dirty="0"/>
+              <a:t>regularization</a:t>
+            </a:r>
+            <a:r>
+              <a:rPr lang="en-GB" dirty="0"/>
+              <a:t> and how to implement it in </a:t>
+            </a:r>
+            <a:r>
+              <a:rPr lang="en-GB" b="1" dirty="0"/>
+              <a:t>Ridge</a:t>
+            </a:r>
+            <a:r>
+              <a:rPr lang="en-GB" dirty="0"/>
+              <a:t> </a:t>
+            </a:r>
+            <a:r>
+              <a:rPr lang="en-GB" b="1" dirty="0"/>
+              <a:t>regression</a:t>
+            </a:r>
+            <a:r>
+              <a:rPr lang="en-GB" dirty="0"/>
+              <a:t>?</a:t>
+            </a:r>
+          </a:p>
+          <a:p>
+            <a:pPr marL="514350" indent="-514350">
+              <a:buFont typeface="+mj-lt"/>
+              <a:buAutoNum type="arabicPeriod"/>
+            </a:pPr>
+            <a:endParaRPr lang="en-GB" dirty="0"/>
+          </a:p>
+        </p:txBody>
+      </p:sp>
+    </p:spTree>
+    <p:extLst>
+      <p:ext uri="{BB962C8B-B14F-4D97-AF65-F5344CB8AC3E}">
+        <p14:creationId xmlns:p14="http://schemas.microsoft.com/office/powerpoint/2010/main" val="3442501962"/>
+      </p:ext>
+    </p:extLst>
+  </p:cSld>
+  <p:clrMapOvr>
+    <a:masterClrMapping/>
+  </p:clrMapOvr>
+</p:sld>
+</file>
+
+<file path=ppt/slides/slide20.xml><?xml version="1.0" encoding="utf-8"?>
+<p:sld xmlns:a="http://schemas.openxmlformats.org/drawingml/2006/main" xmlns:r="http://schemas.openxmlformats.org/officeDocument/2006/relationships" xmlns:p="http://schemas.openxmlformats.org/presentationml/2006/main">
+  <p:cSld>
+    <p:spTree>
+      <p:nvGrpSpPr>
+        <p:cNvPr id="1" name=""/>
+        <p:cNvGrpSpPr/>
+        <p:nvPr/>
+      </p:nvGrpSpPr>
+      <p:grpSpPr>
+        <a:xfrm>
+          <a:off x="0" y="0"/>
+          <a:ext cx="0" cy="0"/>
+          <a:chOff x="0" y="0"/>
+          <a:chExt cx="0" cy="0"/>
+        </a:xfrm>
+      </p:grpSpPr>
+      <p:sp>
+        <p:nvSpPr>
+          <p:cNvPr id="5" name="Title 4">
+            <a:extLst>
+              <a:ext uri="{FF2B5EF4-FFF2-40B4-BE49-F238E27FC236}">
+                <a16:creationId xmlns:a16="http://schemas.microsoft.com/office/drawing/2014/main" id="{BC884000-0FC9-A696-A696-8635960E124E}"/>
+              </a:ext>
+            </a:extLst>
+          </p:cNvPr>
+          <p:cNvSpPr>
+            <a:spLocks noGrp="1"/>
+          </p:cNvSpPr>
+          <p:nvPr>
+            <p:ph type="title"/>
+          </p:nvPr>
+        </p:nvSpPr>
+        <p:spPr/>
+        <p:txBody>
+          <a:bodyPr/>
+          <a:lstStyle/>
+          <a:p>
+            <a:r>
+              <a:rPr lang="en-GB" dirty="0"/>
+              <a:t>Overfitting vs. degree of polynomial</a:t>
+            </a:r>
+            <a:endParaRPr lang="en-SG" dirty="0"/>
+          </a:p>
+        </p:txBody>
+      </p:sp>
+      <p:sp>
+        <p:nvSpPr>
+          <p:cNvPr id="6" name="Content Placeholder 5">
+            <a:extLst>
+              <a:ext uri="{FF2B5EF4-FFF2-40B4-BE49-F238E27FC236}">
+                <a16:creationId xmlns:a16="http://schemas.microsoft.com/office/drawing/2014/main" id="{3FF27FA6-234D-EB6E-7AD4-4E52F151A639}"/>
+              </a:ext>
+            </a:extLst>
+          </p:cNvPr>
+          <p:cNvSpPr>
+            <a:spLocks noGrp="1"/>
+          </p:cNvSpPr>
+          <p:nvPr>
+            <p:ph sz="half" idx="1"/>
+          </p:nvPr>
+        </p:nvSpPr>
+        <p:spPr/>
+        <p:txBody>
+          <a:bodyPr>
+            <a:normAutofit/>
+          </a:bodyPr>
+          <a:lstStyle/>
+          <a:p>
+            <a:pPr marL="0" indent="0">
+              <a:buNone/>
+            </a:pPr>
+            <a:r>
+              <a:rPr lang="en-GB" b="1" dirty="0"/>
+              <a:t>Definition (</a:t>
+            </a:r>
+            <a:r>
+              <a:rPr lang="en-GB" b="1" dirty="0">
+                <a:solidFill>
+                  <a:srgbClr val="00B050"/>
+                </a:solidFill>
+              </a:rPr>
+              <a:t>Overfitting</a:t>
+            </a:r>
+            <a:r>
+              <a:rPr lang="en-GB" b="1" dirty="0"/>
+              <a:t>):</a:t>
+            </a:r>
+          </a:p>
+          <a:p>
+            <a:pPr marL="0" indent="0">
+              <a:buNone/>
+            </a:pPr>
+            <a:r>
+              <a:rPr lang="en-GB" b="1" dirty="0">
+                <a:solidFill>
+                  <a:srgbClr val="00B050"/>
+                </a:solidFill>
+              </a:rPr>
+              <a:t>Overfitting</a:t>
+            </a:r>
+            <a:r>
+              <a:rPr lang="en-GB" dirty="0"/>
+              <a:t> is a phenomenon that occurs in machine learning when a model is trained too well on the training data.</a:t>
+            </a:r>
+          </a:p>
+          <a:p>
+            <a:pPr marL="0" indent="0">
+              <a:buNone/>
+            </a:pPr>
+            <a:r>
+              <a:rPr lang="en-GB" dirty="0"/>
+              <a:t>As a result, it performs poorly on new, unseen data (here an apartment with 150sqm surface, which was not present in the training dataset).</a:t>
+            </a:r>
+            <a:endParaRPr lang="en-SG" dirty="0"/>
+          </a:p>
+        </p:txBody>
+      </p:sp>
+      <p:pic>
+        <p:nvPicPr>
+          <p:cNvPr id="8" name="Picture 7">
+            <a:extLst>
+              <a:ext uri="{FF2B5EF4-FFF2-40B4-BE49-F238E27FC236}">
+                <a16:creationId xmlns:a16="http://schemas.microsoft.com/office/drawing/2014/main" id="{F616AECF-3FED-9D77-4534-AD50FC5D5621}"/>
+              </a:ext>
+            </a:extLst>
+          </p:cNvPr>
+          <p:cNvPicPr>
+            <a:picLocks noChangeAspect="1"/>
+          </p:cNvPicPr>
+          <p:nvPr/>
+        </p:nvPicPr>
+        <p:blipFill>
+          <a:blip r:embed="rId2"/>
+          <a:stretch>
+            <a:fillRect/>
+          </a:stretch>
+        </p:blipFill>
+        <p:spPr>
+          <a:xfrm>
+            <a:off x="6313977" y="2305538"/>
+            <a:ext cx="5695389" cy="3804543"/>
+          </a:xfrm>
+          <a:prstGeom prst="rect">
+            <a:avLst/>
+          </a:prstGeom>
+        </p:spPr>
+      </p:pic>
+    </p:spTree>
+    <p:extLst>
+      <p:ext uri="{BB962C8B-B14F-4D97-AF65-F5344CB8AC3E}">
+        <p14:creationId xmlns:p14="http://schemas.microsoft.com/office/powerpoint/2010/main" val="658215501"/>
       </p:ext>
     </p:extLst>
   </p:cSld>
@@ -18002,46 +18099,97 @@
             </a:pPr>
             <a:r>
               <a:rPr lang="en-GB" dirty="0"/>
-              <a:t>As a result, it performs poorly on new, unseen data (here an apartment with 150sqm surface, which we had not in the training dataset).</a:t>
+              <a:t>As a result, it performs poorly on new, unseen data (here an apartment with 150sqm surface, which was not present in the training dataset).</a:t>
             </a:r>
             <a:endParaRPr lang="en-SG" dirty="0"/>
           </a:p>
         </p:txBody>
       </p:sp>
-      <p:pic>
-        <p:nvPicPr>
-          <p:cNvPr id="8" name="Picture 7">
+      <p:sp>
+        <p:nvSpPr>
+          <p:cNvPr id="2" name="Content Placeholder 1">
             <a:extLst>
               <a:ext uri="{FF2B5EF4-FFF2-40B4-BE49-F238E27FC236}">
-                <a16:creationId xmlns:a16="http://schemas.microsoft.com/office/drawing/2014/main" id="{F616AECF-3FED-9D77-4534-AD50FC5D5621}"/>
+                <a16:creationId xmlns:a16="http://schemas.microsoft.com/office/drawing/2014/main" id="{37C84060-31A2-3AFB-B38D-81D7652356D5}"/>
               </a:ext>
             </a:extLst>
           </p:cNvPr>
-          <p:cNvPicPr>
-            <a:picLocks noChangeAspect="1"/>
-          </p:cNvPicPr>
-          <p:nvPr/>
-        </p:nvPicPr>
-        <p:blipFill>
-          <a:blip r:embed="rId2"/>
-          <a:stretch>
-            <a:fillRect/>
-          </a:stretch>
-        </p:blipFill>
+          <p:cNvSpPr>
+            <a:spLocks noGrp="1"/>
+          </p:cNvSpPr>
+          <p:nvPr>
+            <p:ph sz="half" idx="2"/>
+          </p:nvPr>
+        </p:nvSpPr>
         <p:spPr>
           <a:xfrm>
-            <a:off x="6313977" y="2305538"/>
-            <a:ext cx="5695389" cy="3804543"/>
+            <a:off x="6172200" y="1825624"/>
+            <a:ext cx="5181600" cy="5032375"/>
           </a:xfrm>
-          <a:prstGeom prst="rect">
-            <a:avLst/>
-          </a:prstGeom>
         </p:spPr>
-      </p:pic>
+        <p:txBody>
+          <a:bodyPr>
+            <a:normAutofit/>
+          </a:bodyPr>
+          <a:lstStyle/>
+          <a:p>
+            <a:pPr marL="0" indent="0">
+              <a:buNone/>
+            </a:pPr>
+            <a:r>
+              <a:rPr lang="en-GB" dirty="0"/>
+              <a:t>This typically happens when</a:t>
+            </a:r>
+          </a:p>
+          <a:p>
+            <a:r>
+              <a:rPr lang="en-GB" dirty="0"/>
+              <a:t>a model is trained using too many features in the dataset,</a:t>
+            </a:r>
+          </a:p>
+          <a:p>
+            <a:r>
+              <a:rPr lang="en-GB" dirty="0"/>
+              <a:t>or has imbalance in the data.</a:t>
+            </a:r>
+          </a:p>
+          <a:p>
+            <a:pPr marL="0" indent="0">
+              <a:buNone/>
+            </a:pPr>
+            <a:r>
+              <a:rPr lang="en-GB" dirty="0"/>
+              <a:t>It becomes too complex for the task at hand, resulting in poor </a:t>
+            </a:r>
+            <a:r>
+              <a:rPr lang="en-GB" b="1" dirty="0">
+                <a:solidFill>
+                  <a:srgbClr val="7030A0"/>
+                </a:solidFill>
+              </a:rPr>
+              <a:t>generalization</a:t>
+            </a:r>
+            <a:r>
+              <a:rPr lang="en-GB" dirty="0"/>
+              <a:t> to new data.</a:t>
+            </a:r>
+          </a:p>
+          <a:p>
+            <a:pPr marL="0" indent="0">
+              <a:buNone/>
+            </a:pPr>
+            <a:r>
+              <a:rPr lang="en-GB" dirty="0"/>
+              <a:t>In other words, it memorizes the noise in the training data rather than learning the correct underlying pattern.</a:t>
+            </a:r>
+            <a:endParaRPr lang="en-SG" dirty="0"/>
+          </a:p>
+        </p:txBody>
+      </p:sp>
     </p:spTree>
     <p:extLst>
       <p:ext uri="{BB962C8B-B14F-4D97-AF65-F5344CB8AC3E}">
-        <p14:creationId xmlns:p14="http://schemas.microsoft.com/office/powerpoint/2010/main" val="658215501"/>
+        <p14:creationId xmlns:p14="http://schemas.microsoft.com/office/powerpoint/2010/main" val="1974002731"/>
       </p:ext>
     </p:extLst>
   </p:cSld>
@@ -18163,7 +18311,7 @@
             </a:pPr>
             <a:r>
               <a:rPr lang="en-GB" dirty="0"/>
-              <a:t>As a result, it performs poorly on new, unseen data (here an apartment with 150sqm surface, which we had not in the training dataset).</a:t>
+              <a:t>As a result, it performs poorly on new, unseen data (here an apartment with 150sqm surface, which was not present in the training dataset).</a:t>
             </a:r>
             <a:endParaRPr lang="en-SG" dirty="0"/>
           </a:p>
@@ -18202,218 +18350,6 @@
             </a:pPr>
             <a:r>
               <a:rPr lang="en-GB" dirty="0"/>
-              <a:t>This typically happens when</a:t>
-            </a:r>
-          </a:p>
-          <a:p>
-            <a:r>
-              <a:rPr lang="en-GB" dirty="0"/>
-              <a:t>a model is trained using too many features in the dataset,</a:t>
-            </a:r>
-          </a:p>
-          <a:p>
-            <a:r>
-              <a:rPr lang="en-GB" dirty="0"/>
-              <a:t>or has imbalance in the data.</a:t>
-            </a:r>
-          </a:p>
-          <a:p>
-            <a:pPr marL="0" indent="0">
-              <a:buNone/>
-            </a:pPr>
-            <a:r>
-              <a:rPr lang="en-GB" dirty="0"/>
-              <a:t>It becomes too complex for the task at hand, resulting in poor </a:t>
-            </a:r>
-            <a:r>
-              <a:rPr lang="en-GB" b="1" dirty="0">
-                <a:solidFill>
-                  <a:srgbClr val="7030A0"/>
-                </a:solidFill>
-              </a:rPr>
-              <a:t>generalization</a:t>
-            </a:r>
-            <a:r>
-              <a:rPr lang="en-GB" dirty="0"/>
-              <a:t> to new data.</a:t>
-            </a:r>
-          </a:p>
-          <a:p>
-            <a:pPr marL="0" indent="0">
-              <a:buNone/>
-            </a:pPr>
-            <a:r>
-              <a:rPr lang="en-GB" dirty="0"/>
-              <a:t>In other words, it memorizes the noise in the training data rather than learning the correct underlying pattern.</a:t>
-            </a:r>
-            <a:endParaRPr lang="en-SG" dirty="0"/>
-          </a:p>
-        </p:txBody>
-      </p:sp>
-    </p:spTree>
-    <p:extLst>
-      <p:ext uri="{BB962C8B-B14F-4D97-AF65-F5344CB8AC3E}">
-        <p14:creationId xmlns:p14="http://schemas.microsoft.com/office/powerpoint/2010/main" val="1974002731"/>
-      </p:ext>
-    </p:extLst>
-  </p:cSld>
-  <p:clrMapOvr>
-    <a:masterClrMapping/>
-  </p:clrMapOvr>
-</p:sld>
-</file>
-
-<file path=ppt/slides/slide23.xml><?xml version="1.0" encoding="utf-8"?>
-<p:sld xmlns:a="http://schemas.openxmlformats.org/drawingml/2006/main" xmlns:r="http://schemas.openxmlformats.org/officeDocument/2006/relationships" xmlns:p="http://schemas.openxmlformats.org/presentationml/2006/main">
-  <p:cSld>
-    <p:spTree>
-      <p:nvGrpSpPr>
-        <p:cNvPr id="1" name=""/>
-        <p:cNvGrpSpPr/>
-        <p:nvPr/>
-      </p:nvGrpSpPr>
-      <p:grpSpPr>
-        <a:xfrm>
-          <a:off x="0" y="0"/>
-          <a:ext cx="0" cy="0"/>
-          <a:chOff x="0" y="0"/>
-          <a:chExt cx="0" cy="0"/>
-        </a:xfrm>
-      </p:grpSpPr>
-      <p:sp>
-        <p:nvSpPr>
-          <p:cNvPr id="5" name="Title 4">
-            <a:extLst>
-              <a:ext uri="{FF2B5EF4-FFF2-40B4-BE49-F238E27FC236}">
-                <a16:creationId xmlns:a16="http://schemas.microsoft.com/office/drawing/2014/main" id="{BC884000-0FC9-A696-A696-8635960E124E}"/>
-              </a:ext>
-            </a:extLst>
-          </p:cNvPr>
-          <p:cNvSpPr>
-            <a:spLocks noGrp="1"/>
-          </p:cNvSpPr>
-          <p:nvPr>
-            <p:ph type="title"/>
-          </p:nvPr>
-        </p:nvSpPr>
-        <p:spPr/>
-        <p:txBody>
-          <a:bodyPr/>
-          <a:lstStyle/>
-          <a:p>
-            <a:r>
-              <a:rPr lang="en-GB" dirty="0"/>
-              <a:t>Overfitting vs. degree of polynomial</a:t>
-            </a:r>
-            <a:endParaRPr lang="en-SG" dirty="0"/>
-          </a:p>
-        </p:txBody>
-      </p:sp>
-      <p:sp>
-        <p:nvSpPr>
-          <p:cNvPr id="6" name="Content Placeholder 5">
-            <a:extLst>
-              <a:ext uri="{FF2B5EF4-FFF2-40B4-BE49-F238E27FC236}">
-                <a16:creationId xmlns:a16="http://schemas.microsoft.com/office/drawing/2014/main" id="{3FF27FA6-234D-EB6E-7AD4-4E52F151A639}"/>
-              </a:ext>
-            </a:extLst>
-          </p:cNvPr>
-          <p:cNvSpPr>
-            <a:spLocks noGrp="1"/>
-          </p:cNvSpPr>
-          <p:nvPr>
-            <p:ph sz="half" idx="1"/>
-          </p:nvPr>
-        </p:nvSpPr>
-        <p:spPr/>
-        <p:txBody>
-          <a:bodyPr>
-            <a:normAutofit/>
-          </a:bodyPr>
-          <a:lstStyle/>
-          <a:p>
-            <a:pPr marL="0" indent="0">
-              <a:buNone/>
-            </a:pPr>
-            <a:r>
-              <a:rPr lang="en-GB" b="1" dirty="0"/>
-              <a:t>Definition (</a:t>
-            </a:r>
-            <a:r>
-              <a:rPr lang="en-GB" b="1" dirty="0">
-                <a:solidFill>
-                  <a:srgbClr val="00B050"/>
-                </a:solidFill>
-              </a:rPr>
-              <a:t>Overfitting</a:t>
-            </a:r>
-            <a:r>
-              <a:rPr lang="en-GB" b="1" dirty="0"/>
-              <a:t>):</a:t>
-            </a:r>
-          </a:p>
-          <a:p>
-            <a:pPr marL="0" indent="0">
-              <a:buNone/>
-            </a:pPr>
-            <a:r>
-              <a:rPr lang="en-GB" b="1" dirty="0">
-                <a:solidFill>
-                  <a:srgbClr val="00B050"/>
-                </a:solidFill>
-              </a:rPr>
-              <a:t>Overfitting</a:t>
-            </a:r>
-            <a:r>
-              <a:rPr lang="en-GB" dirty="0"/>
-              <a:t> is a phenomenon that occurs in machine learning when a model is trained too well on the training data.</a:t>
-            </a:r>
-          </a:p>
-          <a:p>
-            <a:pPr marL="0" indent="0">
-              <a:buNone/>
-            </a:pPr>
-            <a:r>
-              <a:rPr lang="en-GB" dirty="0"/>
-              <a:t>As a result, it performs poorly on new, unseen data (here an apartment with 150sqm surface, which we had not in the training dataset).</a:t>
-            </a:r>
-            <a:endParaRPr lang="en-SG" dirty="0"/>
-          </a:p>
-        </p:txBody>
-      </p:sp>
-      <p:sp>
-        <p:nvSpPr>
-          <p:cNvPr id="2" name="Content Placeholder 1">
-            <a:extLst>
-              <a:ext uri="{FF2B5EF4-FFF2-40B4-BE49-F238E27FC236}">
-                <a16:creationId xmlns:a16="http://schemas.microsoft.com/office/drawing/2014/main" id="{37C84060-31A2-3AFB-B38D-81D7652356D5}"/>
-              </a:ext>
-            </a:extLst>
-          </p:cNvPr>
-          <p:cNvSpPr>
-            <a:spLocks noGrp="1"/>
-          </p:cNvSpPr>
-          <p:nvPr>
-            <p:ph sz="half" idx="2"/>
-          </p:nvPr>
-        </p:nvSpPr>
-        <p:spPr>
-          <a:xfrm>
-            <a:off x="6172200" y="1825624"/>
-            <a:ext cx="5181600" cy="5032375"/>
-          </a:xfrm>
-        </p:spPr>
-        <p:txBody>
-          <a:bodyPr>
-            <a:normAutofit/>
-          </a:bodyPr>
-          <a:lstStyle/>
-          <a:p>
-            <a:pPr marL="0" indent="0">
-              <a:buNone/>
-            </a:pPr>
-            <a:r>
-              <a:rPr lang="en-GB" dirty="0"/>
               <a:t>It also typically happens if the model complexity is too high compared to the dataset complexity.</a:t>
             </a:r>
           </a:p>
@@ -18448,7 +18384,7 @@
 </p:sld>
 </file>
 
-<file path=ppt/slides/slide24.xml><?xml version="1.0" encoding="utf-8"?>
+<file path=ppt/slides/slide23.xml><?xml version="1.0" encoding="utf-8"?>
 <p:sld xmlns:a="http://schemas.openxmlformats.org/drawingml/2006/main" xmlns:r="http://schemas.openxmlformats.org/officeDocument/2006/relationships" xmlns:p="http://schemas.openxmlformats.org/presentationml/2006/main">
   <p:cSld>
     <p:spTree>
@@ -18681,7 +18617,7 @@
 </p:sld>
 </file>
 
-<file path=ppt/slides/slide25.xml><?xml version="1.0" encoding="utf-8"?>
+<file path=ppt/slides/slide24.xml><?xml version="1.0" encoding="utf-8"?>
 <p:sld xmlns:a="http://schemas.openxmlformats.org/drawingml/2006/main" xmlns:r="http://schemas.openxmlformats.org/officeDocument/2006/relationships" xmlns:p="http://schemas.openxmlformats.org/presentationml/2006/main">
   <p:cSld>
     <p:spTree>
@@ -18904,7 +18840,7 @@
             </a:pPr>
             <a:r>
               <a:rPr lang="en-GB" dirty="0"/>
-              <a:t>This can happen when a model</a:t>
+              <a:t>As the opposite of overfitting, underfitting will typically happen when a model</a:t>
             </a:r>
           </a:p>
           <a:p>
@@ -18941,7 +18877,7 @@
 </p:sld>
 </file>
 
-<file path=ppt/slides/slide26.xml><?xml version="1.0" encoding="utf-8"?>
+<file path=ppt/slides/slide25.xml><?xml version="1.0" encoding="utf-8"?>
 <p:sld xmlns:a="http://schemas.openxmlformats.org/drawingml/2006/main" xmlns:r="http://schemas.openxmlformats.org/officeDocument/2006/relationships" xmlns:p="http://schemas.openxmlformats.org/presentationml/2006/main">
   <p:cSld>
     <p:spTree>
@@ -19053,15 +18989,7 @@
             </a:r>
             <a:r>
               <a:rPr lang="en-GB" b="1" dirty="0"/>
-              <a:t>"holy grail" of machine learning </a:t>
-            </a:r>
-            <a:r>
-              <a:rPr lang="en-GB" dirty="0"/>
-              <a:t>because it is the </a:t>
-            </a:r>
-            <a:r>
-              <a:rPr lang="en-GB" b="1" dirty="0"/>
-              <a:t>ultimate</a:t>
+              <a:t>"holy grail" or ultimate</a:t>
             </a:r>
             <a:r>
               <a:rPr lang="en-GB" dirty="0"/>
@@ -19149,7 +19077,7 @@
 </p:sld>
 </file>
 
-<file path=ppt/slides/slide27.xml><?xml version="1.0" encoding="utf-8"?>
+<file path=ppt/slides/slide26.xml><?xml version="1.0" encoding="utf-8"?>
 <p:sld xmlns:a="http://schemas.openxmlformats.org/drawingml/2006/main" xmlns:r="http://schemas.openxmlformats.org/officeDocument/2006/relationships" xmlns:p="http://schemas.openxmlformats.org/presentationml/2006/main">
   <p:cSld>
     <p:spTree>
@@ -19306,7 +19234,7 @@
 </p:sld>
 </file>
 
-<file path=ppt/slides/slide28.xml><?xml version="1.0" encoding="utf-8"?>
+<file path=ppt/slides/slide27.xml><?xml version="1.0" encoding="utf-8"?>
 <p:sld xmlns:a="http://schemas.openxmlformats.org/drawingml/2006/main" xmlns:r="http://schemas.openxmlformats.org/officeDocument/2006/relationships" xmlns:p="http://schemas.openxmlformats.org/presentationml/2006/main">
   <p:cSld>
     <p:spTree>
@@ -19528,7 +19456,7 @@
 </p:sld>
 </file>
 
-<file path=ppt/slides/slide29.xml><?xml version="1.0" encoding="utf-8"?>
+<file path=ppt/slides/slide28.xml><?xml version="1.0" encoding="utf-8"?>
 <p:sld xmlns:a="http://schemas.openxmlformats.org/drawingml/2006/main" xmlns:r="http://schemas.openxmlformats.org/officeDocument/2006/relationships" xmlns:p="http://schemas.openxmlformats.org/presentationml/2006/main">
   <p:cSld>
     <p:spTree>
@@ -19790,256 +19718,7 @@
 </p:sld>
 </file>
 
-<file path=ppt/slides/slide3.xml><?xml version="1.0" encoding="utf-8"?>
-<p:sld xmlns:a="http://schemas.openxmlformats.org/drawingml/2006/main" xmlns:r="http://schemas.openxmlformats.org/officeDocument/2006/relationships" xmlns:p="http://schemas.openxmlformats.org/presentationml/2006/main">
-  <p:cSld>
-    <p:spTree>
-      <p:nvGrpSpPr>
-        <p:cNvPr id="1" name=""/>
-        <p:cNvGrpSpPr/>
-        <p:nvPr/>
-      </p:nvGrpSpPr>
-      <p:grpSpPr>
-        <a:xfrm>
-          <a:off x="0" y="0"/>
-          <a:ext cx="0" cy="0"/>
-          <a:chOff x="0" y="0"/>
-          <a:chExt cx="0" cy="0"/>
-        </a:xfrm>
-      </p:grpSpPr>
-      <p:sp>
-        <p:nvSpPr>
-          <p:cNvPr id="2" name="Title 1">
-            <a:extLst>
-              <a:ext uri="{FF2B5EF4-FFF2-40B4-BE49-F238E27FC236}">
-                <a16:creationId xmlns:a16="http://schemas.microsoft.com/office/drawing/2014/main" id="{49D40417-A4D3-4CE8-96E7-708E2439AE7B}"/>
-              </a:ext>
-            </a:extLst>
-          </p:cNvPr>
-          <p:cNvSpPr>
-            <a:spLocks noGrp="1"/>
-          </p:cNvSpPr>
-          <p:nvPr>
-            <p:ph type="title"/>
-          </p:nvPr>
-        </p:nvSpPr>
-        <p:spPr/>
-        <p:txBody>
-          <a:bodyPr/>
-          <a:lstStyle/>
-          <a:p>
-            <a:r>
-              <a:rPr lang="en-US" dirty="0"/>
-              <a:t>About this week (Week 1)</a:t>
-            </a:r>
-            <a:endParaRPr lang="en-GB" dirty="0"/>
-          </a:p>
-        </p:txBody>
-      </p:sp>
-      <p:sp>
-        <p:nvSpPr>
-          <p:cNvPr id="3" name="Content Placeholder 2">
-            <a:extLst>
-              <a:ext uri="{FF2B5EF4-FFF2-40B4-BE49-F238E27FC236}">
-                <a16:creationId xmlns:a16="http://schemas.microsoft.com/office/drawing/2014/main" id="{35995840-A9D9-479A-A34F-EA7DC229D38E}"/>
-              </a:ext>
-            </a:extLst>
-          </p:cNvPr>
-          <p:cNvSpPr>
-            <a:spLocks noGrp="1"/>
-          </p:cNvSpPr>
-          <p:nvPr>
-            <p:ph idx="1"/>
-          </p:nvPr>
-        </p:nvSpPr>
-        <p:spPr>
-          <a:xfrm>
-            <a:off x="838200" y="1825625"/>
-            <a:ext cx="10515600" cy="4827102"/>
-          </a:xfrm>
-        </p:spPr>
-        <p:txBody>
-          <a:bodyPr/>
-          <a:lstStyle/>
-          <a:p>
-            <a:pPr marL="514350" indent="-514350">
-              <a:buFont typeface="+mj-lt"/>
-              <a:buAutoNum type="arabicPeriod" startAt="8"/>
-            </a:pPr>
-            <a:r>
-              <a:rPr lang="en-US" dirty="0"/>
-              <a:t>What is </a:t>
-            </a:r>
-            <a:r>
-              <a:rPr lang="en-US" b="1" dirty="0"/>
-              <a:t>overfitting</a:t>
-            </a:r>
-            <a:r>
-              <a:rPr lang="en-US" dirty="0"/>
-              <a:t> and why is it bad?</a:t>
-            </a:r>
-          </a:p>
-          <a:p>
-            <a:pPr marL="514350" indent="-514350">
-              <a:buFont typeface="+mj-lt"/>
-              <a:buAutoNum type="arabicPeriod" startAt="8"/>
-            </a:pPr>
-            <a:r>
-              <a:rPr lang="en-US" dirty="0"/>
-              <a:t>What is </a:t>
-            </a:r>
-            <a:r>
-              <a:rPr lang="en-US" b="1" dirty="0"/>
-              <a:t>underfitting</a:t>
-            </a:r>
-            <a:r>
-              <a:rPr lang="en-US" dirty="0"/>
-              <a:t> and why is it bad?</a:t>
-            </a:r>
-          </a:p>
-          <a:p>
-            <a:pPr marL="514350" indent="-514350">
-              <a:buFont typeface="+mj-lt"/>
-              <a:buAutoNum type="arabicPeriod" startAt="8"/>
-            </a:pPr>
-            <a:r>
-              <a:rPr lang="en-US" dirty="0"/>
-              <a:t>What is </a:t>
-            </a:r>
-            <a:r>
-              <a:rPr lang="en-US" b="1" dirty="0"/>
-              <a:t>generalization</a:t>
-            </a:r>
-            <a:r>
-              <a:rPr lang="en-US" dirty="0"/>
-              <a:t> and how to evaluate it?</a:t>
-            </a:r>
-          </a:p>
-          <a:p>
-            <a:pPr marL="514350" indent="-514350">
-              <a:buFont typeface="+mj-lt"/>
-              <a:buAutoNum type="arabicPeriod" startAt="8"/>
-            </a:pPr>
-            <a:r>
-              <a:rPr lang="en-US" dirty="0"/>
-              <a:t>What is a </a:t>
-            </a:r>
-            <a:r>
-              <a:rPr lang="en-US" b="1" dirty="0"/>
-              <a:t>train-test</a:t>
-            </a:r>
-            <a:r>
-              <a:rPr lang="en-US" dirty="0"/>
-              <a:t> </a:t>
-            </a:r>
-            <a:r>
-              <a:rPr lang="en-US" b="1" dirty="0"/>
-              <a:t>split</a:t>
-            </a:r>
-            <a:r>
-              <a:rPr lang="en-US" dirty="0"/>
-              <a:t> and why is it related to </a:t>
-            </a:r>
-            <a:r>
-              <a:rPr lang="en-US" b="1" dirty="0"/>
-              <a:t>generalization</a:t>
-            </a:r>
-            <a:r>
-              <a:rPr lang="en-US" dirty="0"/>
-              <a:t>?</a:t>
-            </a:r>
-          </a:p>
-          <a:p>
-            <a:pPr marL="514350" indent="-514350">
-              <a:buFont typeface="+mj-lt"/>
-              <a:buAutoNum type="arabicPeriod" startAt="8"/>
-            </a:pPr>
-            <a:r>
-              <a:rPr lang="en-US" dirty="0"/>
-              <a:t>What is a </a:t>
-            </a:r>
-            <a:r>
-              <a:rPr lang="en-US" b="1" dirty="0"/>
-              <a:t>sigmoid</a:t>
-            </a:r>
-            <a:r>
-              <a:rPr lang="en-US" dirty="0"/>
-              <a:t> function? What is a </a:t>
-            </a:r>
-            <a:r>
-              <a:rPr lang="en-US" b="1" dirty="0"/>
-              <a:t>logistic</a:t>
-            </a:r>
-            <a:r>
-              <a:rPr lang="en-US" dirty="0"/>
-              <a:t> function?</a:t>
-            </a:r>
-          </a:p>
-          <a:p>
-            <a:pPr marL="514350" indent="-514350">
-              <a:buFont typeface="+mj-lt"/>
-              <a:buAutoNum type="arabicPeriod" startAt="8"/>
-            </a:pPr>
-            <a:r>
-              <a:rPr lang="en-US" dirty="0"/>
-              <a:t>How to perform </a:t>
-            </a:r>
-            <a:r>
-              <a:rPr lang="en-US" b="1" dirty="0"/>
-              <a:t>binary</a:t>
-            </a:r>
-            <a:r>
-              <a:rPr lang="en-US" dirty="0"/>
-              <a:t> </a:t>
-            </a:r>
-            <a:r>
-              <a:rPr lang="en-US" b="1" dirty="0"/>
-              <a:t>classification</a:t>
-            </a:r>
-            <a:r>
-              <a:rPr lang="en-US" dirty="0"/>
-              <a:t> using a </a:t>
-            </a:r>
-            <a:r>
-              <a:rPr lang="en-US" b="1" dirty="0"/>
-              <a:t>logistic</a:t>
-            </a:r>
-            <a:r>
-              <a:rPr lang="en-US" dirty="0"/>
-              <a:t> </a:t>
-            </a:r>
-            <a:r>
-              <a:rPr lang="en-US" b="1" dirty="0"/>
-              <a:t>regressor</a:t>
-            </a:r>
-            <a:r>
-              <a:rPr lang="en-US" dirty="0"/>
-              <a:t> and how is it related to linear regression?</a:t>
-            </a:r>
-          </a:p>
-          <a:p>
-            <a:pPr marL="514350" indent="-514350">
-              <a:buFont typeface="+mj-lt"/>
-              <a:buAutoNum type="arabicPeriod" startAt="8"/>
-            </a:pPr>
-            <a:endParaRPr lang="en-GB" dirty="0"/>
-          </a:p>
-        </p:txBody>
-      </p:sp>
-    </p:spTree>
-    <p:extLst>
-      <p:ext uri="{BB962C8B-B14F-4D97-AF65-F5344CB8AC3E}">
-        <p14:creationId xmlns:p14="http://schemas.microsoft.com/office/powerpoint/2010/main" val="1464669599"/>
-      </p:ext>
-    </p:extLst>
-  </p:cSld>
-  <p:clrMapOvr>
-    <a:masterClrMapping/>
-  </p:clrMapOvr>
-</p:sld>
-</file>
-
-<file path=ppt/slides/slide30.xml><?xml version="1.0" encoding="utf-8"?>
+<file path=ppt/slides/slide29.xml><?xml version="1.0" encoding="utf-8"?>
 <p:sld xmlns:a="http://schemas.openxmlformats.org/drawingml/2006/main" xmlns:r="http://schemas.openxmlformats.org/officeDocument/2006/relationships" xmlns:p="http://schemas.openxmlformats.org/presentationml/2006/main">
   <p:cSld>
     <p:spTree>
@@ -20128,7 +19807,256 @@
 </p:sld>
 </file>
 
-<file path=ppt/slides/slide31.xml><?xml version="1.0" encoding="utf-8"?>
+<file path=ppt/slides/slide3.xml><?xml version="1.0" encoding="utf-8"?>
+<p:sld xmlns:a="http://schemas.openxmlformats.org/drawingml/2006/main" xmlns:r="http://schemas.openxmlformats.org/officeDocument/2006/relationships" xmlns:p="http://schemas.openxmlformats.org/presentationml/2006/main">
+  <p:cSld>
+    <p:spTree>
+      <p:nvGrpSpPr>
+        <p:cNvPr id="1" name=""/>
+        <p:cNvGrpSpPr/>
+        <p:nvPr/>
+      </p:nvGrpSpPr>
+      <p:grpSpPr>
+        <a:xfrm>
+          <a:off x="0" y="0"/>
+          <a:ext cx="0" cy="0"/>
+          <a:chOff x="0" y="0"/>
+          <a:chExt cx="0" cy="0"/>
+        </a:xfrm>
+      </p:grpSpPr>
+      <p:sp>
+        <p:nvSpPr>
+          <p:cNvPr id="2" name="Title 1">
+            <a:extLst>
+              <a:ext uri="{FF2B5EF4-FFF2-40B4-BE49-F238E27FC236}">
+                <a16:creationId xmlns:a16="http://schemas.microsoft.com/office/drawing/2014/main" id="{49D40417-A4D3-4CE8-96E7-708E2439AE7B}"/>
+              </a:ext>
+            </a:extLst>
+          </p:cNvPr>
+          <p:cNvSpPr>
+            <a:spLocks noGrp="1"/>
+          </p:cNvSpPr>
+          <p:nvPr>
+            <p:ph type="title"/>
+          </p:nvPr>
+        </p:nvSpPr>
+        <p:spPr/>
+        <p:txBody>
+          <a:bodyPr/>
+          <a:lstStyle/>
+          <a:p>
+            <a:r>
+              <a:rPr lang="en-US" dirty="0"/>
+              <a:t>About this week (Week 1)</a:t>
+            </a:r>
+            <a:endParaRPr lang="en-GB" dirty="0"/>
+          </a:p>
+        </p:txBody>
+      </p:sp>
+      <p:sp>
+        <p:nvSpPr>
+          <p:cNvPr id="3" name="Content Placeholder 2">
+            <a:extLst>
+              <a:ext uri="{FF2B5EF4-FFF2-40B4-BE49-F238E27FC236}">
+                <a16:creationId xmlns:a16="http://schemas.microsoft.com/office/drawing/2014/main" id="{35995840-A9D9-479A-A34F-EA7DC229D38E}"/>
+              </a:ext>
+            </a:extLst>
+          </p:cNvPr>
+          <p:cNvSpPr>
+            <a:spLocks noGrp="1"/>
+          </p:cNvSpPr>
+          <p:nvPr>
+            <p:ph idx="1"/>
+          </p:nvPr>
+        </p:nvSpPr>
+        <p:spPr>
+          <a:xfrm>
+            <a:off x="838200" y="1825625"/>
+            <a:ext cx="10515600" cy="4827102"/>
+          </a:xfrm>
+        </p:spPr>
+        <p:txBody>
+          <a:bodyPr/>
+          <a:lstStyle/>
+          <a:p>
+            <a:pPr marL="514350" indent="-514350">
+              <a:buFont typeface="+mj-lt"/>
+              <a:buAutoNum type="arabicPeriod" startAt="8"/>
+            </a:pPr>
+            <a:r>
+              <a:rPr lang="en-US" dirty="0"/>
+              <a:t>What is </a:t>
+            </a:r>
+            <a:r>
+              <a:rPr lang="en-US" b="1" dirty="0"/>
+              <a:t>overfitting</a:t>
+            </a:r>
+            <a:r>
+              <a:rPr lang="en-US" dirty="0"/>
+              <a:t> and why is it bad?</a:t>
+            </a:r>
+          </a:p>
+          <a:p>
+            <a:pPr marL="514350" indent="-514350">
+              <a:buFont typeface="+mj-lt"/>
+              <a:buAutoNum type="arabicPeriod" startAt="8"/>
+            </a:pPr>
+            <a:r>
+              <a:rPr lang="en-US" dirty="0"/>
+              <a:t>What is </a:t>
+            </a:r>
+            <a:r>
+              <a:rPr lang="en-US" b="1" dirty="0"/>
+              <a:t>underfitting</a:t>
+            </a:r>
+            <a:r>
+              <a:rPr lang="en-US" dirty="0"/>
+              <a:t> and why is it bad?</a:t>
+            </a:r>
+          </a:p>
+          <a:p>
+            <a:pPr marL="514350" indent="-514350">
+              <a:buFont typeface="+mj-lt"/>
+              <a:buAutoNum type="arabicPeriod" startAt="8"/>
+            </a:pPr>
+            <a:r>
+              <a:rPr lang="en-US" dirty="0"/>
+              <a:t>What is </a:t>
+            </a:r>
+            <a:r>
+              <a:rPr lang="en-US" b="1" dirty="0"/>
+              <a:t>generalization</a:t>
+            </a:r>
+            <a:r>
+              <a:rPr lang="en-US" dirty="0"/>
+              <a:t> and how to evaluate it?</a:t>
+            </a:r>
+          </a:p>
+          <a:p>
+            <a:pPr marL="514350" indent="-514350">
+              <a:buFont typeface="+mj-lt"/>
+              <a:buAutoNum type="arabicPeriod" startAt="8"/>
+            </a:pPr>
+            <a:r>
+              <a:rPr lang="en-US" dirty="0"/>
+              <a:t>What is a </a:t>
+            </a:r>
+            <a:r>
+              <a:rPr lang="en-US" b="1" dirty="0"/>
+              <a:t>train-test</a:t>
+            </a:r>
+            <a:r>
+              <a:rPr lang="en-US" dirty="0"/>
+              <a:t> </a:t>
+            </a:r>
+            <a:r>
+              <a:rPr lang="en-US" b="1" dirty="0"/>
+              <a:t>split</a:t>
+            </a:r>
+            <a:r>
+              <a:rPr lang="en-US" dirty="0"/>
+              <a:t> and why is it related to </a:t>
+            </a:r>
+            <a:r>
+              <a:rPr lang="en-US" b="1" dirty="0"/>
+              <a:t>generalization</a:t>
+            </a:r>
+            <a:r>
+              <a:rPr lang="en-US" dirty="0"/>
+              <a:t>?</a:t>
+            </a:r>
+          </a:p>
+          <a:p>
+            <a:pPr marL="514350" indent="-514350">
+              <a:buFont typeface="+mj-lt"/>
+              <a:buAutoNum type="arabicPeriod" startAt="8"/>
+            </a:pPr>
+            <a:r>
+              <a:rPr lang="en-US" dirty="0"/>
+              <a:t>What is a </a:t>
+            </a:r>
+            <a:r>
+              <a:rPr lang="en-US" b="1" dirty="0"/>
+              <a:t>sigmoid</a:t>
+            </a:r>
+            <a:r>
+              <a:rPr lang="en-US" dirty="0"/>
+              <a:t> function? What is a </a:t>
+            </a:r>
+            <a:r>
+              <a:rPr lang="en-US" b="1" dirty="0"/>
+              <a:t>logistic</a:t>
+            </a:r>
+            <a:r>
+              <a:rPr lang="en-US" dirty="0"/>
+              <a:t> function?</a:t>
+            </a:r>
+          </a:p>
+          <a:p>
+            <a:pPr marL="514350" indent="-514350">
+              <a:buFont typeface="+mj-lt"/>
+              <a:buAutoNum type="arabicPeriod" startAt="8"/>
+            </a:pPr>
+            <a:r>
+              <a:rPr lang="en-US" dirty="0"/>
+              <a:t>How to perform </a:t>
+            </a:r>
+            <a:r>
+              <a:rPr lang="en-US" b="1" dirty="0"/>
+              <a:t>binary</a:t>
+            </a:r>
+            <a:r>
+              <a:rPr lang="en-US" dirty="0"/>
+              <a:t> </a:t>
+            </a:r>
+            <a:r>
+              <a:rPr lang="en-US" b="1" dirty="0"/>
+              <a:t>classification</a:t>
+            </a:r>
+            <a:r>
+              <a:rPr lang="en-US" dirty="0"/>
+              <a:t> using a </a:t>
+            </a:r>
+            <a:r>
+              <a:rPr lang="en-US" b="1" dirty="0"/>
+              <a:t>logistic</a:t>
+            </a:r>
+            <a:r>
+              <a:rPr lang="en-US" dirty="0"/>
+              <a:t> </a:t>
+            </a:r>
+            <a:r>
+              <a:rPr lang="en-US" b="1" dirty="0"/>
+              <a:t>regressor</a:t>
+            </a:r>
+            <a:r>
+              <a:rPr lang="en-US" dirty="0"/>
+              <a:t> and how is it related to linear regression?</a:t>
+            </a:r>
+          </a:p>
+          <a:p>
+            <a:pPr marL="514350" indent="-514350">
+              <a:buFont typeface="+mj-lt"/>
+              <a:buAutoNum type="arabicPeriod" startAt="8"/>
+            </a:pPr>
+            <a:endParaRPr lang="en-GB" dirty="0"/>
+          </a:p>
+        </p:txBody>
+      </p:sp>
+    </p:spTree>
+    <p:extLst>
+      <p:ext uri="{BB962C8B-B14F-4D97-AF65-F5344CB8AC3E}">
+        <p14:creationId xmlns:p14="http://schemas.microsoft.com/office/powerpoint/2010/main" val="1464669599"/>
+      </p:ext>
+    </p:extLst>
+  </p:cSld>
+  <p:clrMapOvr>
+    <a:masterClrMapping/>
+  </p:clrMapOvr>
+</p:sld>
+</file>
+
+<file path=ppt/slides/slide30.xml><?xml version="1.0" encoding="utf-8"?>
 <p:sld xmlns:a="http://schemas.openxmlformats.org/drawingml/2006/main" xmlns:r="http://schemas.openxmlformats.org/officeDocument/2006/relationships" xmlns:p="http://schemas.openxmlformats.org/presentationml/2006/main">
   <p:cSld>
     <p:spTree>
@@ -20188,7 +20116,7 @@
 </p:sld>
 </file>
 
-<file path=ppt/slides/slide32.xml><?xml version="1.0" encoding="utf-8"?>
+<file path=ppt/slides/slide31.xml><?xml version="1.0" encoding="utf-8"?>
 <p:sld xmlns:a="http://schemas.openxmlformats.org/drawingml/2006/main" xmlns:r="http://schemas.openxmlformats.org/officeDocument/2006/relationships" xmlns:p="http://schemas.openxmlformats.org/presentationml/2006/main">
   <p:cSld>
     <p:spTree>
@@ -20312,7 +20240,7 @@
 </p:sld>
 </file>
 
-<file path=ppt/slides/slide33.xml><?xml version="1.0" encoding="utf-8"?>
+<file path=ppt/slides/slide32.xml><?xml version="1.0" encoding="utf-8"?>
 <p:sld xmlns:a="http://schemas.openxmlformats.org/drawingml/2006/main" xmlns:r="http://schemas.openxmlformats.org/officeDocument/2006/relationships" xmlns:p="http://schemas.openxmlformats.org/presentationml/2006/main">
   <p:cSld>
     <p:spTree>
@@ -20373,8 +20301,8 @@
         </p:nvSpPr>
         <p:spPr>
           <a:xfrm>
-            <a:off x="2802932" y="2011728"/>
-            <a:ext cx="3863591" cy="1754326"/>
+            <a:off x="2724274" y="1529947"/>
+            <a:ext cx="3863591" cy="2677656"/>
           </a:xfrm>
           <a:prstGeom prst="rect">
             <a:avLst/>
@@ -20389,7 +20317,7 @@
           <a:p>
             <a:pPr algn="ctr"/>
             <a:r>
-              <a:rPr lang="en-GB" b="1" dirty="0">
+              <a:rPr lang="en-GB" sz="2400" b="1" dirty="0">
                 <a:solidFill>
                   <a:schemeClr val="accent2"/>
                 </a:solidFill>
@@ -20399,7 +20327,7 @@
           </a:p>
           <a:p>
             <a:pPr algn="ctr"/>
-            <a:endParaRPr lang="en-GB" b="1" dirty="0">
+            <a:endParaRPr lang="en-GB" sz="2400" b="1" dirty="0">
               <a:solidFill>
                 <a:schemeClr val="accent2"/>
               </a:solidFill>
@@ -20408,14 +20336,14 @@
           <a:p>
             <a:pPr algn="ctr"/>
             <a:r>
-              <a:rPr lang="en-GB" b="1" dirty="0">
+              <a:rPr lang="en-GB" sz="2400" b="1" dirty="0">
                 <a:solidFill>
                   <a:schemeClr val="accent2"/>
                 </a:solidFill>
               </a:rPr>
               <a:t>What could be the reason?</a:t>
             </a:r>
-            <a:endParaRPr lang="en-SG" b="1" dirty="0">
+            <a:endParaRPr lang="en-SG" sz="2400" b="1" dirty="0">
               <a:solidFill>
                 <a:schemeClr val="accent2"/>
               </a:solidFill>
@@ -20436,7 +20364,7 @@
 </p:sld>
 </file>
 
-<file path=ppt/slides/slide34.xml><?xml version="1.0" encoding="utf-8"?>
+<file path=ppt/slides/slide33.xml><?xml version="1.0" encoding="utf-8"?>
 <p:sld xmlns:a="http://schemas.openxmlformats.org/drawingml/2006/main" xmlns:r="http://schemas.openxmlformats.org/officeDocument/2006/relationships" xmlns:p="http://schemas.openxmlformats.org/presentationml/2006/main">
   <p:cSld>
     <p:spTree>
@@ -20483,70 +20411,6 @@
           </a:prstGeom>
         </p:spPr>
       </p:pic>
-      <p:sp>
-        <p:nvSpPr>
-          <p:cNvPr id="6" name="TextBox 5">
-            <a:extLst>
-              <a:ext uri="{FF2B5EF4-FFF2-40B4-BE49-F238E27FC236}">
-                <a16:creationId xmlns:a16="http://schemas.microsoft.com/office/drawing/2014/main" id="{E104F76B-BBAC-9021-8132-85B53E4D630A}"/>
-              </a:ext>
-            </a:extLst>
-          </p:cNvPr>
-          <p:cNvSpPr txBox="1"/>
-          <p:nvPr/>
-        </p:nvSpPr>
-        <p:spPr>
-          <a:xfrm>
-            <a:off x="2802932" y="2011728"/>
-            <a:ext cx="3863591" cy="1754326"/>
-          </a:xfrm>
-          <a:prstGeom prst="rect">
-            <a:avLst/>
-          </a:prstGeom>
-          <a:noFill/>
-        </p:spPr>
-        <p:txBody>
-          <a:bodyPr wrap="square" rtlCol="0">
-            <a:spAutoFit/>
-          </a:bodyPr>
-          <a:lstStyle/>
-          <a:p>
-            <a:pPr algn="ctr"/>
-            <a:r>
-              <a:rPr lang="en-GB" b="1" dirty="0">
-                <a:solidFill>
-                  <a:schemeClr val="accent2"/>
-                </a:solidFill>
-              </a:rPr>
-              <a:t>Red curve is higher degree polynomial regression. While it seems like it should perform better than black, its test loss is higher!</a:t>
-            </a:r>
-          </a:p>
-          <a:p>
-            <a:pPr algn="ctr"/>
-            <a:endParaRPr lang="en-GB" b="1" dirty="0">
-              <a:solidFill>
-                <a:schemeClr val="accent2"/>
-              </a:solidFill>
-            </a:endParaRPr>
-          </a:p>
-          <a:p>
-            <a:pPr algn="ctr"/>
-            <a:r>
-              <a:rPr lang="en-GB" b="1" dirty="0">
-                <a:solidFill>
-                  <a:schemeClr val="accent2"/>
-                </a:solidFill>
-              </a:rPr>
-              <a:t>What could be the reason?</a:t>
-            </a:r>
-            <a:endParaRPr lang="en-SG" b="1" dirty="0">
-              <a:solidFill>
-                <a:schemeClr val="accent2"/>
-              </a:solidFill>
-            </a:endParaRPr>
-          </a:p>
-        </p:txBody>
-      </p:sp>
       <p:sp>
         <p:nvSpPr>
           <p:cNvPr id="2" name="Oval 1">
@@ -20614,8 +20478,8 @@
         </p:nvSpPr>
         <p:spPr>
           <a:xfrm>
-            <a:off x="7416561" y="4784635"/>
-            <a:ext cx="3087315" cy="1200329"/>
+            <a:off x="7583709" y="4007887"/>
+            <a:ext cx="3087315" cy="1938992"/>
           </a:xfrm>
           <a:prstGeom prst="rect">
             <a:avLst/>
@@ -20630,7 +20494,7 @@
           <a:p>
             <a:pPr algn="ctr"/>
             <a:r>
-              <a:rPr lang="en-GB" b="1" dirty="0">
+              <a:rPr lang="en-GB" sz="2400" b="1" dirty="0">
                 <a:solidFill>
                   <a:schemeClr val="accent2"/>
                 </a:solidFill>
@@ -20641,14 +20505,78 @@
           <a:p>
             <a:pPr algn="ctr"/>
             <a:r>
-              <a:rPr lang="en-GB" b="1" dirty="0">
+              <a:rPr lang="en-GB" sz="2400" b="1" dirty="0">
                 <a:solidFill>
                   <a:schemeClr val="accent2"/>
                 </a:solidFill>
               </a:rPr>
               <a:t>(No apartment with size less than 45sqm in train dataset!)</a:t>
             </a:r>
-            <a:endParaRPr lang="en-SG" b="1" dirty="0">
+            <a:endParaRPr lang="en-SG" sz="2400" b="1" dirty="0">
+              <a:solidFill>
+                <a:schemeClr val="accent2"/>
+              </a:solidFill>
+            </a:endParaRPr>
+          </a:p>
+        </p:txBody>
+      </p:sp>
+      <p:sp>
+        <p:nvSpPr>
+          <p:cNvPr id="4" name="TextBox 3">
+            <a:extLst>
+              <a:ext uri="{FF2B5EF4-FFF2-40B4-BE49-F238E27FC236}">
+                <a16:creationId xmlns:a16="http://schemas.microsoft.com/office/drawing/2014/main" id="{65EE1994-5E25-58AB-E291-D5D57427A351}"/>
+              </a:ext>
+            </a:extLst>
+          </p:cNvPr>
+          <p:cNvSpPr txBox="1"/>
+          <p:nvPr/>
+        </p:nvSpPr>
+        <p:spPr>
+          <a:xfrm>
+            <a:off x="2724274" y="1529947"/>
+            <a:ext cx="3863591" cy="2677656"/>
+          </a:xfrm>
+          <a:prstGeom prst="rect">
+            <a:avLst/>
+          </a:prstGeom>
+          <a:noFill/>
+        </p:spPr>
+        <p:txBody>
+          <a:bodyPr wrap="square" rtlCol="0">
+            <a:spAutoFit/>
+          </a:bodyPr>
+          <a:lstStyle/>
+          <a:p>
+            <a:pPr algn="ctr"/>
+            <a:r>
+              <a:rPr lang="en-GB" sz="2400" b="1" dirty="0">
+                <a:solidFill>
+                  <a:schemeClr val="accent2"/>
+                </a:solidFill>
+              </a:rPr>
+              <a:t>Red curve is higher degree polynomial regression. While it seems like it should perform better than black, its test loss is higher!</a:t>
+            </a:r>
+          </a:p>
+          <a:p>
+            <a:pPr algn="ctr"/>
+            <a:endParaRPr lang="en-GB" sz="2400" b="1" dirty="0">
+              <a:solidFill>
+                <a:schemeClr val="accent2"/>
+              </a:solidFill>
+            </a:endParaRPr>
+          </a:p>
+          <a:p>
+            <a:pPr algn="ctr"/>
+            <a:r>
+              <a:rPr lang="en-GB" sz="2400" b="1" dirty="0">
+                <a:solidFill>
+                  <a:schemeClr val="accent2"/>
+                </a:solidFill>
+              </a:rPr>
+              <a:t>What could be the reason?</a:t>
+            </a:r>
+            <a:endParaRPr lang="en-SG" sz="2400" b="1" dirty="0">
               <a:solidFill>
                 <a:schemeClr val="accent2"/>
               </a:solidFill>
@@ -20669,7 +20597,7 @@
 </p:sld>
 </file>
 
-<file path=ppt/slides/slide35.xml><?xml version="1.0" encoding="utf-8"?>
+<file path=ppt/slides/slide34.xml><?xml version="1.0" encoding="utf-8"?>
 <p:sld xmlns:a="http://schemas.openxmlformats.org/drawingml/2006/main" xmlns:r="http://schemas.openxmlformats.org/officeDocument/2006/relationships" xmlns:p="http://schemas.openxmlformats.org/presentationml/2006/main">
   <p:cSld>
     <p:spTree>
@@ -20812,7 +20740,7 @@
 </p:sld>
 </file>
 
-<file path=ppt/slides/slide36.xml><?xml version="1.0" encoding="utf-8"?>
+<file path=ppt/slides/slide35.xml><?xml version="1.0" encoding="utf-8"?>
 <p:sld xmlns:a="http://schemas.openxmlformats.org/drawingml/2006/main" xmlns:r="http://schemas.openxmlformats.org/officeDocument/2006/relationships" xmlns:p="http://schemas.openxmlformats.org/presentationml/2006/main">
   <p:cSld>
     <p:spTree>
@@ -21085,7 +21013,7 @@
 </p:sld>
 </file>
 
-<file path=ppt/slides/slide37.xml><?xml version="1.0" encoding="utf-8"?>
+<file path=ppt/slides/slide36.xml><?xml version="1.0" encoding="utf-8"?>
 <p:sld xmlns:a="http://schemas.openxmlformats.org/drawingml/2006/main" xmlns:r="http://schemas.openxmlformats.org/officeDocument/2006/relationships" xmlns:p="http://schemas.openxmlformats.org/presentationml/2006/main">
   <p:cSld>
     <p:spTree>
@@ -21147,7 +21075,7 @@
         <p:spPr>
           <a:xfrm>
             <a:off x="2802932" y="2011728"/>
-            <a:ext cx="3355591" cy="923330"/>
+            <a:ext cx="3355591" cy="1569660"/>
           </a:xfrm>
           <a:prstGeom prst="rect">
             <a:avLst/>
@@ -21162,14 +21090,14 @@
           <a:p>
             <a:pPr algn="ctr"/>
             <a:r>
-              <a:rPr lang="en-GB" b="1" dirty="0">
+              <a:rPr lang="en-GB" sz="2400" b="1" dirty="0">
                 <a:solidFill>
                   <a:schemeClr val="accent2"/>
                 </a:solidFill>
               </a:rPr>
               <a:t>But then, why did black end up being ok then? It had not seen the &lt;45sqm data either!</a:t>
             </a:r>
-            <a:endParaRPr lang="en-SG" b="1" dirty="0">
+            <a:endParaRPr lang="en-SG" sz="2400" b="1" dirty="0">
               <a:solidFill>
                 <a:schemeClr val="accent2"/>
               </a:solidFill>
@@ -21243,7 +21171,7 @@
 </p:sld>
 </file>
 
-<file path=ppt/slides/slide38.xml><?xml version="1.0" encoding="utf-8"?>
+<file path=ppt/slides/slide37.xml><?xml version="1.0" encoding="utf-8"?>
 <p:sld xmlns:a="http://schemas.openxmlformats.org/drawingml/2006/main" xmlns:r="http://schemas.openxmlformats.org/officeDocument/2006/relationships" xmlns:p="http://schemas.openxmlformats.org/presentationml/2006/main">
   <p:cSld>
     <p:spTree>
@@ -21435,7 +21363,7 @@
 </p:sld>
 </file>
 
-<file path=ppt/slides/slide39.xml><?xml version="1.0" encoding="utf-8"?>
+<file path=ppt/slides/slide38.xml><?xml version="1.0" encoding="utf-8"?>
 <p:sld xmlns:a="http://schemas.openxmlformats.org/drawingml/2006/main" xmlns:r="http://schemas.openxmlformats.org/officeDocument/2006/relationships" xmlns:p="http://schemas.openxmlformats.org/presentationml/2006/main">
   <p:cSld>
     <p:spTree>
@@ -21703,334 +21631,7 @@
 </p:sld>
 </file>
 
-<file path=ppt/slides/slide4.xml><?xml version="1.0" encoding="utf-8"?>
-<p:sld xmlns:a="http://schemas.openxmlformats.org/drawingml/2006/main" xmlns:r="http://schemas.openxmlformats.org/officeDocument/2006/relationships" xmlns:p="http://schemas.openxmlformats.org/presentationml/2006/main">
-  <p:cSld>
-    <p:spTree>
-      <p:nvGrpSpPr>
-        <p:cNvPr id="1" name=""/>
-        <p:cNvGrpSpPr/>
-        <p:nvPr/>
-      </p:nvGrpSpPr>
-      <p:grpSpPr>
-        <a:xfrm>
-          <a:off x="0" y="0"/>
-          <a:ext cx="0" cy="0"/>
-          <a:chOff x="0" y="0"/>
-          <a:chExt cx="0" cy="0"/>
-        </a:xfrm>
-      </p:grpSpPr>
-      <p:sp>
-        <p:nvSpPr>
-          <p:cNvPr id="2" name="Title 1">
-            <a:extLst>
-              <a:ext uri="{FF2B5EF4-FFF2-40B4-BE49-F238E27FC236}">
-                <a16:creationId xmlns:a16="http://schemas.microsoft.com/office/drawing/2014/main" id="{49D40417-A4D3-4CE8-96E7-708E2439AE7B}"/>
-              </a:ext>
-            </a:extLst>
-          </p:cNvPr>
-          <p:cNvSpPr>
-            <a:spLocks noGrp="1"/>
-          </p:cNvSpPr>
-          <p:nvPr>
-            <p:ph type="title"/>
-          </p:nvPr>
-        </p:nvSpPr>
-        <p:spPr/>
-        <p:txBody>
-          <a:bodyPr/>
-          <a:lstStyle/>
-          <a:p>
-            <a:r>
-              <a:rPr lang="en-US" dirty="0"/>
-              <a:t>About this week (Week 1)</a:t>
-            </a:r>
-            <a:endParaRPr lang="en-GB" dirty="0"/>
-          </a:p>
-        </p:txBody>
-      </p:sp>
-      <p:sp>
-        <p:nvSpPr>
-          <p:cNvPr id="3" name="Content Placeholder 2">
-            <a:extLst>
-              <a:ext uri="{FF2B5EF4-FFF2-40B4-BE49-F238E27FC236}">
-                <a16:creationId xmlns:a16="http://schemas.microsoft.com/office/drawing/2014/main" id="{35995840-A9D9-479A-A34F-EA7DC229D38E}"/>
-              </a:ext>
-            </a:extLst>
-          </p:cNvPr>
-          <p:cNvSpPr>
-            <a:spLocks noGrp="1"/>
-          </p:cNvSpPr>
-          <p:nvPr>
-            <p:ph idx="1"/>
-          </p:nvPr>
-        </p:nvSpPr>
-        <p:spPr>
-          <a:xfrm>
-            <a:off x="838200" y="1825625"/>
-            <a:ext cx="10515600" cy="4827102"/>
-          </a:xfrm>
-        </p:spPr>
-        <p:txBody>
-          <a:bodyPr/>
-          <a:lstStyle/>
-          <a:p>
-            <a:pPr marL="514350" indent="-514350">
-              <a:buFont typeface="+mj-lt"/>
-              <a:buAutoNum type="arabicPeriod" startAt="14"/>
-            </a:pPr>
-            <a:r>
-              <a:rPr lang="en-US" dirty="0"/>
-              <a:t>What are </a:t>
-            </a:r>
-            <a:r>
-              <a:rPr lang="en-US" b="1" dirty="0"/>
-              <a:t>Neural</a:t>
-            </a:r>
-            <a:r>
-              <a:rPr lang="en-US" dirty="0"/>
-              <a:t> </a:t>
-            </a:r>
-            <a:r>
-              <a:rPr lang="en-US" b="1" dirty="0"/>
-              <a:t>Networks</a:t>
-            </a:r>
-            <a:r>
-              <a:rPr lang="en-US" dirty="0"/>
-              <a:t> and how do they relate to the </a:t>
-            </a:r>
-            <a:r>
-              <a:rPr lang="en-US" b="1" dirty="0"/>
-              <a:t>biology</a:t>
-            </a:r>
-            <a:r>
-              <a:rPr lang="en-US" dirty="0"/>
-              <a:t> </a:t>
-            </a:r>
-            <a:r>
-              <a:rPr lang="en-US" b="1" dirty="0"/>
-              <a:t>of a</a:t>
-            </a:r>
-            <a:r>
-              <a:rPr lang="en-US" dirty="0"/>
-              <a:t> </a:t>
-            </a:r>
-            <a:r>
-              <a:rPr lang="en-US" b="1" dirty="0"/>
-              <a:t>human</a:t>
-            </a:r>
-            <a:r>
-              <a:rPr lang="en-US" dirty="0"/>
-              <a:t> </a:t>
-            </a:r>
-            <a:r>
-              <a:rPr lang="en-US" b="1" dirty="0"/>
-              <a:t>brain</a:t>
-            </a:r>
-            <a:r>
-              <a:rPr lang="en-US" dirty="0"/>
-              <a:t>?</a:t>
-            </a:r>
-          </a:p>
-          <a:p>
-            <a:pPr marL="514350" indent="-514350">
-              <a:buFont typeface="+mj-lt"/>
-              <a:buAutoNum type="arabicPeriod" startAt="14"/>
-            </a:pPr>
-            <a:r>
-              <a:rPr lang="en-US" dirty="0"/>
-              <a:t>What is a </a:t>
-            </a:r>
-            <a:r>
-              <a:rPr lang="en-US" b="1" dirty="0"/>
-              <a:t>Neuron</a:t>
-            </a:r>
-            <a:r>
-              <a:rPr lang="en-US" dirty="0"/>
-              <a:t> in a Neural Network and how does it relate to linear/logistic regression?</a:t>
-            </a:r>
-          </a:p>
-          <a:p>
-            <a:pPr marL="514350" indent="-514350">
-              <a:buFont typeface="+mj-lt"/>
-              <a:buAutoNum type="arabicPeriod" startAt="14"/>
-            </a:pPr>
-            <a:r>
-              <a:rPr lang="en-US" dirty="0"/>
-              <a:t>What is the </a:t>
-            </a:r>
-            <a:r>
-              <a:rPr lang="en-US" b="1" dirty="0"/>
-              <a:t>difference</a:t>
-            </a:r>
-            <a:r>
-              <a:rPr lang="en-US" dirty="0"/>
-              <a:t> between a </a:t>
-            </a:r>
-            <a:r>
-              <a:rPr lang="en-US" b="1" dirty="0"/>
-              <a:t>shallow</a:t>
-            </a:r>
-            <a:r>
-              <a:rPr lang="en-US" dirty="0"/>
-              <a:t> and a </a:t>
-            </a:r>
-            <a:r>
-              <a:rPr lang="en-US" b="1" dirty="0"/>
-              <a:t>deep neural network</a:t>
-            </a:r>
-            <a:r>
-              <a:rPr lang="en-US" dirty="0"/>
-              <a:t>?</a:t>
-            </a:r>
-          </a:p>
-          <a:p>
-            <a:pPr marL="514350" indent="-514350">
-              <a:buFont typeface="+mj-lt"/>
-              <a:buAutoNum type="arabicPeriod" startAt="14"/>
-            </a:pPr>
-            <a:r>
-              <a:rPr lang="en-US" dirty="0"/>
-              <a:t>How to </a:t>
-            </a:r>
-            <a:r>
-              <a:rPr lang="en-US" b="1" dirty="0"/>
-              <a:t>implement</a:t>
-            </a:r>
-            <a:r>
-              <a:rPr lang="en-US" dirty="0"/>
-              <a:t> </a:t>
-            </a:r>
-            <a:r>
-              <a:rPr lang="en-US" b="1" dirty="0"/>
-              <a:t>a</a:t>
-            </a:r>
-            <a:r>
-              <a:rPr lang="en-US" dirty="0"/>
-              <a:t> </a:t>
-            </a:r>
-            <a:r>
-              <a:rPr lang="en-US" b="1" dirty="0"/>
-              <a:t>shallow</a:t>
-            </a:r>
-            <a:r>
-              <a:rPr lang="en-US" dirty="0"/>
-              <a:t> </a:t>
-            </a:r>
-            <a:r>
-              <a:rPr lang="en-US" b="1" dirty="0"/>
-              <a:t>Neural</a:t>
-            </a:r>
-            <a:r>
-              <a:rPr lang="en-US" dirty="0"/>
-              <a:t> </a:t>
-            </a:r>
-            <a:r>
-              <a:rPr lang="en-US" b="1" dirty="0"/>
-              <a:t>Network</a:t>
-            </a:r>
-            <a:r>
-              <a:rPr lang="en-US" dirty="0"/>
-              <a:t> manually and define a </a:t>
-            </a:r>
-            <a:r>
-              <a:rPr lang="en-US" b="1" dirty="0"/>
-              <a:t>forward</a:t>
-            </a:r>
-            <a:r>
-              <a:rPr lang="en-US" dirty="0"/>
-              <a:t> </a:t>
-            </a:r>
-            <a:r>
-              <a:rPr lang="en-US" b="1" dirty="0"/>
-              <a:t>propagation</a:t>
-            </a:r>
-            <a:r>
-              <a:rPr lang="en-US" dirty="0"/>
-              <a:t> method for it?</a:t>
-            </a:r>
-          </a:p>
-          <a:p>
-            <a:pPr marL="514350" indent="-514350">
-              <a:buFont typeface="+mj-lt"/>
-              <a:buAutoNum type="arabicPeriod" startAt="14"/>
-            </a:pPr>
-            <a:r>
-              <a:rPr lang="en-US" dirty="0"/>
-              <a:t>How to </a:t>
-            </a:r>
-            <a:r>
-              <a:rPr lang="en-US" b="1" dirty="0"/>
-              <a:t>train</a:t>
-            </a:r>
-            <a:r>
-              <a:rPr lang="en-US" dirty="0"/>
-              <a:t> </a:t>
-            </a:r>
-            <a:r>
-              <a:rPr lang="en-US" b="1" dirty="0"/>
-              <a:t>a shallow Neural Network </a:t>
-            </a:r>
-            <a:r>
-              <a:rPr lang="en-US" dirty="0"/>
-              <a:t>using </a:t>
-            </a:r>
-            <a:r>
-              <a:rPr lang="en-US" b="1" dirty="0"/>
-              <a:t>backpropagation</a:t>
-            </a:r>
-            <a:r>
-              <a:rPr lang="en-US" dirty="0"/>
-              <a:t>? How to define </a:t>
-            </a:r>
-            <a:r>
-              <a:rPr lang="en-US" b="1" dirty="0"/>
-              <a:t>backward</a:t>
-            </a:r>
-            <a:r>
-              <a:rPr lang="en-US" dirty="0"/>
-              <a:t> </a:t>
-            </a:r>
-            <a:r>
-              <a:rPr lang="en-US" b="1" dirty="0"/>
-              <a:t>propagation</a:t>
-            </a:r>
-            <a:r>
-              <a:rPr lang="en-US" dirty="0"/>
-              <a:t> and </a:t>
-            </a:r>
-            <a:r>
-              <a:rPr lang="en-US" b="1" dirty="0"/>
-              <a:t>trainer</a:t>
-            </a:r>
-            <a:r>
-              <a:rPr lang="en-US" dirty="0"/>
-              <a:t> functions?</a:t>
-            </a:r>
-          </a:p>
-          <a:p>
-            <a:pPr marL="514350" indent="-514350">
-              <a:buFont typeface="+mj-lt"/>
-              <a:buAutoNum type="arabicPeriod" startAt="14"/>
-            </a:pPr>
-            <a:endParaRPr lang="en-GB" dirty="0"/>
-          </a:p>
-        </p:txBody>
-      </p:sp>
-    </p:spTree>
-    <p:extLst>
-      <p:ext uri="{BB962C8B-B14F-4D97-AF65-F5344CB8AC3E}">
-        <p14:creationId xmlns:p14="http://schemas.microsoft.com/office/powerpoint/2010/main" val="3190584464"/>
-      </p:ext>
-    </p:extLst>
-  </p:cSld>
-  <p:clrMapOvr>
-    <a:masterClrMapping/>
-  </p:clrMapOvr>
-</p:sld>
-</file>
-
-<file path=ppt/slides/slide40.xml><?xml version="1.0" encoding="utf-8"?>
+<file path=ppt/slides/slide39.xml><?xml version="1.0" encoding="utf-8"?>
 <p:sld xmlns:a="http://schemas.openxmlformats.org/drawingml/2006/main" xmlns:r="http://schemas.openxmlformats.org/officeDocument/2006/relationships" xmlns:p="http://schemas.openxmlformats.org/presentationml/2006/main">
   <p:cSld>
     <p:spTree>
@@ -22534,8 +22135,8 @@
           </p:sp>
         </mc:Fallback>
       </mc:AlternateContent>
-      <mc:AlternateContent xmlns:mc="http://schemas.openxmlformats.org/markup-compatibility/2006" xmlns:a14="http://schemas.microsoft.com/office/drawing/2010/main">
-        <mc:Choice Requires="a14">
+      <mc:AlternateContent xmlns:mc="http://schemas.openxmlformats.org/markup-compatibility/2006">
+        <mc:Choice xmlns:a14="http://schemas.microsoft.com/office/drawing/2010/main" Requires="a14">
           <p:sp>
             <p:nvSpPr>
               <p:cNvPr id="4" name="Content Placeholder 3">
@@ -22564,9 +22165,18 @@
               </a:bodyPr>
               <a:lstStyle/>
               <a:p>
+                <a:pPr marL="0" indent="0">
+                  <a:buNone/>
+                </a:pPr>
                 <a:r>
                   <a:rPr lang="en-GB" dirty="0"/>
-                  <a:t>Why it works? This </a:t>
+                  <a:t>Why does it work?</a:t>
+                </a:r>
+              </a:p>
+              <a:p>
+                <a:r>
+                  <a:rPr lang="en-GB" dirty="0"/>
+                  <a:t>This </a:t>
                 </a:r>
                 <a:r>
                   <a:rPr lang="en-GB" b="1" dirty="0"/>
@@ -22669,7 +22279,7 @@
             </p:txBody>
           </p:sp>
         </mc:Choice>
-        <mc:Fallback xmlns="">
+        <mc:Fallback>
           <p:sp>
             <p:nvSpPr>
               <p:cNvPr id="4" name="Content Placeholder 3">
@@ -22694,7 +22304,7 @@
               <a:blipFill>
                 <a:blip r:embed="rId3"/>
                 <a:stretch>
-                  <a:fillRect l="-1882" t="-1818"/>
+                  <a:fillRect l="-2118" t="-1818"/>
                 </a:stretch>
               </a:blipFill>
             </p:spPr>
@@ -22703,7 +22313,7 @@
               <a:lstStyle/>
               <a:p>
                 <a:r>
-                  <a:rPr lang="en-SG">
+                  <a:rPr lang="en-GB">
                     <a:noFill/>
                   </a:rPr>
                   <a:t> </a:t>
@@ -22726,7 +22336,334 @@
 </p:sld>
 </file>
 
-<file path=ppt/slides/slide41.xml><?xml version="1.0" encoding="utf-8"?>
+<file path=ppt/slides/slide4.xml><?xml version="1.0" encoding="utf-8"?>
+<p:sld xmlns:a="http://schemas.openxmlformats.org/drawingml/2006/main" xmlns:r="http://schemas.openxmlformats.org/officeDocument/2006/relationships" xmlns:p="http://schemas.openxmlformats.org/presentationml/2006/main">
+  <p:cSld>
+    <p:spTree>
+      <p:nvGrpSpPr>
+        <p:cNvPr id="1" name=""/>
+        <p:cNvGrpSpPr/>
+        <p:nvPr/>
+      </p:nvGrpSpPr>
+      <p:grpSpPr>
+        <a:xfrm>
+          <a:off x="0" y="0"/>
+          <a:ext cx="0" cy="0"/>
+          <a:chOff x="0" y="0"/>
+          <a:chExt cx="0" cy="0"/>
+        </a:xfrm>
+      </p:grpSpPr>
+      <p:sp>
+        <p:nvSpPr>
+          <p:cNvPr id="2" name="Title 1">
+            <a:extLst>
+              <a:ext uri="{FF2B5EF4-FFF2-40B4-BE49-F238E27FC236}">
+                <a16:creationId xmlns:a16="http://schemas.microsoft.com/office/drawing/2014/main" id="{49D40417-A4D3-4CE8-96E7-708E2439AE7B}"/>
+              </a:ext>
+            </a:extLst>
+          </p:cNvPr>
+          <p:cNvSpPr>
+            <a:spLocks noGrp="1"/>
+          </p:cNvSpPr>
+          <p:nvPr>
+            <p:ph type="title"/>
+          </p:nvPr>
+        </p:nvSpPr>
+        <p:spPr/>
+        <p:txBody>
+          <a:bodyPr/>
+          <a:lstStyle/>
+          <a:p>
+            <a:r>
+              <a:rPr lang="en-US" dirty="0"/>
+              <a:t>About this week (Week 1)</a:t>
+            </a:r>
+            <a:endParaRPr lang="en-GB" dirty="0"/>
+          </a:p>
+        </p:txBody>
+      </p:sp>
+      <p:sp>
+        <p:nvSpPr>
+          <p:cNvPr id="3" name="Content Placeholder 2">
+            <a:extLst>
+              <a:ext uri="{FF2B5EF4-FFF2-40B4-BE49-F238E27FC236}">
+                <a16:creationId xmlns:a16="http://schemas.microsoft.com/office/drawing/2014/main" id="{35995840-A9D9-479A-A34F-EA7DC229D38E}"/>
+              </a:ext>
+            </a:extLst>
+          </p:cNvPr>
+          <p:cNvSpPr>
+            <a:spLocks noGrp="1"/>
+          </p:cNvSpPr>
+          <p:nvPr>
+            <p:ph idx="1"/>
+          </p:nvPr>
+        </p:nvSpPr>
+        <p:spPr>
+          <a:xfrm>
+            <a:off x="838200" y="1825625"/>
+            <a:ext cx="10515600" cy="4827102"/>
+          </a:xfrm>
+        </p:spPr>
+        <p:txBody>
+          <a:bodyPr/>
+          <a:lstStyle/>
+          <a:p>
+            <a:pPr marL="514350" indent="-514350">
+              <a:buFont typeface="+mj-lt"/>
+              <a:buAutoNum type="arabicPeriod" startAt="14"/>
+            </a:pPr>
+            <a:r>
+              <a:rPr lang="en-US" dirty="0"/>
+              <a:t>What are </a:t>
+            </a:r>
+            <a:r>
+              <a:rPr lang="en-US" b="1" dirty="0"/>
+              <a:t>Neural</a:t>
+            </a:r>
+            <a:r>
+              <a:rPr lang="en-US" dirty="0"/>
+              <a:t> </a:t>
+            </a:r>
+            <a:r>
+              <a:rPr lang="en-US" b="1" dirty="0"/>
+              <a:t>Networks</a:t>
+            </a:r>
+            <a:r>
+              <a:rPr lang="en-US" dirty="0"/>
+              <a:t> and how do they relate to the </a:t>
+            </a:r>
+            <a:r>
+              <a:rPr lang="en-US" b="1" dirty="0"/>
+              <a:t>biology</a:t>
+            </a:r>
+            <a:r>
+              <a:rPr lang="en-US" dirty="0"/>
+              <a:t> </a:t>
+            </a:r>
+            <a:r>
+              <a:rPr lang="en-US" b="1" dirty="0"/>
+              <a:t>of a</a:t>
+            </a:r>
+            <a:r>
+              <a:rPr lang="en-US" dirty="0"/>
+              <a:t> </a:t>
+            </a:r>
+            <a:r>
+              <a:rPr lang="en-US" b="1" dirty="0"/>
+              <a:t>human</a:t>
+            </a:r>
+            <a:r>
+              <a:rPr lang="en-US" dirty="0"/>
+              <a:t> </a:t>
+            </a:r>
+            <a:r>
+              <a:rPr lang="en-US" b="1" dirty="0"/>
+              <a:t>brain</a:t>
+            </a:r>
+            <a:r>
+              <a:rPr lang="en-US" dirty="0"/>
+              <a:t>?</a:t>
+            </a:r>
+          </a:p>
+          <a:p>
+            <a:pPr marL="514350" indent="-514350">
+              <a:buFont typeface="+mj-lt"/>
+              <a:buAutoNum type="arabicPeriod" startAt="14"/>
+            </a:pPr>
+            <a:r>
+              <a:rPr lang="en-US" dirty="0"/>
+              <a:t>What is a </a:t>
+            </a:r>
+            <a:r>
+              <a:rPr lang="en-US" b="1" dirty="0"/>
+              <a:t>Neuron</a:t>
+            </a:r>
+            <a:r>
+              <a:rPr lang="en-US" dirty="0"/>
+              <a:t> in a Neural Network and how does it relate to linear/logistic regression?</a:t>
+            </a:r>
+          </a:p>
+          <a:p>
+            <a:pPr marL="514350" indent="-514350">
+              <a:buFont typeface="+mj-lt"/>
+              <a:buAutoNum type="arabicPeriod" startAt="14"/>
+            </a:pPr>
+            <a:r>
+              <a:rPr lang="en-US" dirty="0"/>
+              <a:t>What is the </a:t>
+            </a:r>
+            <a:r>
+              <a:rPr lang="en-US" b="1" dirty="0"/>
+              <a:t>difference</a:t>
+            </a:r>
+            <a:r>
+              <a:rPr lang="en-US" dirty="0"/>
+              <a:t> between a </a:t>
+            </a:r>
+            <a:r>
+              <a:rPr lang="en-US" b="1" dirty="0"/>
+              <a:t>shallow</a:t>
+            </a:r>
+            <a:r>
+              <a:rPr lang="en-US" dirty="0"/>
+              <a:t> and a </a:t>
+            </a:r>
+            <a:r>
+              <a:rPr lang="en-US" b="1" dirty="0"/>
+              <a:t>deep neural network</a:t>
+            </a:r>
+            <a:r>
+              <a:rPr lang="en-US" dirty="0"/>
+              <a:t>?</a:t>
+            </a:r>
+          </a:p>
+          <a:p>
+            <a:pPr marL="514350" indent="-514350">
+              <a:buFont typeface="+mj-lt"/>
+              <a:buAutoNum type="arabicPeriod" startAt="14"/>
+            </a:pPr>
+            <a:r>
+              <a:rPr lang="en-US" dirty="0"/>
+              <a:t>How to </a:t>
+            </a:r>
+            <a:r>
+              <a:rPr lang="en-US" b="1" dirty="0"/>
+              <a:t>implement</a:t>
+            </a:r>
+            <a:r>
+              <a:rPr lang="en-US" dirty="0"/>
+              <a:t> </a:t>
+            </a:r>
+            <a:r>
+              <a:rPr lang="en-US" b="1" dirty="0"/>
+              <a:t>a</a:t>
+            </a:r>
+            <a:r>
+              <a:rPr lang="en-US" dirty="0"/>
+              <a:t> </a:t>
+            </a:r>
+            <a:r>
+              <a:rPr lang="en-US" b="1" dirty="0"/>
+              <a:t>shallow</a:t>
+            </a:r>
+            <a:r>
+              <a:rPr lang="en-US" dirty="0"/>
+              <a:t> </a:t>
+            </a:r>
+            <a:r>
+              <a:rPr lang="en-US" b="1" dirty="0"/>
+              <a:t>Neural</a:t>
+            </a:r>
+            <a:r>
+              <a:rPr lang="en-US" dirty="0"/>
+              <a:t> </a:t>
+            </a:r>
+            <a:r>
+              <a:rPr lang="en-US" b="1" dirty="0"/>
+              <a:t>Network</a:t>
+            </a:r>
+            <a:r>
+              <a:rPr lang="en-US" dirty="0"/>
+              <a:t> manually and define a </a:t>
+            </a:r>
+            <a:r>
+              <a:rPr lang="en-US" b="1" dirty="0"/>
+              <a:t>forward</a:t>
+            </a:r>
+            <a:r>
+              <a:rPr lang="en-US" dirty="0"/>
+              <a:t> </a:t>
+            </a:r>
+            <a:r>
+              <a:rPr lang="en-US" b="1" dirty="0"/>
+              <a:t>propagation</a:t>
+            </a:r>
+            <a:r>
+              <a:rPr lang="en-US" dirty="0"/>
+              <a:t> method for it?</a:t>
+            </a:r>
+          </a:p>
+          <a:p>
+            <a:pPr marL="514350" indent="-514350">
+              <a:buFont typeface="+mj-lt"/>
+              <a:buAutoNum type="arabicPeriod" startAt="14"/>
+            </a:pPr>
+            <a:r>
+              <a:rPr lang="en-US" dirty="0"/>
+              <a:t>How to </a:t>
+            </a:r>
+            <a:r>
+              <a:rPr lang="en-US" b="1" dirty="0"/>
+              <a:t>train</a:t>
+            </a:r>
+            <a:r>
+              <a:rPr lang="en-US" dirty="0"/>
+              <a:t> </a:t>
+            </a:r>
+            <a:r>
+              <a:rPr lang="en-US" b="1" dirty="0"/>
+              <a:t>a shallow Neural Network </a:t>
+            </a:r>
+            <a:r>
+              <a:rPr lang="en-US" dirty="0"/>
+              <a:t>using </a:t>
+            </a:r>
+            <a:r>
+              <a:rPr lang="en-US" b="1" dirty="0"/>
+              <a:t>backpropagation</a:t>
+            </a:r>
+            <a:r>
+              <a:rPr lang="en-US" dirty="0"/>
+              <a:t>? How to define </a:t>
+            </a:r>
+            <a:r>
+              <a:rPr lang="en-US" b="1" dirty="0"/>
+              <a:t>backward</a:t>
+            </a:r>
+            <a:r>
+              <a:rPr lang="en-US" dirty="0"/>
+              <a:t> </a:t>
+            </a:r>
+            <a:r>
+              <a:rPr lang="en-US" b="1" dirty="0"/>
+              <a:t>propagation</a:t>
+            </a:r>
+            <a:r>
+              <a:rPr lang="en-US" dirty="0"/>
+              <a:t> and </a:t>
+            </a:r>
+            <a:r>
+              <a:rPr lang="en-US" b="1" dirty="0"/>
+              <a:t>trainer</a:t>
+            </a:r>
+            <a:r>
+              <a:rPr lang="en-US" dirty="0"/>
+              <a:t> functions?</a:t>
+            </a:r>
+          </a:p>
+          <a:p>
+            <a:pPr marL="514350" indent="-514350">
+              <a:buFont typeface="+mj-lt"/>
+              <a:buAutoNum type="arabicPeriod" startAt="14"/>
+            </a:pPr>
+            <a:endParaRPr lang="en-GB" dirty="0"/>
+          </a:p>
+        </p:txBody>
+      </p:sp>
+    </p:spTree>
+    <p:extLst>
+      <p:ext uri="{BB962C8B-B14F-4D97-AF65-F5344CB8AC3E}">
+        <p14:creationId xmlns:p14="http://schemas.microsoft.com/office/powerpoint/2010/main" val="3190584464"/>
+      </p:ext>
+    </p:extLst>
+  </p:cSld>
+  <p:clrMapOvr>
+    <a:masterClrMapping/>
+  </p:clrMapOvr>
+</p:sld>
+</file>
+
+<file path=ppt/slides/slide40.xml><?xml version="1.0" encoding="utf-8"?>
 <p:sld xmlns:a="http://schemas.openxmlformats.org/drawingml/2006/main" xmlns:r="http://schemas.openxmlformats.org/officeDocument/2006/relationships" xmlns:p="http://schemas.openxmlformats.org/presentationml/2006/main">
   <p:cSld>
     <p:spTree>
@@ -23066,7 +23003,7 @@
 </p:sld>
 </file>
 
-<file path=ppt/slides/slide42.xml><?xml version="1.0" encoding="utf-8"?>
+<file path=ppt/slides/slide41.xml><?xml version="1.0" encoding="utf-8"?>
 <p:sld xmlns:a="http://schemas.openxmlformats.org/drawingml/2006/main" xmlns:r="http://schemas.openxmlformats.org/officeDocument/2006/relationships" xmlns:p="http://schemas.openxmlformats.org/presentationml/2006/main">
   <p:cSld>
     <p:spTree>
@@ -23117,6 +23054,206 @@
     <p:extLst>
       <p:ext uri="{BB962C8B-B14F-4D97-AF65-F5344CB8AC3E}">
         <p14:creationId xmlns:p14="http://schemas.microsoft.com/office/powerpoint/2010/main" val="710884314"/>
+      </p:ext>
+    </p:extLst>
+  </p:cSld>
+  <p:clrMapOvr>
+    <a:masterClrMapping/>
+  </p:clrMapOvr>
+</p:sld>
+</file>
+
+<file path=ppt/slides/slide42.xml><?xml version="1.0" encoding="utf-8"?>
+<p:sld xmlns:a="http://schemas.openxmlformats.org/drawingml/2006/main" xmlns:r="http://schemas.openxmlformats.org/officeDocument/2006/relationships" xmlns:p="http://schemas.openxmlformats.org/presentationml/2006/main">
+  <p:cSld>
+    <p:spTree>
+      <p:nvGrpSpPr>
+        <p:cNvPr id="1" name=""/>
+        <p:cNvGrpSpPr/>
+        <p:nvPr/>
+      </p:nvGrpSpPr>
+      <p:grpSpPr>
+        <a:xfrm>
+          <a:off x="0" y="0"/>
+          <a:ext cx="0" cy="0"/>
+          <a:chOff x="0" y="0"/>
+          <a:chExt cx="0" cy="0"/>
+        </a:xfrm>
+      </p:grpSpPr>
+      <p:pic>
+        <p:nvPicPr>
+          <p:cNvPr id="3" name="Picture 2">
+            <a:extLst>
+              <a:ext uri="{FF2B5EF4-FFF2-40B4-BE49-F238E27FC236}">
+                <a16:creationId xmlns:a16="http://schemas.microsoft.com/office/drawing/2014/main" id="{9393E930-864D-AE43-E037-44F4533A0DDB}"/>
+              </a:ext>
+            </a:extLst>
+          </p:cNvPr>
+          <p:cNvPicPr>
+            <a:picLocks noChangeAspect="1"/>
+          </p:cNvPicPr>
+          <p:nvPr/>
+        </p:nvPicPr>
+        <p:blipFill>
+          <a:blip r:embed="rId2"/>
+          <a:stretch>
+            <a:fillRect/>
+          </a:stretch>
+        </p:blipFill>
+        <p:spPr>
+          <a:xfrm>
+            <a:off x="904150" y="9047"/>
+            <a:ext cx="10383699" cy="6839905"/>
+          </a:xfrm>
+          <a:prstGeom prst="rect">
+            <a:avLst/>
+          </a:prstGeom>
+        </p:spPr>
+      </p:pic>
+      <mc:AlternateContent xmlns:mc="http://schemas.openxmlformats.org/markup-compatibility/2006">
+        <mc:Choice xmlns:a14="http://schemas.microsoft.com/office/drawing/2010/main" Requires="a14">
+          <p:sp>
+            <p:nvSpPr>
+              <p:cNvPr id="2" name="TextBox 1">
+                <a:extLst>
+                  <a:ext uri="{FF2B5EF4-FFF2-40B4-BE49-F238E27FC236}">
+                    <a16:creationId xmlns:a16="http://schemas.microsoft.com/office/drawing/2014/main" id="{7E8004EF-5A8C-5081-A7AD-65F92DB1C7E9}"/>
+                  </a:ext>
+                </a:extLst>
+              </p:cNvPr>
+              <p:cNvSpPr txBox="1"/>
+              <p:nvPr/>
+            </p:nvSpPr>
+            <p:spPr>
+              <a:xfrm>
+                <a:off x="2035277" y="1366684"/>
+                <a:ext cx="6076336" cy="2677656"/>
+              </a:xfrm>
+              <a:prstGeom prst="rect">
+                <a:avLst/>
+              </a:prstGeom>
+              <a:noFill/>
+            </p:spPr>
+            <p:txBody>
+              <a:bodyPr wrap="square" rtlCol="0">
+                <a:spAutoFit/>
+              </a:bodyPr>
+              <a:lstStyle/>
+              <a:p>
+                <a:r>
+                  <a:rPr lang="en-GB" sz="2400" b="1" dirty="0">
+                    <a:solidFill>
+                      <a:schemeClr val="accent2"/>
+                    </a:solidFill>
+                  </a:rPr>
+                  <a:t>Note: </a:t>
+                </a:r>
+                <a:r>
+                  <a:rPr lang="en-GB" sz="2400" b="1" dirty="0" err="1">
+                    <a:solidFill>
+                      <a:schemeClr val="accent2"/>
+                    </a:solidFill>
+                  </a:rPr>
+                  <a:t>Sklearn</a:t>
+                </a:r>
+                <a:r>
+                  <a:rPr lang="en-GB" sz="2400" b="1" dirty="0">
+                    <a:solidFill>
+                      <a:schemeClr val="accent2"/>
+                    </a:solidFill>
+                  </a:rPr>
+                  <a:t> uses </a:t>
+                </a:r>
+                <a14:m>
+                  <m:oMath xmlns:m="http://schemas.openxmlformats.org/officeDocument/2006/math">
+                    <m:r>
+                      <a:rPr lang="en-GB" sz="2400" b="1" i="1" smtClean="0">
+                        <a:solidFill>
+                          <a:schemeClr val="accent2"/>
+                        </a:solidFill>
+                        <a:latin typeface="Cambria Math" panose="02040503050406030204" pitchFamily="18" charset="0"/>
+                      </a:rPr>
+                      <m:t>𝜶</m:t>
+                    </m:r>
+                  </m:oMath>
+                </a14:m>
+                <a:r>
+                  <a:rPr lang="en-GB" sz="2400" b="1" dirty="0">
+                    <a:solidFill>
+                      <a:schemeClr val="accent2"/>
+                    </a:solidFill>
+                  </a:rPr>
+                  <a:t> to designate the regularization parameter. This is somewhat sketchy and could lead to confusion with the learning rate of the Gradient Descent used for training. For the sake of clarity, we will stick to the notation used in the </a:t>
+                </a:r>
+                <a:r>
+                  <a:rPr lang="en-GB" sz="2400" b="1" dirty="0" err="1">
+                    <a:solidFill>
+                      <a:schemeClr val="accent2"/>
+                    </a:solidFill>
+                  </a:rPr>
+                  <a:t>Sklearn</a:t>
+                </a:r>
+                <a:r>
+                  <a:rPr lang="en-GB" sz="2400" b="1" dirty="0">
+                    <a:solidFill>
+                      <a:schemeClr val="accent2"/>
+                    </a:solidFill>
+                  </a:rPr>
+                  <a:t> functions, but it is important you do not confuse the two!</a:t>
+                </a:r>
+              </a:p>
+            </p:txBody>
+          </p:sp>
+        </mc:Choice>
+        <mc:Fallback>
+          <p:sp>
+            <p:nvSpPr>
+              <p:cNvPr id="2" name="TextBox 1">
+                <a:extLst>
+                  <a:ext uri="{FF2B5EF4-FFF2-40B4-BE49-F238E27FC236}">
+                    <a16:creationId xmlns:a16="http://schemas.microsoft.com/office/drawing/2014/main" id="{7E8004EF-5A8C-5081-A7AD-65F92DB1C7E9}"/>
+                  </a:ext>
+                </a:extLst>
+              </p:cNvPr>
+              <p:cNvSpPr txBox="1">
+                <a:spLocks noRot="1" noChangeAspect="1" noMove="1" noResize="1" noEditPoints="1" noAdjustHandles="1" noChangeArrowheads="1" noChangeShapeType="1" noTextEdit="1"/>
+              </p:cNvSpPr>
+              <p:nvPr/>
+            </p:nvSpPr>
+            <p:spPr>
+              <a:xfrm>
+                <a:off x="2035277" y="1366684"/>
+                <a:ext cx="6076336" cy="2677656"/>
+              </a:xfrm>
+              <a:prstGeom prst="rect">
+                <a:avLst/>
+              </a:prstGeom>
+              <a:blipFill>
+                <a:blip r:embed="rId3"/>
+                <a:stretch>
+                  <a:fillRect l="-1605" t="-1822" r="-2508" b="-4328"/>
+                </a:stretch>
+              </a:blipFill>
+            </p:spPr>
+            <p:txBody>
+              <a:bodyPr/>
+              <a:lstStyle/>
+              <a:p>
+                <a:r>
+                  <a:rPr lang="en-GB">
+                    <a:noFill/>
+                  </a:rPr>
+                  <a:t> </a:t>
+                </a:r>
+              </a:p>
+            </p:txBody>
+          </p:sp>
+        </mc:Fallback>
+      </mc:AlternateContent>
+    </p:spTree>
+    <p:extLst>
+      <p:ext uri="{BB962C8B-B14F-4D97-AF65-F5344CB8AC3E}">
+        <p14:creationId xmlns:p14="http://schemas.microsoft.com/office/powerpoint/2010/main" val="1671560902"/>
       </p:ext>
     </p:extLst>
   </p:cSld>
@@ -23408,7 +23545,31 @@
             </a:r>
             <a:r>
               <a:rPr lang="en-GB" dirty="0"/>
-              <a:t> values as regularization, i.e. combining the L1 and L2 regularization together.</a:t>
+              <a:t> values as regularization, i.e. combining the </a:t>
+            </a:r>
+            <a:r>
+              <a:rPr lang="en-GB" b="1" dirty="0">
+                <a:solidFill>
+                  <a:srgbClr val="7030A0"/>
+                </a:solidFill>
+              </a:rPr>
+              <a:t>L1</a:t>
+            </a:r>
+            <a:r>
+              <a:rPr lang="en-GB" dirty="0"/>
+              <a:t> and </a:t>
+            </a:r>
+            <a:r>
+              <a:rPr lang="en-GB" b="1" dirty="0">
+                <a:solidFill>
+                  <a:srgbClr val="0070C0"/>
+                </a:solidFill>
+              </a:rPr>
+              <a:t>L2</a:t>
+            </a:r>
+            <a:r>
+              <a:rPr lang="en-GB" dirty="0"/>
+              <a:t> regularizations together.</a:t>
             </a:r>
           </a:p>
           <a:p>
@@ -23435,8 +23596,13 @@
             </a:r>
             <a:r>
               <a:rPr lang="en-GB" dirty="0"/>
-              <a:t>instead!</a:t>
-            </a:r>
+              <a:t>instead! </a:t>
+            </a:r>
+            <a:r>
+              <a:rPr lang="en-GB"/>
+              <a:t>(MSE + L1 Reg + L2 Reg)</a:t>
+            </a:r>
+            <a:endParaRPr lang="en-GB" dirty="0"/>
           </a:p>
         </p:txBody>
       </p:sp>
@@ -25423,8 +25589,8 @@
           </a:p>
         </p:txBody>
       </p:sp>
-      <mc:AlternateContent xmlns:mc="http://schemas.openxmlformats.org/markup-compatibility/2006" xmlns:a14="http://schemas.microsoft.com/office/drawing/2010/main">
-        <mc:Choice Requires="a14">
+      <mc:AlternateContent xmlns:mc="http://schemas.openxmlformats.org/markup-compatibility/2006">
+        <mc:Choice xmlns:a14="http://schemas.microsoft.com/office/drawing/2010/main" Requires="a14">
           <p:sp>
             <p:nvSpPr>
               <p:cNvPr id="3" name="Content Placeholder 2">
@@ -25607,7 +25773,7 @@
                 </a:pPr>
                 <a:r>
                   <a:rPr lang="en-GB" dirty="0"/>
-                  <a:t>However, we leave this implementation for students who would like to practice. (or it might be the homework for this week!)</a:t>
+                  <a:t>However, we leave this implementation for students who would like to practice. (Or it might be the homework for a later week!).</a:t>
                 </a:r>
               </a:p>
               <a:p>
@@ -25625,7 +25791,7 @@
             </p:txBody>
           </p:sp>
         </mc:Choice>
-        <mc:Fallback xmlns="">
+        <mc:Fallback>
           <p:sp>
             <p:nvSpPr>
               <p:cNvPr id="3" name="Content Placeholder 2">
@@ -25659,7 +25825,7 @@
               <a:lstStyle/>
               <a:p>
                 <a:r>
-                  <a:rPr lang="en-SG">
+                  <a:rPr lang="en-GB">
                     <a:noFill/>
                   </a:rPr>
                   <a:t> </a:t>

</xml_diff>

<commit_message>
Changes to W1 after teaching and preparing for W2.
</commit_message>
<xml_diff>
--- a/W1/2. W1S2 final/W1S2.pptx
+++ b/W1/2. W1S2 final/W1S2.pptx
@@ -239,7 +239,7 @@
 <file path=ppt/revisionInfo.xml><?xml version="1.0" encoding="utf-8"?>
 <p1510:revInfo xmlns:a="http://schemas.openxmlformats.org/drawingml/2006/main" xmlns:r="http://schemas.openxmlformats.org/officeDocument/2006/relationships" xmlns:p1510="http://schemas.microsoft.com/office/powerpoint/2015/10/main">
   <p1510:revLst>
-    <p1510:client id="{2AD250E2-609D-44C9-A6CB-54091931272C}" v="17" dt="2024-01-18T07:58:25.791"/>
+    <p1510:client id="{2AD250E2-609D-44C9-A6CB-54091931272C}" v="19" dt="2024-01-23T03:24:29.972"/>
   </p1510:revLst>
 </p1510:revInfo>
 </file>
@@ -249,11 +249,26 @@
   <pc:docChgLst>
     <pc:chgData name="Matthieu De Mari" userId="dfb708c9-d8dc-439f-9a3b-c772bf4a311c" providerId="ADAL" clId="{2AD250E2-609D-44C9-A6CB-54091931272C}"/>
     <pc:docChg chg="custSel addSld delSld modSld modSection">
-      <pc:chgData name="Matthieu De Mari" userId="dfb708c9-d8dc-439f-9a3b-c772bf4a311c" providerId="ADAL" clId="{2AD250E2-609D-44C9-A6CB-54091931272C}" dt="2024-01-18T07:59:24.286" v="295" actId="20577"/>
+      <pc:chgData name="Matthieu De Mari" userId="dfb708c9-d8dc-439f-9a3b-c772bf4a311c" providerId="ADAL" clId="{2AD250E2-609D-44C9-A6CB-54091931272C}" dt="2024-01-26T00:54:59.117" v="390" actId="20577"/>
       <pc:docMkLst>
         <pc:docMk/>
       </pc:docMkLst>
       <pc:sldChg chg="modSp mod">
+        <pc:chgData name="Matthieu De Mari" userId="dfb708c9-d8dc-439f-9a3b-c772bf4a311c" providerId="ADAL" clId="{2AD250E2-609D-44C9-A6CB-54091931272C}" dt="2024-01-26T00:54:39.521" v="388" actId="207"/>
+        <pc:sldMkLst>
+          <pc:docMk/>
+          <pc:sldMk cId="3442501962" sldId="257"/>
+        </pc:sldMkLst>
+        <pc:spChg chg="mod">
+          <ac:chgData name="Matthieu De Mari" userId="dfb708c9-d8dc-439f-9a3b-c772bf4a311c" providerId="ADAL" clId="{2AD250E2-609D-44C9-A6CB-54091931272C}" dt="2024-01-26T00:54:39.521" v="388" actId="207"/>
+          <ac:spMkLst>
+            <pc:docMk/>
+            <pc:sldMk cId="3442501962" sldId="257"/>
+            <ac:spMk id="3" creationId="{35995840-A9D9-479A-A34F-EA7DC229D38E}"/>
+          </ac:spMkLst>
+        </pc:spChg>
+      </pc:sldChg>
+      <pc:sldChg chg="modSp mod">
         <pc:chgData name="Matthieu De Mari" userId="dfb708c9-d8dc-439f-9a3b-c772bf4a311c" providerId="ADAL" clId="{2AD250E2-609D-44C9-A6CB-54091931272C}" dt="2024-01-18T07:47:22.029" v="9" actId="20577"/>
         <pc:sldMkLst>
           <pc:docMk/>
@@ -366,6 +381,29 @@
           </ac:spMkLst>
         </pc:spChg>
       </pc:sldChg>
+      <pc:sldChg chg="addSp delSp modSp mod">
+        <pc:chgData name="Matthieu De Mari" userId="dfb708c9-d8dc-439f-9a3b-c772bf4a311c" providerId="ADAL" clId="{2AD250E2-609D-44C9-A6CB-54091931272C}" dt="2024-01-23T01:47:06.588" v="297"/>
+        <pc:sldMkLst>
+          <pc:docMk/>
+          <pc:sldMk cId="4026475787" sldId="488"/>
+        </pc:sldMkLst>
+        <pc:picChg chg="del">
+          <ac:chgData name="Matthieu De Mari" userId="dfb708c9-d8dc-439f-9a3b-c772bf4a311c" providerId="ADAL" clId="{2AD250E2-609D-44C9-A6CB-54091931272C}" dt="2024-01-23T01:47:06.155" v="296" actId="478"/>
+          <ac:picMkLst>
+            <pc:docMk/>
+            <pc:sldMk cId="4026475787" sldId="488"/>
+            <ac:picMk id="2" creationId="{F69C4E1F-E9F4-99D4-A919-7EDFEE3BD24A}"/>
+          </ac:picMkLst>
+        </pc:picChg>
+        <pc:picChg chg="add mod">
+          <ac:chgData name="Matthieu De Mari" userId="dfb708c9-d8dc-439f-9a3b-c772bf4a311c" providerId="ADAL" clId="{2AD250E2-609D-44C9-A6CB-54091931272C}" dt="2024-01-23T01:47:06.588" v="297"/>
+          <ac:picMkLst>
+            <pc:docMk/>
+            <pc:sldMk cId="4026475787" sldId="488"/>
+            <ac:picMk id="3" creationId="{A71C56B8-6D3F-262B-50BD-10F3500B17D0}"/>
+          </ac:picMkLst>
+        </pc:picChg>
+      </pc:sldChg>
       <pc:sldChg chg="modSp mod">
         <pc:chgData name="Matthieu De Mari" userId="dfb708c9-d8dc-439f-9a3b-c772bf4a311c" providerId="ADAL" clId="{2AD250E2-609D-44C9-A6CB-54091931272C}" dt="2024-01-18T07:49:56.252" v="57" actId="20577"/>
         <pc:sldMkLst>
@@ -427,6 +465,21 @@
         </pc:spChg>
       </pc:sldChg>
       <pc:sldChg chg="modSp mod">
+        <pc:chgData name="Matthieu De Mari" userId="dfb708c9-d8dc-439f-9a3b-c772bf4a311c" providerId="ADAL" clId="{2AD250E2-609D-44C9-A6CB-54091931272C}" dt="2024-01-23T03:16:18.526" v="299" actId="5793"/>
+        <pc:sldMkLst>
+          <pc:docMk/>
+          <pc:sldMk cId="410904367" sldId="494"/>
+        </pc:sldMkLst>
+        <pc:spChg chg="mod">
+          <ac:chgData name="Matthieu De Mari" userId="dfb708c9-d8dc-439f-9a3b-c772bf4a311c" providerId="ADAL" clId="{2AD250E2-609D-44C9-A6CB-54091931272C}" dt="2024-01-23T03:16:18.526" v="299" actId="5793"/>
+          <ac:spMkLst>
+            <pc:docMk/>
+            <pc:sldMk cId="410904367" sldId="494"/>
+            <ac:spMk id="4" creationId="{27242388-4C68-D772-1E59-FC76EBC6F2CF}"/>
+          </ac:spMkLst>
+        </pc:spChg>
+      </pc:sldChg>
+      <pc:sldChg chg="modSp mod">
         <pc:chgData name="Matthieu De Mari" userId="dfb708c9-d8dc-439f-9a3b-c772bf4a311c" providerId="ADAL" clId="{2AD250E2-609D-44C9-A6CB-54091931272C}" dt="2024-01-18T07:52:49.317" v="218" actId="1076"/>
         <pc:sldMkLst>
           <pc:docMk/>
@@ -501,6 +554,29 @@
             <ac:spMk id="4" creationId="{5E76589E-870E-419D-CF95-4309EACDB190}"/>
           </ac:spMkLst>
         </pc:spChg>
+      </pc:sldChg>
+      <pc:sldChg chg="delSp modSp mod">
+        <pc:chgData name="Matthieu De Mari" userId="dfb708c9-d8dc-439f-9a3b-c772bf4a311c" providerId="ADAL" clId="{2AD250E2-609D-44C9-A6CB-54091931272C}" dt="2024-01-26T00:54:59.117" v="390" actId="20577"/>
+        <pc:sldMkLst>
+          <pc:docMk/>
+          <pc:sldMk cId="1659504250" sldId="505"/>
+        </pc:sldMkLst>
+        <pc:spChg chg="mod">
+          <ac:chgData name="Matthieu De Mari" userId="dfb708c9-d8dc-439f-9a3b-c772bf4a311c" providerId="ADAL" clId="{2AD250E2-609D-44C9-A6CB-54091931272C}" dt="2024-01-26T00:54:59.117" v="390" actId="20577"/>
+          <ac:spMkLst>
+            <pc:docMk/>
+            <pc:sldMk cId="1659504250" sldId="505"/>
+            <ac:spMk id="6" creationId="{035BA096-4E67-B5D5-DBD3-F226777FADC7}"/>
+          </ac:spMkLst>
+        </pc:spChg>
+        <pc:picChg chg="del">
+          <ac:chgData name="Matthieu De Mari" userId="dfb708c9-d8dc-439f-9a3b-c772bf4a311c" providerId="ADAL" clId="{2AD250E2-609D-44C9-A6CB-54091931272C}" dt="2024-01-23T03:24:15.891" v="300" actId="478"/>
+          <ac:picMkLst>
+            <pc:docMk/>
+            <pc:sldMk cId="1659504250" sldId="505"/>
+            <ac:picMk id="11" creationId="{3EFBA32E-31AD-EBDB-E6A1-D009113F8427}"/>
+          </ac:picMkLst>
+        </pc:picChg>
       </pc:sldChg>
       <pc:sldChg chg="addSp delSp modSp mod">
         <pc:chgData name="Matthieu De Mari" userId="dfb708c9-d8dc-439f-9a3b-c772bf4a311c" providerId="ADAL" clId="{2AD250E2-609D-44C9-A6CB-54091931272C}" dt="2024-01-18T07:58:28.480" v="266" actId="478"/>
@@ -11357,7 +11433,7 @@
           <a:p>
             <a:fld id="{61478373-EB31-4867-8CF0-FA31364748A5}" type="datetimeFigureOut">
               <a:rPr lang="en-GB" smtClean="0"/>
-              <a:t>18/01/2024</a:t>
+              <a:t>26/01/2024</a:t>
             </a:fld>
             <a:endParaRPr lang="en-GB"/>
           </a:p>
@@ -11774,7 +11850,7 @@
           <a:p>
             <a:fld id="{E85DF616-B21E-4EF6-A6A5-95E2FB3EB1A1}" type="datetimeFigureOut">
               <a:rPr lang="en-GB" smtClean="0"/>
-              <a:t>18/01/2024</a:t>
+              <a:t>26/01/2024</a:t>
             </a:fld>
             <a:endParaRPr lang="en-GB"/>
           </a:p>
@@ -11974,7 +12050,7 @@
           <a:p>
             <a:fld id="{E85DF616-B21E-4EF6-A6A5-95E2FB3EB1A1}" type="datetimeFigureOut">
               <a:rPr lang="en-GB" smtClean="0"/>
-              <a:t>18/01/2024</a:t>
+              <a:t>26/01/2024</a:t>
             </a:fld>
             <a:endParaRPr lang="en-GB"/>
           </a:p>
@@ -12184,7 +12260,7 @@
           <a:p>
             <a:fld id="{E85DF616-B21E-4EF6-A6A5-95E2FB3EB1A1}" type="datetimeFigureOut">
               <a:rPr lang="en-GB" smtClean="0"/>
-              <a:t>18/01/2024</a:t>
+              <a:t>26/01/2024</a:t>
             </a:fld>
             <a:endParaRPr lang="en-GB"/>
           </a:p>
@@ -12384,7 +12460,7 @@
           <a:p>
             <a:fld id="{E85DF616-B21E-4EF6-A6A5-95E2FB3EB1A1}" type="datetimeFigureOut">
               <a:rPr lang="en-GB" smtClean="0"/>
-              <a:t>18/01/2024</a:t>
+              <a:t>26/01/2024</a:t>
             </a:fld>
             <a:endParaRPr lang="en-GB"/>
           </a:p>
@@ -12660,7 +12736,7 @@
           <a:p>
             <a:fld id="{E85DF616-B21E-4EF6-A6A5-95E2FB3EB1A1}" type="datetimeFigureOut">
               <a:rPr lang="en-GB" smtClean="0"/>
-              <a:t>18/01/2024</a:t>
+              <a:t>26/01/2024</a:t>
             </a:fld>
             <a:endParaRPr lang="en-GB"/>
           </a:p>
@@ -12928,7 +13004,7 @@
           <a:p>
             <a:fld id="{E85DF616-B21E-4EF6-A6A5-95E2FB3EB1A1}" type="datetimeFigureOut">
               <a:rPr lang="en-GB" smtClean="0"/>
-              <a:t>18/01/2024</a:t>
+              <a:t>26/01/2024</a:t>
             </a:fld>
             <a:endParaRPr lang="en-GB"/>
           </a:p>
@@ -13343,7 +13419,7 @@
           <a:p>
             <a:fld id="{E85DF616-B21E-4EF6-A6A5-95E2FB3EB1A1}" type="datetimeFigureOut">
               <a:rPr lang="en-GB" smtClean="0"/>
-              <a:t>18/01/2024</a:t>
+              <a:t>26/01/2024</a:t>
             </a:fld>
             <a:endParaRPr lang="en-GB"/>
           </a:p>
@@ -13485,7 +13561,7 @@
           <a:p>
             <a:fld id="{E85DF616-B21E-4EF6-A6A5-95E2FB3EB1A1}" type="datetimeFigureOut">
               <a:rPr lang="en-GB" smtClean="0"/>
-              <a:t>18/01/2024</a:t>
+              <a:t>26/01/2024</a:t>
             </a:fld>
             <a:endParaRPr lang="en-GB"/>
           </a:p>
@@ -13598,7 +13674,7 @@
           <a:p>
             <a:fld id="{E85DF616-B21E-4EF6-A6A5-95E2FB3EB1A1}" type="datetimeFigureOut">
               <a:rPr lang="en-GB" smtClean="0"/>
-              <a:t>18/01/2024</a:t>
+              <a:t>26/01/2024</a:t>
             </a:fld>
             <a:endParaRPr lang="en-GB"/>
           </a:p>
@@ -13911,7 +13987,7 @@
           <a:p>
             <a:fld id="{E85DF616-B21E-4EF6-A6A5-95E2FB3EB1A1}" type="datetimeFigureOut">
               <a:rPr lang="en-GB" smtClean="0"/>
-              <a:t>18/01/2024</a:t>
+              <a:t>26/01/2024</a:t>
             </a:fld>
             <a:endParaRPr lang="en-GB"/>
           </a:p>
@@ -14200,7 +14276,7 @@
           <a:p>
             <a:fld id="{E85DF616-B21E-4EF6-A6A5-95E2FB3EB1A1}" type="datetimeFigureOut">
               <a:rPr lang="en-GB" smtClean="0"/>
-              <a:t>18/01/2024</a:t>
+              <a:t>26/01/2024</a:t>
             </a:fld>
             <a:endParaRPr lang="en-GB"/>
           </a:p>
@@ -14443,7 +14519,7 @@
           <a:p>
             <a:fld id="{E85DF616-B21E-4EF6-A6A5-95E2FB3EB1A1}" type="datetimeFigureOut">
               <a:rPr lang="en-GB" smtClean="0"/>
-              <a:t>18/01/2024</a:t>
+              <a:t>26/01/2024</a:t>
             </a:fld>
             <a:endParaRPr lang="en-GB"/>
           </a:p>
@@ -15437,8 +15513,8 @@
           </a:p>
         </p:txBody>
       </p:sp>
-      <mc:AlternateContent xmlns:mc="http://schemas.openxmlformats.org/markup-compatibility/2006">
-        <mc:Choice xmlns:a14="http://schemas.microsoft.com/office/drawing/2010/main" Requires="a14">
+      <mc:AlternateContent xmlns:mc="http://schemas.openxmlformats.org/markup-compatibility/2006" xmlns:a14="http://schemas.microsoft.com/office/drawing/2010/main">
+        <mc:Choice Requires="a14">
           <p:sp>
             <p:nvSpPr>
               <p:cNvPr id="3" name="Content Placeholder 2">
@@ -15708,7 +15784,7 @@
             </p:txBody>
           </p:sp>
         </mc:Choice>
-        <mc:Fallback>
+        <mc:Fallback xmlns="">
           <p:sp>
             <p:nvSpPr>
               <p:cNvPr id="3" name="Content Placeholder 2">
@@ -17414,10 +17490,10 @@
       </mc:AlternateContent>
       <p:pic>
         <p:nvPicPr>
-          <p:cNvPr id="2" name="Picture 1">
+          <p:cNvPr id="3" name="Picture 2">
             <a:extLst>
               <a:ext uri="{FF2B5EF4-FFF2-40B4-BE49-F238E27FC236}">
-                <a16:creationId xmlns:a16="http://schemas.microsoft.com/office/drawing/2014/main" id="{F69C4E1F-E9F4-99D4-A919-7EDFEE3BD24A}"/>
+                <a16:creationId xmlns:a16="http://schemas.microsoft.com/office/drawing/2014/main" id="{A71C56B8-6D3F-262B-50BD-10F3500B17D0}"/>
               </a:ext>
             </a:extLst>
           </p:cNvPr>
@@ -17427,7 +17503,7 @@
           <p:nvPr/>
         </p:nvPicPr>
         <p:blipFill>
-          <a:blip r:embed="rId2"/>
+          <a:blip r:embed="rId3"/>
           <a:stretch>
             <a:fillRect/>
           </a:stretch>
@@ -17532,47 +17608,113 @@
               <a:buAutoNum type="arabicPeriod"/>
             </a:pPr>
             <a:r>
-              <a:rPr lang="en-US" dirty="0"/>
+              <a:rPr lang="en-US" dirty="0">
+                <a:solidFill>
+                  <a:schemeClr val="bg1">
+                    <a:lumMod val="65000"/>
+                  </a:schemeClr>
+                </a:solidFill>
+              </a:rPr>
               <a:t>What are the </a:t>
             </a:r>
             <a:r>
-              <a:rPr lang="en-US" b="1" dirty="0"/>
+              <a:rPr lang="en-US" b="1" dirty="0">
+                <a:solidFill>
+                  <a:schemeClr val="bg1">
+                    <a:lumMod val="65000"/>
+                  </a:schemeClr>
+                </a:solidFill>
+              </a:rPr>
               <a:t>typical</a:t>
             </a:r>
             <a:r>
-              <a:rPr lang="en-US" dirty="0"/>
+              <a:rPr lang="en-US" dirty="0">
+                <a:solidFill>
+                  <a:schemeClr val="bg1">
+                    <a:lumMod val="65000"/>
+                  </a:schemeClr>
+                </a:solidFill>
+              </a:rPr>
               <a:t> </a:t>
             </a:r>
             <a:r>
-              <a:rPr lang="en-US" b="1" dirty="0"/>
+              <a:rPr lang="en-US" b="1" dirty="0">
+                <a:solidFill>
+                  <a:schemeClr val="bg1">
+                    <a:lumMod val="65000"/>
+                  </a:schemeClr>
+                </a:solidFill>
+              </a:rPr>
               <a:t>concepts</a:t>
             </a:r>
             <a:r>
-              <a:rPr lang="en-US" dirty="0"/>
+              <a:rPr lang="en-US" dirty="0">
+                <a:solidFill>
+                  <a:schemeClr val="bg1">
+                    <a:lumMod val="65000"/>
+                  </a:schemeClr>
+                </a:solidFill>
+              </a:rPr>
               <a:t> </a:t>
             </a:r>
             <a:r>
-              <a:rPr lang="en-US" b="1" dirty="0"/>
+              <a:rPr lang="en-US" b="1" dirty="0">
+                <a:solidFill>
+                  <a:schemeClr val="bg1">
+                    <a:lumMod val="65000"/>
+                  </a:schemeClr>
+                </a:solidFill>
+              </a:rPr>
               <a:t>of</a:t>
             </a:r>
             <a:r>
-              <a:rPr lang="en-US" dirty="0"/>
+              <a:rPr lang="en-US" dirty="0">
+                <a:solidFill>
+                  <a:schemeClr val="bg1">
+                    <a:lumMod val="65000"/>
+                  </a:schemeClr>
+                </a:solidFill>
+              </a:rPr>
               <a:t> </a:t>
             </a:r>
             <a:r>
-              <a:rPr lang="en-US" b="1" dirty="0"/>
+              <a:rPr lang="en-US" b="1" dirty="0">
+                <a:solidFill>
+                  <a:schemeClr val="bg1">
+                    <a:lumMod val="65000"/>
+                  </a:schemeClr>
+                </a:solidFill>
+              </a:rPr>
               <a:t>Machine</a:t>
             </a:r>
             <a:r>
-              <a:rPr lang="en-US" dirty="0"/>
+              <a:rPr lang="en-US" dirty="0">
+                <a:solidFill>
+                  <a:schemeClr val="bg1">
+                    <a:lumMod val="65000"/>
+                  </a:schemeClr>
+                </a:solidFill>
+              </a:rPr>
               <a:t> </a:t>
             </a:r>
             <a:r>
-              <a:rPr lang="en-US" b="1" dirty="0"/>
+              <a:rPr lang="en-US" b="1" dirty="0">
+                <a:solidFill>
+                  <a:schemeClr val="bg1">
+                    <a:lumMod val="65000"/>
+                  </a:schemeClr>
+                </a:solidFill>
+              </a:rPr>
               <a:t>Learning</a:t>
             </a:r>
             <a:r>
-              <a:rPr lang="en-US" dirty="0"/>
+              <a:rPr lang="en-US" dirty="0">
+                <a:solidFill>
+                  <a:schemeClr val="bg1">
+                    <a:lumMod val="65000"/>
+                  </a:schemeClr>
+                </a:solidFill>
+              </a:rPr>
               <a:t> to be used as a starting point for this course?</a:t>
             </a:r>
           </a:p>
@@ -17582,39 +17724,93 @@
               <a:buAutoNum type="arabicPeriod"/>
             </a:pPr>
             <a:r>
-              <a:rPr lang="en-GB" dirty="0"/>
+              <a:rPr lang="en-GB" dirty="0">
+                <a:solidFill>
+                  <a:schemeClr val="bg1">
+                    <a:lumMod val="65000"/>
+                  </a:schemeClr>
+                </a:solidFill>
+              </a:rPr>
               <a:t>What are the </a:t>
             </a:r>
             <a:r>
-              <a:rPr lang="en-GB" b="1" dirty="0"/>
+              <a:rPr lang="en-GB" b="1" dirty="0">
+                <a:solidFill>
+                  <a:schemeClr val="bg1">
+                    <a:lumMod val="65000"/>
+                  </a:schemeClr>
+                </a:solidFill>
+              </a:rPr>
               <a:t>different</a:t>
             </a:r>
             <a:r>
-              <a:rPr lang="en-GB" dirty="0"/>
+              <a:rPr lang="en-GB" dirty="0">
+                <a:solidFill>
+                  <a:schemeClr val="bg1">
+                    <a:lumMod val="65000"/>
+                  </a:schemeClr>
+                </a:solidFill>
+              </a:rPr>
               <a:t> </a:t>
             </a:r>
             <a:r>
-              <a:rPr lang="en-GB" b="1" dirty="0"/>
+              <a:rPr lang="en-GB" b="1" dirty="0">
+                <a:solidFill>
+                  <a:schemeClr val="bg1">
+                    <a:lumMod val="65000"/>
+                  </a:schemeClr>
+                </a:solidFill>
+              </a:rPr>
               <a:t>families</a:t>
             </a:r>
             <a:r>
-              <a:rPr lang="en-GB" dirty="0"/>
+              <a:rPr lang="en-GB" dirty="0">
+                <a:solidFill>
+                  <a:schemeClr val="bg1">
+                    <a:lumMod val="65000"/>
+                  </a:schemeClr>
+                </a:solidFill>
+              </a:rPr>
               <a:t> </a:t>
             </a:r>
             <a:r>
-              <a:rPr lang="en-GB" b="1" dirty="0"/>
+              <a:rPr lang="en-GB" b="1" dirty="0">
+                <a:solidFill>
+                  <a:schemeClr val="bg1">
+                    <a:lumMod val="65000"/>
+                  </a:schemeClr>
+                </a:solidFill>
+              </a:rPr>
               <a:t>of</a:t>
             </a:r>
             <a:r>
-              <a:rPr lang="en-GB" dirty="0"/>
+              <a:rPr lang="en-GB" dirty="0">
+                <a:solidFill>
+                  <a:schemeClr val="bg1">
+                    <a:lumMod val="65000"/>
+                  </a:schemeClr>
+                </a:solidFill>
+              </a:rPr>
               <a:t> </a:t>
             </a:r>
             <a:r>
-              <a:rPr lang="en-GB" b="1" dirty="0"/>
+              <a:rPr lang="en-GB" b="1" dirty="0">
+                <a:solidFill>
+                  <a:schemeClr val="bg1">
+                    <a:lumMod val="65000"/>
+                  </a:schemeClr>
+                </a:solidFill>
+              </a:rPr>
               <a:t>problems</a:t>
             </a:r>
             <a:r>
-              <a:rPr lang="en-GB" dirty="0"/>
+              <a:rPr lang="en-GB" dirty="0">
+                <a:solidFill>
+                  <a:schemeClr val="bg1">
+                    <a:lumMod val="65000"/>
+                  </a:schemeClr>
+                </a:solidFill>
+              </a:rPr>
               <a:t> in Deep Learning?</a:t>
             </a:r>
           </a:p>
@@ -17624,31 +17820,73 @@
               <a:buAutoNum type="arabicPeriod"/>
             </a:pPr>
             <a:r>
-              <a:rPr lang="en-GB" dirty="0"/>
+              <a:rPr lang="en-GB" dirty="0">
+                <a:solidFill>
+                  <a:schemeClr val="bg1">
+                    <a:lumMod val="65000"/>
+                  </a:schemeClr>
+                </a:solidFill>
+              </a:rPr>
               <a:t>What is the </a:t>
             </a:r>
             <a:r>
-              <a:rPr lang="en-GB" b="1" dirty="0"/>
+              <a:rPr lang="en-GB" b="1" dirty="0">
+                <a:solidFill>
+                  <a:schemeClr val="bg1">
+                    <a:lumMod val="65000"/>
+                  </a:schemeClr>
+                </a:solidFill>
+              </a:rPr>
               <a:t>typical</a:t>
             </a:r>
             <a:r>
-              <a:rPr lang="en-GB" dirty="0"/>
+              <a:rPr lang="en-GB" dirty="0">
+                <a:solidFill>
+                  <a:schemeClr val="bg1">
+                    <a:lumMod val="65000"/>
+                  </a:schemeClr>
+                </a:solidFill>
+              </a:rPr>
               <a:t> </a:t>
             </a:r>
             <a:r>
-              <a:rPr lang="en-GB" b="1" dirty="0"/>
+              <a:rPr lang="en-GB" b="1" dirty="0">
+                <a:solidFill>
+                  <a:schemeClr val="bg1">
+                    <a:lumMod val="65000"/>
+                  </a:schemeClr>
+                </a:solidFill>
+              </a:rPr>
               <a:t>structure</a:t>
             </a:r>
             <a:r>
-              <a:rPr lang="en-GB" dirty="0"/>
+              <a:rPr lang="en-GB" dirty="0">
+                <a:solidFill>
+                  <a:schemeClr val="bg1">
+                    <a:lumMod val="65000"/>
+                  </a:schemeClr>
+                </a:solidFill>
+              </a:rPr>
               <a:t> </a:t>
             </a:r>
             <a:r>
-              <a:rPr lang="en-GB" b="1" dirty="0"/>
+              <a:rPr lang="en-GB" b="1" dirty="0">
+                <a:solidFill>
+                  <a:schemeClr val="bg1">
+                    <a:lumMod val="65000"/>
+                  </a:schemeClr>
+                </a:solidFill>
+              </a:rPr>
               <a:t>of a Deep Learning problem</a:t>
             </a:r>
             <a:r>
-              <a:rPr lang="en-GB" dirty="0"/>
+              <a:rPr lang="en-GB" dirty="0">
+                <a:solidFill>
+                  <a:schemeClr val="bg1">
+                    <a:lumMod val="65000"/>
+                  </a:schemeClr>
+                </a:solidFill>
+              </a:rPr>
               <a:t>?</a:t>
             </a:r>
           </a:p>
@@ -17658,23 +17896,53 @@
               <a:buAutoNum type="arabicPeriod"/>
             </a:pPr>
             <a:r>
-              <a:rPr lang="en-GB" dirty="0"/>
+              <a:rPr lang="en-GB" dirty="0">
+                <a:solidFill>
+                  <a:schemeClr val="bg1">
+                    <a:lumMod val="65000"/>
+                  </a:schemeClr>
+                </a:solidFill>
+              </a:rPr>
               <a:t>What is </a:t>
             </a:r>
             <a:r>
-              <a:rPr lang="en-GB" b="1" dirty="0"/>
+              <a:rPr lang="en-GB" b="1" dirty="0">
+                <a:solidFill>
+                  <a:schemeClr val="bg1">
+                    <a:lumMod val="65000"/>
+                  </a:schemeClr>
+                </a:solidFill>
+              </a:rPr>
               <a:t>linear</a:t>
             </a:r>
             <a:r>
-              <a:rPr lang="en-GB" dirty="0"/>
+              <a:rPr lang="en-GB" dirty="0">
+                <a:solidFill>
+                  <a:schemeClr val="bg1">
+                    <a:lumMod val="65000"/>
+                  </a:schemeClr>
+                </a:solidFill>
+              </a:rPr>
               <a:t> </a:t>
             </a:r>
             <a:r>
-              <a:rPr lang="en-GB" b="1" dirty="0"/>
+              <a:rPr lang="en-GB" b="1" dirty="0">
+                <a:solidFill>
+                  <a:schemeClr val="bg1">
+                    <a:lumMod val="65000"/>
+                  </a:schemeClr>
+                </a:solidFill>
+              </a:rPr>
               <a:t>regression</a:t>
             </a:r>
             <a:r>
-              <a:rPr lang="en-GB" dirty="0"/>
+              <a:rPr lang="en-GB" dirty="0">
+                <a:solidFill>
+                  <a:schemeClr val="bg1">
+                    <a:lumMod val="65000"/>
+                  </a:schemeClr>
+                </a:solidFill>
+              </a:rPr>
               <a:t> and how to implement it?</a:t>
             </a:r>
           </a:p>
@@ -17684,63 +17952,153 @@
               <a:buAutoNum type="arabicPeriod"/>
             </a:pPr>
             <a:r>
-              <a:rPr lang="en-GB" dirty="0"/>
+              <a:rPr lang="en-GB" dirty="0">
+                <a:solidFill>
+                  <a:schemeClr val="bg1">
+                    <a:lumMod val="65000"/>
+                  </a:schemeClr>
+                </a:solidFill>
+              </a:rPr>
               <a:t>What is the </a:t>
             </a:r>
             <a:r>
-              <a:rPr lang="en-GB" b="1" dirty="0"/>
+              <a:rPr lang="en-GB" b="1" dirty="0">
+                <a:solidFill>
+                  <a:schemeClr val="bg1">
+                    <a:lumMod val="65000"/>
+                  </a:schemeClr>
+                </a:solidFill>
+              </a:rPr>
               <a:t>gradient</a:t>
             </a:r>
             <a:r>
-              <a:rPr lang="en-GB" dirty="0"/>
+              <a:rPr lang="en-GB" dirty="0">
+                <a:solidFill>
+                  <a:schemeClr val="bg1">
+                    <a:lumMod val="65000"/>
+                  </a:schemeClr>
+                </a:solidFill>
+              </a:rPr>
               <a:t> </a:t>
             </a:r>
             <a:r>
-              <a:rPr lang="en-GB" b="1" dirty="0"/>
+              <a:rPr lang="en-GB" b="1" dirty="0">
+                <a:solidFill>
+                  <a:schemeClr val="bg1">
+                    <a:lumMod val="65000"/>
+                  </a:schemeClr>
+                </a:solidFill>
+              </a:rPr>
               <a:t>descent</a:t>
             </a:r>
             <a:r>
-              <a:rPr lang="en-GB" dirty="0"/>
+              <a:rPr lang="en-GB" dirty="0">
+                <a:solidFill>
+                  <a:schemeClr val="bg1">
+                    <a:lumMod val="65000"/>
+                  </a:schemeClr>
+                </a:solidFill>
+              </a:rPr>
               <a:t> </a:t>
             </a:r>
             <a:r>
-              <a:rPr lang="en-GB" b="1" dirty="0"/>
+              <a:rPr lang="en-GB" b="1" dirty="0">
+                <a:solidFill>
+                  <a:schemeClr val="bg1">
+                    <a:lumMod val="65000"/>
+                  </a:schemeClr>
+                </a:solidFill>
+              </a:rPr>
               <a:t>algorithm</a:t>
             </a:r>
             <a:r>
-              <a:rPr lang="en-GB" dirty="0"/>
+              <a:rPr lang="en-GB" dirty="0">
+                <a:solidFill>
+                  <a:schemeClr val="bg1">
+                    <a:lumMod val="65000"/>
+                  </a:schemeClr>
+                </a:solidFill>
+              </a:rPr>
               <a:t> and how is it used to </a:t>
             </a:r>
             <a:r>
-              <a:rPr lang="en-GB" b="1" dirty="0"/>
+              <a:rPr lang="en-GB" b="1" dirty="0">
+                <a:solidFill>
+                  <a:schemeClr val="bg1">
+                    <a:lumMod val="65000"/>
+                  </a:schemeClr>
+                </a:solidFill>
+              </a:rPr>
               <a:t>train</a:t>
             </a:r>
             <a:r>
-              <a:rPr lang="en-GB" dirty="0"/>
+              <a:rPr lang="en-GB" dirty="0">
+                <a:solidFill>
+                  <a:schemeClr val="bg1">
+                    <a:lumMod val="65000"/>
+                  </a:schemeClr>
+                </a:solidFill>
+              </a:rPr>
               <a:t> </a:t>
             </a:r>
             <a:r>
-              <a:rPr lang="en-GB" b="1" dirty="0"/>
+              <a:rPr lang="en-GB" b="1" dirty="0">
+                <a:solidFill>
+                  <a:schemeClr val="bg1">
+                    <a:lumMod val="65000"/>
+                  </a:schemeClr>
+                </a:solidFill>
+              </a:rPr>
               <a:t>Machine</a:t>
             </a:r>
             <a:r>
-              <a:rPr lang="en-GB" dirty="0"/>
+              <a:rPr lang="en-GB" dirty="0">
+                <a:solidFill>
+                  <a:schemeClr val="bg1">
+                    <a:lumMod val="65000"/>
+                  </a:schemeClr>
+                </a:solidFill>
+              </a:rPr>
               <a:t> </a:t>
             </a:r>
             <a:r>
-              <a:rPr lang="en-GB" b="1" dirty="0"/>
+              <a:rPr lang="en-GB" b="1" dirty="0">
+                <a:solidFill>
+                  <a:schemeClr val="bg1">
+                    <a:lumMod val="65000"/>
+                  </a:schemeClr>
+                </a:solidFill>
+              </a:rPr>
               <a:t>Learning</a:t>
             </a:r>
             <a:r>
-              <a:rPr lang="en-GB" dirty="0"/>
+              <a:rPr lang="en-GB" dirty="0">
+                <a:solidFill>
+                  <a:schemeClr val="bg1">
+                    <a:lumMod val="65000"/>
+                  </a:schemeClr>
+                </a:solidFill>
+              </a:rPr>
               <a:t> </a:t>
             </a:r>
             <a:r>
-              <a:rPr lang="en-GB" b="1" dirty="0"/>
+              <a:rPr lang="en-GB" b="1" dirty="0">
+                <a:solidFill>
+                  <a:schemeClr val="bg1">
+                    <a:lumMod val="65000"/>
+                  </a:schemeClr>
+                </a:solidFill>
+              </a:rPr>
               <a:t>models</a:t>
             </a:r>
             <a:r>
-              <a:rPr lang="en-GB" dirty="0"/>
+              <a:rPr lang="en-GB" dirty="0">
+                <a:solidFill>
+                  <a:schemeClr val="bg1">
+                    <a:lumMod val="65000"/>
+                  </a:schemeClr>
+                </a:solidFill>
+              </a:rPr>
               <a:t>?</a:t>
             </a:r>
           </a:p>
@@ -19144,6 +19502,9 @@
           <a:bodyPr/>
           <a:lstStyle/>
           <a:p>
+            <a:pPr marL="0" indent="0">
+              <a:buNone/>
+            </a:pPr>
             <a:r>
               <a:rPr lang="en-GB" dirty="0"/>
               <a:t>In general, having a model that is </a:t>
@@ -19174,6 +19535,9 @@
             </a:r>
           </a:p>
           <a:p>
+            <a:pPr marL="0" indent="0">
+              <a:buNone/>
+            </a:pPr>
             <a:r>
               <a:rPr lang="en-GB" dirty="0"/>
               <a:t>We would very much prefer to fit the data “just right”.</a:t>
@@ -22135,8 +22499,8 @@
           </p:sp>
         </mc:Fallback>
       </mc:AlternateContent>
-      <mc:AlternateContent xmlns:mc="http://schemas.openxmlformats.org/markup-compatibility/2006">
-        <mc:Choice xmlns:a14="http://schemas.microsoft.com/office/drawing/2010/main" Requires="a14">
+      <mc:AlternateContent xmlns:mc="http://schemas.openxmlformats.org/markup-compatibility/2006" xmlns:a14="http://schemas.microsoft.com/office/drawing/2010/main">
+        <mc:Choice Requires="a14">
           <p:sp>
             <p:nvSpPr>
               <p:cNvPr id="4" name="Content Placeholder 3">
@@ -22279,7 +22643,7 @@
             </p:txBody>
           </p:sp>
         </mc:Choice>
-        <mc:Fallback>
+        <mc:Fallback xmlns="">
           <p:sp>
             <p:nvSpPr>
               <p:cNvPr id="4" name="Content Placeholder 3">
@@ -23110,8 +23474,8 @@
           </a:prstGeom>
         </p:spPr>
       </p:pic>
-      <mc:AlternateContent xmlns:mc="http://schemas.openxmlformats.org/markup-compatibility/2006">
-        <mc:Choice xmlns:a14="http://schemas.microsoft.com/office/drawing/2010/main" Requires="a14">
+      <mc:AlternateContent xmlns:mc="http://schemas.openxmlformats.org/markup-compatibility/2006" xmlns:a14="http://schemas.microsoft.com/office/drawing/2010/main">
+        <mc:Choice Requires="a14">
           <p:sp>
             <p:nvSpPr>
               <p:cNvPr id="2" name="TextBox 1">
@@ -23205,7 +23569,7 @@
             </p:txBody>
           </p:sp>
         </mc:Choice>
-        <mc:Fallback>
+        <mc:Fallback xmlns="">
           <p:sp>
             <p:nvSpPr>
               <p:cNvPr id="2" name="TextBox 1">
@@ -23325,7 +23689,12 @@
             <p:ph idx="1"/>
           </p:nvPr>
         </p:nvSpPr>
-        <p:spPr/>
+        <p:spPr>
+          <a:xfrm>
+            <a:off x="838200" y="1825624"/>
+            <a:ext cx="10515600" cy="5032375"/>
+          </a:xfrm>
+        </p:spPr>
         <p:txBody>
           <a:bodyPr>
             <a:normAutofit/>
@@ -23395,45 +23764,39 @@
             </a:r>
           </a:p>
           <a:p>
+            <a:endParaRPr lang="en-GB" dirty="0"/>
+          </a:p>
+          <a:p>
+            <a:pPr marL="0" indent="0">
+              <a:buNone/>
+            </a:pPr>
+            <a:r>
+              <a:rPr lang="en-GB" b="1" dirty="0"/>
+              <a:t>Why prefer L1 over L2 (and vice versa)? </a:t>
+            </a:r>
+            <a:r>
+              <a:rPr lang="en-GB" dirty="0"/>
+              <a:t>Have a look at this, if curious!</a:t>
+            </a:r>
+            <a:br>
+              <a:rPr lang="en-GB" dirty="0"/>
+            </a:br>
+            <a:r>
+              <a:rPr lang="en-GB" dirty="0">
+                <a:hlinkClick r:id="rId2"/>
+              </a:rPr>
+              <a:t>https://medium.com/@fernando.dijkinga/explaining-l1-and-l2-regularization-in-machine-learning-2356ee91c8e3</a:t>
+            </a:r>
+            <a:r>
+              <a:rPr lang="en-GB" dirty="0"/>
+              <a:t> </a:t>
+            </a:r>
+          </a:p>
+          <a:p>
             <a:endParaRPr lang="en-SG" dirty="0"/>
           </a:p>
         </p:txBody>
       </p:sp>
-      <p:pic>
-        <p:nvPicPr>
-          <p:cNvPr id="11" name="Picture 10" descr="A picture containing text, screenshot, font, number&#10;&#10;Description automatically generated">
-            <a:extLst>
-              <a:ext uri="{FF2B5EF4-FFF2-40B4-BE49-F238E27FC236}">
-                <a16:creationId xmlns:a16="http://schemas.microsoft.com/office/drawing/2014/main" id="{3EFBA32E-31AD-EBDB-E6A1-D009113F8427}"/>
-              </a:ext>
-            </a:extLst>
-          </p:cNvPr>
-          <p:cNvPicPr>
-            <a:picLocks noChangeAspect="1"/>
-          </p:cNvPicPr>
-          <p:nvPr/>
-        </p:nvPicPr>
-        <p:blipFill rotWithShape="1">
-          <a:blip r:embed="rId2">
-            <a:extLst>
-              <a:ext uri="{28A0092B-C50C-407E-A947-70E740481C1C}">
-                <a14:useLocalDpi xmlns:a14="http://schemas.microsoft.com/office/drawing/2010/main" val="0"/>
-              </a:ext>
-            </a:extLst>
-          </a:blip>
-          <a:srcRect b="62408"/>
-          <a:stretch/>
-        </p:blipFill>
-        <p:spPr>
-          <a:xfrm>
-            <a:off x="3181350" y="5406871"/>
-            <a:ext cx="5829300" cy="1213823"/>
-          </a:xfrm>
-          <a:prstGeom prst="rect">
-            <a:avLst/>
-          </a:prstGeom>
-        </p:spPr>
-      </p:pic>
     </p:spTree>
     <p:extLst>
       <p:ext uri="{BB962C8B-B14F-4D97-AF65-F5344CB8AC3E}">
@@ -25589,8 +25952,8 @@
           </a:p>
         </p:txBody>
       </p:sp>
-      <mc:AlternateContent xmlns:mc="http://schemas.openxmlformats.org/markup-compatibility/2006">
-        <mc:Choice xmlns:a14="http://schemas.microsoft.com/office/drawing/2010/main" Requires="a14">
+      <mc:AlternateContent xmlns:mc="http://schemas.openxmlformats.org/markup-compatibility/2006" xmlns:a14="http://schemas.microsoft.com/office/drawing/2010/main">
+        <mc:Choice Requires="a14">
           <p:sp>
             <p:nvSpPr>
               <p:cNvPr id="3" name="Content Placeholder 2">
@@ -25791,7 +26154,7 @@
             </p:txBody>
           </p:sp>
         </mc:Choice>
-        <mc:Fallback>
+        <mc:Fallback xmlns="">
           <p:sp>
             <p:nvSpPr>
               <p:cNvPr id="3" name="Content Placeholder 2">

</xml_diff>

<commit_message>
Some typos corrections and clarifications in W1S3.
</commit_message>
<xml_diff>
--- a/W1/2. W1S2 final/W1S2.pptx
+++ b/W1/2. W1S2 final/W1S2.pptx
@@ -249,7 +249,7 @@
   <pc:docChgLst>
     <pc:chgData name="Matthieu De Mari" userId="dfb708c9-d8dc-439f-9a3b-c772bf4a311c" providerId="ADAL" clId="{2AD250E2-609D-44C9-A6CB-54091931272C}"/>
     <pc:docChg chg="custSel addSld delSld modSld modSection">
-      <pc:chgData name="Matthieu De Mari" userId="dfb708c9-d8dc-439f-9a3b-c772bf4a311c" providerId="ADAL" clId="{2AD250E2-609D-44C9-A6CB-54091931272C}" dt="2024-01-26T00:54:59.117" v="390" actId="20577"/>
+      <pc:chgData name="Matthieu De Mari" userId="dfb708c9-d8dc-439f-9a3b-c772bf4a311c" providerId="ADAL" clId="{2AD250E2-609D-44C9-A6CB-54091931272C}" dt="2024-01-26T05:53:55.303" v="459" actId="20577"/>
       <pc:docMkLst>
         <pc:docMk/>
       </pc:docMkLst>
@@ -265,6 +265,21 @@
             <pc:docMk/>
             <pc:sldMk cId="3442501962" sldId="257"/>
             <ac:spMk id="3" creationId="{35995840-A9D9-479A-A34F-EA7DC229D38E}"/>
+          </ac:spMkLst>
+        </pc:spChg>
+      </pc:sldChg>
+      <pc:sldChg chg="modSp mod">
+        <pc:chgData name="Matthieu De Mari" userId="dfb708c9-d8dc-439f-9a3b-c772bf4a311c" providerId="ADAL" clId="{2AD250E2-609D-44C9-A6CB-54091931272C}" dt="2024-01-26T05:53:09.872" v="438" actId="20577"/>
+        <pc:sldMkLst>
+          <pc:docMk/>
+          <pc:sldMk cId="2981077995" sldId="474"/>
+        </pc:sldMkLst>
+        <pc:spChg chg="mod">
+          <ac:chgData name="Matthieu De Mari" userId="dfb708c9-d8dc-439f-9a3b-c772bf4a311c" providerId="ADAL" clId="{2AD250E2-609D-44C9-A6CB-54091931272C}" dt="2024-01-26T05:53:09.872" v="438" actId="20577"/>
+          <ac:spMkLst>
+            <pc:docMk/>
+            <pc:sldMk cId="2981077995" sldId="474"/>
+            <ac:spMk id="3" creationId="{09ACEEFD-8460-F540-F80C-BEACC2297773}"/>
           </ac:spMkLst>
         </pc:spChg>
       </pc:sldChg>
@@ -590,6 +605,21 @@
             <pc:docMk/>
             <pc:sldMk cId="710884314" sldId="506"/>
             <ac:spMk id="2" creationId="{7E8004EF-5A8C-5081-A7AD-65F92DB1C7E9}"/>
+          </ac:spMkLst>
+        </pc:spChg>
+      </pc:sldChg>
+      <pc:sldChg chg="modSp mod">
+        <pc:chgData name="Matthieu De Mari" userId="dfb708c9-d8dc-439f-9a3b-c772bf4a311c" providerId="ADAL" clId="{2AD250E2-609D-44C9-A6CB-54091931272C}" dt="2024-01-26T05:53:55.303" v="459" actId="20577"/>
+        <pc:sldMkLst>
+          <pc:docMk/>
+          <pc:sldMk cId="434677060" sldId="534"/>
+        </pc:sldMkLst>
+        <pc:spChg chg="mod">
+          <ac:chgData name="Matthieu De Mari" userId="dfb708c9-d8dc-439f-9a3b-c772bf4a311c" providerId="ADAL" clId="{2AD250E2-609D-44C9-A6CB-54091931272C}" dt="2024-01-26T05:53:55.303" v="459" actId="20577"/>
+          <ac:spMkLst>
+            <pc:docMk/>
+            <pc:sldMk cId="434677060" sldId="534"/>
+            <ac:spMk id="2" creationId="{CA62C214-EC19-770C-7653-ED041921B2C8}"/>
           </ac:spMkLst>
         </pc:spChg>
       </pc:sldChg>
@@ -15201,8 +15231,12 @@
           <a:lstStyle/>
           <a:p>
             <a:r>
+              <a:rPr lang="en-GB"/>
+              <a:t>Quick parenthesis</a:t>
+            </a:r>
+            <a:r>
               <a:rPr lang="en-GB" dirty="0"/>
-              <a:t>The hyperplane concept</a:t>
+              <a:t>: The hyperplane concept</a:t>
             </a:r>
             <a:endParaRPr lang="en-SG" dirty="0"/>
           </a:p>
@@ -24199,8 +24233,8 @@
           </a:p>
         </p:txBody>
       </p:sp>
-      <mc:AlternateContent xmlns:mc="http://schemas.openxmlformats.org/markup-compatibility/2006" xmlns:a14="http://schemas.microsoft.com/office/drawing/2010/main">
-        <mc:Choice Requires="a14">
+      <mc:AlternateContent xmlns:mc="http://schemas.openxmlformats.org/markup-compatibility/2006">
+        <mc:Choice xmlns:a14="http://schemas.microsoft.com/office/drawing/2010/main" Requires="a14">
           <p:sp>
             <p:nvSpPr>
               <p:cNvPr id="3" name="Content Placeholder 2">
@@ -24388,14 +24422,14 @@
                 </a:pPr>
                 <a:r>
                   <a:rPr lang="en-GB" dirty="0"/>
-                  <a:t>The linear regression can be simply transposed.</a:t>
+                  <a:t>The linear regression can be simply transposed from a single input to multiple inputs.</a:t>
                 </a:r>
                 <a:endParaRPr lang="en-SG" dirty="0"/>
               </a:p>
             </p:txBody>
           </p:sp>
         </mc:Choice>
-        <mc:Fallback xmlns="">
+        <mc:Fallback>
           <p:sp>
             <p:nvSpPr>
               <p:cNvPr id="3" name="Content Placeholder 2">
@@ -24429,7 +24463,7 @@
               <a:lstStyle/>
               <a:p>
                 <a:r>
-                  <a:rPr lang="en-SG">
+                  <a:rPr lang="en-GB">
                     <a:noFill/>
                   </a:rPr>
                   <a:t> </a:t>

</xml_diff>